<commit_message>
Added planner csv and screenshot. Updated slides.
</commit_message>
<xml_diff>
--- a/Documentation/Slides/CT2003 Team 5 Slides.pptx
+++ b/Documentation/Slides/CT2003 Team 5 Slides.pptx
@@ -5,7 +5,7 @@
     <p:sldMasterId id="2147483660" r:id="rId4"/>
   </p:sldMasterIdLst>
   <p:notesMasterIdLst>
-    <p:notesMasterId r:id="rId16"/>
+    <p:notesMasterId r:id="rId17"/>
   </p:notesMasterIdLst>
   <p:sldIdLst>
     <p:sldId id="256" r:id="rId5"/>
@@ -16,9 +16,10 @@
     <p:sldId id="263" r:id="rId10"/>
     <p:sldId id="264" r:id="rId11"/>
     <p:sldId id="265" r:id="rId12"/>
-    <p:sldId id="257" r:id="rId13"/>
-    <p:sldId id="266" r:id="rId14"/>
-    <p:sldId id="267" r:id="rId15"/>
+    <p:sldId id="268" r:id="rId13"/>
+    <p:sldId id="257" r:id="rId14"/>
+    <p:sldId id="266" r:id="rId15"/>
+    <p:sldId id="267" r:id="rId16"/>
   </p:sldIdLst>
   <p:sldSz cx="12192000" cy="6858000"/>
   <p:notesSz cx="6858000" cy="9144000"/>
@@ -129,14 +130,1941 @@
 <p1510:revInfo xmlns:a="http://schemas.openxmlformats.org/drawingml/2006/main" xmlns:r="http://schemas.openxmlformats.org/officeDocument/2006/relationships" xmlns:p1510="http://schemas.microsoft.com/office/powerpoint/2015/10/main">
   <p1510:revLst>
     <p1510:client id="{04BA5E01-BA23-18E1-DCF6-E5C46CF236C7}" v="120" dt="2025-11-14T15:51:28.842"/>
+    <p1510:client id="{0FFB4083-3B2E-2A6A-F0E7-C0FF5C836540}" v="91" dt="2025-11-15T03:30:08.945"/>
+    <p1510:client id="{280131EC-E028-9B0F-FDF1-4E7BF93DAEB6}" v="15" dt="2025-11-15T02:41:40.733"/>
+    <p1510:client id="{2C091672-69B1-0874-4C84-10AB0A900DDD}" v="61" dt="2025-11-14T16:34:19.639"/>
     <p1510:client id="{4D5FD745-66A4-826D-CC6B-AD216AA2BB48}" v="26" dt="2025-11-14T11:10:54.366"/>
+    <p1510:client id="{57B659E1-75D9-087F-E1B2-74E737E57077}" v="3" dt="2025-11-15T02:53:55.763"/>
     <p1510:client id="{91104CAB-4683-05AE-3D9A-FEF41D8A1AFC}" v="46" dt="2025-11-14T15:50:03.976"/>
-    <p1510:client id="{ABDB5723-FFAA-C02C-C158-10D6663CE098}" v="6" dt="2025-11-14T15:52:08.397"/>
-    <p1510:client id="{BE1971C7-85DA-671A-5C03-87B2AA02E9C4}" v="107" dt="2025-11-14T15:42:34.450"/>
-    <p1510:client id="{C548CB1D-32AD-4A01-B31C-AFC1760A5C6F}" v="35" dt="2025-11-14T15:51:35.086"/>
+    <p1510:client id="{ABDB5723-FFAA-C02C-C158-10D6663CE098}" v="58" dt="2025-11-15T03:15:19.383"/>
+    <p1510:client id="{BE1971C7-85DA-671A-5C03-87B2AA02E9C4}" v="110" dt="2025-11-14T16:22:10.562"/>
+    <p1510:client id="{C548CB1D-32AD-4A01-B31C-AFC1760A5C6F}" v="814" dt="2025-11-14T17:02:50.632"/>
     <p1510:client id="{C89215D8-8C39-B47C-C02E-ACF192385A8C}" v="325" dt="2025-11-14T12:57:50.253"/>
   </p1510:revLst>
 </p1510:revInfo>
+</file>
+
+<file path=ppt/changesInfos/changesInfo1.xml><?xml version="1.0" encoding="utf-8"?>
+<pc:chgInfo xmlns:a="http://schemas.openxmlformats.org/drawingml/2006/main" xmlns:r="http://schemas.openxmlformats.org/officeDocument/2006/relationships" xmlns:ac="http://schemas.microsoft.com/office/drawing/2013/main/command" xmlns:pc="http://schemas.microsoft.com/office/powerpoint/2013/main/command">
+  <pc:docChgLst>
+    <pc:chgData name="#LWIN MOE OO#" userId="S::c250007@e.ntu.edu.sg::1dd09941-d6d3-49cc-acff-7c552bc2aac0" providerId="AD" clId="Web-{233D6F5B-C1A0-A1F3-70BA-4B6B99DB0023}"/>
+    <pc:docChg chg="addSld modSld">
+      <pc:chgData name="#LWIN MOE OO#" userId="S::c250007@e.ntu.edu.sg::1dd09941-d6d3-49cc-acff-7c552bc2aac0" providerId="AD" clId="Web-{233D6F5B-C1A0-A1F3-70BA-4B6B99DB0023}" dt="2025-11-08T13:50:58.960" v="48"/>
+      <pc:docMkLst>
+        <pc:docMk/>
+      </pc:docMkLst>
+      <pc:sldChg chg="modSp">
+        <pc:chgData name="#LWIN MOE OO#" userId="S::c250007@e.ntu.edu.sg::1dd09941-d6d3-49cc-acff-7c552bc2aac0" providerId="AD" clId="Web-{233D6F5B-C1A0-A1F3-70BA-4B6B99DB0023}" dt="2025-11-08T13:50:54.148" v="47" actId="20577"/>
+        <pc:sldMkLst>
+          <pc:docMk/>
+          <pc:sldMk cId="109857222" sldId="256"/>
+        </pc:sldMkLst>
+        <pc:spChg chg="mod">
+          <ac:chgData name="#LWIN MOE OO#" userId="S::c250007@e.ntu.edu.sg::1dd09941-d6d3-49cc-acff-7c552bc2aac0" providerId="AD" clId="Web-{233D6F5B-C1A0-A1F3-70BA-4B6B99DB0023}" dt="2025-11-08T13:50:30.489" v="40" actId="20577"/>
+          <ac:spMkLst>
+            <pc:docMk/>
+            <pc:sldMk cId="109857222" sldId="256"/>
+            <ac:spMk id="2" creationId="{00000000-0000-0000-0000-000000000000}"/>
+          </ac:spMkLst>
+        </pc:spChg>
+        <pc:spChg chg="mod">
+          <ac:chgData name="#LWIN MOE OO#" userId="S::c250007@e.ntu.edu.sg::1dd09941-d6d3-49cc-acff-7c552bc2aac0" providerId="AD" clId="Web-{233D6F5B-C1A0-A1F3-70BA-4B6B99DB0023}" dt="2025-11-08T13:50:54.148" v="47" actId="20577"/>
+          <ac:spMkLst>
+            <pc:docMk/>
+            <pc:sldMk cId="109857222" sldId="256"/>
+            <ac:spMk id="3" creationId="{00000000-0000-0000-0000-000000000000}"/>
+          </ac:spMkLst>
+        </pc:spChg>
+      </pc:sldChg>
+      <pc:sldChg chg="new">
+        <pc:chgData name="#LWIN MOE OO#" userId="S::c250007@e.ntu.edu.sg::1dd09941-d6d3-49cc-acff-7c552bc2aac0" providerId="AD" clId="Web-{233D6F5B-C1A0-A1F3-70BA-4B6B99DB0023}" dt="2025-11-08T13:50:58.960" v="48"/>
+        <pc:sldMkLst>
+          <pc:docMk/>
+          <pc:sldMk cId="2703079337" sldId="257"/>
+        </pc:sldMkLst>
+      </pc:sldChg>
+    </pc:docChg>
+  </pc:docChgLst>
+  <pc:docChgLst>
+    <pc:chgData name="#LWIN MOE OO#" userId="S::c250007@e.ntu.edu.sg::1dd09941-d6d3-49cc-acff-7c552bc2aac0" providerId="AD" clId="Web-{2C091672-69B1-0874-4C84-10AB0A900DDD}"/>
+    <pc:docChg chg="modSld">
+      <pc:chgData name="#LWIN MOE OO#" userId="S::c250007@e.ntu.edu.sg::1dd09941-d6d3-49cc-acff-7c552bc2aac0" providerId="AD" clId="Web-{2C091672-69B1-0874-4C84-10AB0A900DDD}" dt="2025-11-14T16:34:17.982" v="175" actId="20577"/>
+      <pc:docMkLst>
+        <pc:docMk/>
+      </pc:docMkLst>
+      <pc:sldChg chg="modNotes">
+        <pc:chgData name="#LWIN MOE OO#" userId="S::c250007@e.ntu.edu.sg::1dd09941-d6d3-49cc-acff-7c552bc2aac0" providerId="AD" clId="Web-{2C091672-69B1-0874-4C84-10AB0A900DDD}" dt="2025-11-14T15:59:08.987" v="3"/>
+        <pc:sldMkLst>
+          <pc:docMk/>
+          <pc:sldMk cId="109857222" sldId="256"/>
+        </pc:sldMkLst>
+      </pc:sldChg>
+      <pc:sldChg chg="modNotes">
+        <pc:chgData name="#LWIN MOE OO#" userId="S::c250007@e.ntu.edu.sg::1dd09941-d6d3-49cc-acff-7c552bc2aac0" providerId="AD" clId="Web-{2C091672-69B1-0874-4C84-10AB0A900DDD}" dt="2025-11-14T15:59:11.518" v="5"/>
+        <pc:sldMkLst>
+          <pc:docMk/>
+          <pc:sldMk cId="78934428" sldId="258"/>
+        </pc:sldMkLst>
+      </pc:sldChg>
+      <pc:sldChg chg="modNotes">
+        <pc:chgData name="#LWIN MOE OO#" userId="S::c250007@e.ntu.edu.sg::1dd09941-d6d3-49cc-acff-7c552bc2aac0" providerId="AD" clId="Web-{2C091672-69B1-0874-4C84-10AB0A900DDD}" dt="2025-11-14T15:59:17.503" v="10"/>
+        <pc:sldMkLst>
+          <pc:docMk/>
+          <pc:sldMk cId="2997418902" sldId="259"/>
+        </pc:sldMkLst>
+      </pc:sldChg>
+      <pc:sldChg chg="addSp modSp modNotes">
+        <pc:chgData name="#LWIN MOE OO#" userId="S::c250007@e.ntu.edu.sg::1dd09941-d6d3-49cc-acff-7c552bc2aac0" providerId="AD" clId="Web-{2C091672-69B1-0874-4C84-10AB0A900DDD}" dt="2025-11-14T16:34:17.982" v="175" actId="20577"/>
+        <pc:sldMkLst>
+          <pc:docMk/>
+          <pc:sldMk cId="2462205672" sldId="265"/>
+        </pc:sldMkLst>
+        <pc:spChg chg="add mod">
+          <ac:chgData name="#LWIN MOE OO#" userId="S::c250007@e.ntu.edu.sg::1dd09941-d6d3-49cc-acff-7c552bc2aac0" providerId="AD" clId="Web-{2C091672-69B1-0874-4C84-10AB0A900DDD}" dt="2025-11-14T16:24:40.121" v="28" actId="1076"/>
+          <ac:spMkLst>
+            <pc:docMk/>
+            <pc:sldMk cId="2462205672" sldId="265"/>
+            <ac:spMk id="4" creationId="{70F2E48F-7CB5-6571-34AD-D8664223C664}"/>
+          </ac:spMkLst>
+        </pc:spChg>
+        <pc:spChg chg="add mod">
+          <ac:chgData name="#LWIN MOE OO#" userId="S::c250007@e.ntu.edu.sg::1dd09941-d6d3-49cc-acff-7c552bc2aac0" providerId="AD" clId="Web-{2C091672-69B1-0874-4C84-10AB0A900DDD}" dt="2025-11-14T16:24:55.502" v="38" actId="20577"/>
+          <ac:spMkLst>
+            <pc:docMk/>
+            <pc:sldMk cId="2462205672" sldId="265"/>
+            <ac:spMk id="8" creationId="{39B55849-2123-7054-6DE2-6C134003EB17}"/>
+          </ac:spMkLst>
+        </pc:spChg>
+        <pc:spChg chg="add mod">
+          <ac:chgData name="#LWIN MOE OO#" userId="S::c250007@e.ntu.edu.sg::1dd09941-d6d3-49cc-acff-7c552bc2aac0" providerId="AD" clId="Web-{2C091672-69B1-0874-4C84-10AB0A900DDD}" dt="2025-11-14T16:34:17.982" v="175" actId="20577"/>
+          <ac:spMkLst>
+            <pc:docMk/>
+            <pc:sldMk cId="2462205672" sldId="265"/>
+            <ac:spMk id="9" creationId="{281310B1-F9EA-A4E0-377C-64BEE7D6E290}"/>
+          </ac:spMkLst>
+        </pc:spChg>
+        <pc:picChg chg="mod">
+          <ac:chgData name="#LWIN MOE OO#" userId="S::c250007@e.ntu.edu.sg::1dd09941-d6d3-49cc-acff-7c552bc2aac0" providerId="AD" clId="Web-{2C091672-69B1-0874-4C84-10AB0A900DDD}" dt="2025-11-14T16:24:44.621" v="32" actId="1076"/>
+          <ac:picMkLst>
+            <pc:docMk/>
+            <pc:sldMk cId="2462205672" sldId="265"/>
+            <ac:picMk id="3" creationId="{0D01EC61-CF9B-8E6F-09B7-2E5824822DFC}"/>
+          </ac:picMkLst>
+        </pc:picChg>
+        <pc:picChg chg="mod">
+          <ac:chgData name="#LWIN MOE OO#" userId="S::c250007@e.ntu.edu.sg::1dd09941-d6d3-49cc-acff-7c552bc2aac0" providerId="AD" clId="Web-{2C091672-69B1-0874-4C84-10AB0A900DDD}" dt="2025-11-14T16:34:02.795" v="163" actId="1076"/>
+          <ac:picMkLst>
+            <pc:docMk/>
+            <pc:sldMk cId="2462205672" sldId="265"/>
+            <ac:picMk id="6" creationId="{03C84618-CF57-75F3-0D0B-60BBBC360A23}"/>
+          </ac:picMkLst>
+        </pc:picChg>
+        <pc:picChg chg="mod">
+          <ac:chgData name="#LWIN MOE OO#" userId="S::c250007@e.ntu.edu.sg::1dd09941-d6d3-49cc-acff-7c552bc2aac0" providerId="AD" clId="Web-{2C091672-69B1-0874-4C84-10AB0A900DDD}" dt="2025-11-14T16:24:19.915" v="19" actId="1076"/>
+          <ac:picMkLst>
+            <pc:docMk/>
+            <pc:sldMk cId="2462205672" sldId="265"/>
+            <ac:picMk id="7" creationId="{105B33BC-AEF2-0242-01E0-35118351F210}"/>
+          </ac:picMkLst>
+        </pc:picChg>
+        <pc:picChg chg="mod">
+          <ac:chgData name="#LWIN MOE OO#" userId="S::c250007@e.ntu.edu.sg::1dd09941-d6d3-49cc-acff-7c552bc2aac0" providerId="AD" clId="Web-{2C091672-69B1-0874-4C84-10AB0A900DDD}" dt="2025-11-14T16:24:46.152" v="33" actId="1076"/>
+          <ac:picMkLst>
+            <pc:docMk/>
+            <pc:sldMk cId="2462205672" sldId="265"/>
+            <ac:picMk id="10" creationId="{BEBE4ACC-665A-8BD3-BF74-F41342CE4126}"/>
+          </ac:picMkLst>
+        </pc:picChg>
+      </pc:sldChg>
+      <pc:sldChg chg="modNotes">
+        <pc:chgData name="#LWIN MOE OO#" userId="S::c250007@e.ntu.edu.sg::1dd09941-d6d3-49cc-acff-7c552bc2aac0" providerId="AD" clId="Web-{2C091672-69B1-0874-4C84-10AB0A900DDD}" dt="2025-11-14T16:00:37.429" v="16"/>
+        <pc:sldMkLst>
+          <pc:docMk/>
+          <pc:sldMk cId="919294963" sldId="266"/>
+        </pc:sldMkLst>
+      </pc:sldChg>
+    </pc:docChg>
+  </pc:docChgLst>
+  <pc:docChgLst>
+    <pc:chgData name="#MURPHY WONG KAH LEONG#" userId="215c4a66-cb52-4461-8f6c-adbfeca3fdd7" providerId="ADAL" clId="{531D5B17-E35C-4949-8022-F8AF49343C73}"/>
+    <pc:docChg chg="undo custSel addSld delSld modSld modMainMaster">
+      <pc:chgData name="#MURPHY WONG KAH LEONG#" userId="215c4a66-cb52-4461-8f6c-adbfeca3fdd7" providerId="ADAL" clId="{531D5B17-E35C-4949-8022-F8AF49343C73}" dt="2025-11-12T05:19:57.349" v="78"/>
+      <pc:docMkLst>
+        <pc:docMk/>
+      </pc:docMkLst>
+      <pc:sldChg chg="addSp delSp modSp mod modClrScheme delDesignElem chgLayout">
+        <pc:chgData name="#MURPHY WONG KAH LEONG#" userId="215c4a66-cb52-4461-8f6c-adbfeca3fdd7" providerId="ADAL" clId="{531D5B17-E35C-4949-8022-F8AF49343C73}" dt="2025-11-12T05:19:44.481" v="73" actId="20577"/>
+        <pc:sldMkLst>
+          <pc:docMk/>
+          <pc:sldMk cId="78934428" sldId="258"/>
+        </pc:sldMkLst>
+        <pc:spChg chg="mod ord">
+          <ac:chgData name="#MURPHY WONG KAH LEONG#" userId="215c4a66-cb52-4461-8f6c-adbfeca3fdd7" providerId="ADAL" clId="{531D5B17-E35C-4949-8022-F8AF49343C73}" dt="2025-11-12T05:18:20.015" v="26" actId="700"/>
+          <ac:spMkLst>
+            <pc:docMk/>
+            <pc:sldMk cId="78934428" sldId="258"/>
+            <ac:spMk id="2" creationId="{40408F4A-FC08-BA83-1DBF-AB7710D33D22}"/>
+          </ac:spMkLst>
+        </pc:spChg>
+        <pc:spChg chg="add mod ord">
+          <ac:chgData name="#MURPHY WONG KAH LEONG#" userId="215c4a66-cb52-4461-8f6c-adbfeca3fdd7" providerId="ADAL" clId="{531D5B17-E35C-4949-8022-F8AF49343C73}" dt="2025-11-12T05:19:44.481" v="73" actId="20577"/>
+          <ac:spMkLst>
+            <pc:docMk/>
+            <pc:sldMk cId="78934428" sldId="258"/>
+            <ac:spMk id="5" creationId="{6744CE58-4E65-E0B0-6254-CCCFB0EE1140}"/>
+          </ac:spMkLst>
+        </pc:spChg>
+        <pc:spChg chg="mod ord">
+          <ac:chgData name="#MURPHY WONG KAH LEONG#" userId="215c4a66-cb52-4461-8f6c-adbfeca3fdd7" providerId="ADAL" clId="{531D5B17-E35C-4949-8022-F8AF49343C73}" dt="2025-11-12T05:18:20.015" v="26" actId="700"/>
+          <ac:spMkLst>
+            <pc:docMk/>
+            <pc:sldMk cId="78934428" sldId="258"/>
+            <ac:spMk id="8" creationId="{F48D0F77-D87C-D055-A873-4DAB9011810E}"/>
+          </ac:spMkLst>
+        </pc:spChg>
+        <pc:picChg chg="mod">
+          <ac:chgData name="#MURPHY WONG KAH LEONG#" userId="215c4a66-cb52-4461-8f6c-adbfeca3fdd7" providerId="ADAL" clId="{531D5B17-E35C-4949-8022-F8AF49343C73}" dt="2025-11-12T05:18:36.114" v="28" actId="208"/>
+          <ac:picMkLst>
+            <pc:docMk/>
+            <pc:sldMk cId="78934428" sldId="258"/>
+            <ac:picMk id="4" creationId="{FA9CCE84-F783-D51B-F8C5-F843704FEFDE}"/>
+          </ac:picMkLst>
+        </pc:picChg>
+      </pc:sldChg>
+      <pc:sldChg chg="addSp delSp modSp mod modClrScheme chgLayout">
+        <pc:chgData name="#MURPHY WONG KAH LEONG#" userId="215c4a66-cb52-4461-8f6c-adbfeca3fdd7" providerId="ADAL" clId="{531D5B17-E35C-4949-8022-F8AF49343C73}" dt="2025-11-12T05:19:40.309" v="59" actId="20577"/>
+        <pc:sldMkLst>
+          <pc:docMk/>
+          <pc:sldMk cId="2997418902" sldId="259"/>
+        </pc:sldMkLst>
+        <pc:spChg chg="mod ord">
+          <ac:chgData name="#MURPHY WONG KAH LEONG#" userId="215c4a66-cb52-4461-8f6c-adbfeca3fdd7" providerId="ADAL" clId="{531D5B17-E35C-4949-8022-F8AF49343C73}" dt="2025-11-12T05:17:39.708" v="25" actId="700"/>
+          <ac:spMkLst>
+            <pc:docMk/>
+            <pc:sldMk cId="2997418902" sldId="259"/>
+            <ac:spMk id="2" creationId="{1A0864BF-ACBB-23D5-B3AE-21F901E6EDA5}"/>
+          </ac:spMkLst>
+        </pc:spChg>
+        <pc:spChg chg="add mod ord">
+          <ac:chgData name="#MURPHY WONG KAH LEONG#" userId="215c4a66-cb52-4461-8f6c-adbfeca3fdd7" providerId="ADAL" clId="{531D5B17-E35C-4949-8022-F8AF49343C73}" dt="2025-11-12T05:19:40.309" v="59" actId="20577"/>
+          <ac:spMkLst>
+            <pc:docMk/>
+            <pc:sldMk cId="2997418902" sldId="259"/>
+            <ac:spMk id="6" creationId="{7453184F-6190-5D19-33CF-43374C24C7C8}"/>
+          </ac:spMkLst>
+        </pc:spChg>
+      </pc:sldChg>
+      <pc:sldChg chg="addSp delSp modSp mod modClrScheme chgLayout">
+        <pc:chgData name="#MURPHY WONG KAH LEONG#" userId="215c4a66-cb52-4461-8f6c-adbfeca3fdd7" providerId="ADAL" clId="{531D5B17-E35C-4949-8022-F8AF49343C73}" dt="2025-11-12T05:19:53.063" v="75"/>
+        <pc:sldMkLst>
+          <pc:docMk/>
+          <pc:sldMk cId="266668027" sldId="261"/>
+        </pc:sldMkLst>
+        <pc:spChg chg="mod ord">
+          <ac:chgData name="#MURPHY WONG KAH LEONG#" userId="215c4a66-cb52-4461-8f6c-adbfeca3fdd7" providerId="ADAL" clId="{531D5B17-E35C-4949-8022-F8AF49343C73}" dt="2025-11-12T05:19:10.305" v="31" actId="700"/>
+          <ac:spMkLst>
+            <pc:docMk/>
+            <pc:sldMk cId="266668027" sldId="261"/>
+            <ac:spMk id="2" creationId="{AC61A561-3594-859A-EFB9-DFD47EFB43D1}"/>
+          </ac:spMkLst>
+        </pc:spChg>
+        <pc:spChg chg="add mod ord">
+          <ac:chgData name="#MURPHY WONG KAH LEONG#" userId="215c4a66-cb52-4461-8f6c-adbfeca3fdd7" providerId="ADAL" clId="{531D5B17-E35C-4949-8022-F8AF49343C73}" dt="2025-11-12T05:19:53.063" v="75"/>
+          <ac:spMkLst>
+            <pc:docMk/>
+            <pc:sldMk cId="266668027" sldId="261"/>
+            <ac:spMk id="5" creationId="{0A0FF736-8C72-DC2C-F0D4-7D55C464BE73}"/>
+          </ac:spMkLst>
+        </pc:spChg>
+      </pc:sldChg>
+      <pc:sldChg chg="addSp delSp modSp mod modClrScheme chgLayout">
+        <pc:chgData name="#MURPHY WONG KAH LEONG#" userId="215c4a66-cb52-4461-8f6c-adbfeca3fdd7" providerId="ADAL" clId="{531D5B17-E35C-4949-8022-F8AF49343C73}" dt="2025-11-12T05:19:51.131" v="74"/>
+        <pc:sldMkLst>
+          <pc:docMk/>
+          <pc:sldMk cId="2027014821" sldId="262"/>
+        </pc:sldMkLst>
+        <pc:spChg chg="mod ord">
+          <ac:chgData name="#MURPHY WONG KAH LEONG#" userId="215c4a66-cb52-4461-8f6c-adbfeca3fdd7" providerId="ADAL" clId="{531D5B17-E35C-4949-8022-F8AF49343C73}" dt="2025-11-12T05:19:10.305" v="31" actId="700"/>
+          <ac:spMkLst>
+            <pc:docMk/>
+            <pc:sldMk cId="2027014821" sldId="262"/>
+            <ac:spMk id="2" creationId="{FB135779-5683-AA40-93FB-4719B6EEF287}"/>
+          </ac:spMkLst>
+        </pc:spChg>
+        <pc:spChg chg="add mod ord">
+          <ac:chgData name="#MURPHY WONG KAH LEONG#" userId="215c4a66-cb52-4461-8f6c-adbfeca3fdd7" providerId="ADAL" clId="{531D5B17-E35C-4949-8022-F8AF49343C73}" dt="2025-11-12T05:19:51.131" v="74"/>
+          <ac:spMkLst>
+            <pc:docMk/>
+            <pc:sldMk cId="2027014821" sldId="262"/>
+            <ac:spMk id="5" creationId="{49EB4D8A-7185-BB8C-869D-37F826C0CAAA}"/>
+          </ac:spMkLst>
+        </pc:spChg>
+      </pc:sldChg>
+      <pc:sldChg chg="addSp delSp modSp mod modClrScheme chgLayout">
+        <pc:chgData name="#MURPHY WONG KAH LEONG#" userId="215c4a66-cb52-4461-8f6c-adbfeca3fdd7" providerId="ADAL" clId="{531D5B17-E35C-4949-8022-F8AF49343C73}" dt="2025-11-12T05:19:54.400" v="76"/>
+        <pc:sldMkLst>
+          <pc:docMk/>
+          <pc:sldMk cId="3750020553" sldId="263"/>
+        </pc:sldMkLst>
+        <pc:spChg chg="mod ord">
+          <ac:chgData name="#MURPHY WONG KAH LEONG#" userId="215c4a66-cb52-4461-8f6c-adbfeca3fdd7" providerId="ADAL" clId="{531D5B17-E35C-4949-8022-F8AF49343C73}" dt="2025-11-12T05:19:10.305" v="31" actId="700"/>
+          <ac:spMkLst>
+            <pc:docMk/>
+            <pc:sldMk cId="3750020553" sldId="263"/>
+            <ac:spMk id="2" creationId="{395D3138-89EB-57BB-2ABB-116125B8BE8E}"/>
+          </ac:spMkLst>
+        </pc:spChg>
+        <pc:spChg chg="add mod ord">
+          <ac:chgData name="#MURPHY WONG KAH LEONG#" userId="215c4a66-cb52-4461-8f6c-adbfeca3fdd7" providerId="ADAL" clId="{531D5B17-E35C-4949-8022-F8AF49343C73}" dt="2025-11-12T05:19:54.400" v="76"/>
+          <ac:spMkLst>
+            <pc:docMk/>
+            <pc:sldMk cId="3750020553" sldId="263"/>
+            <ac:spMk id="5" creationId="{1E530C0E-3F57-A88D-4925-2F34FD021BFF}"/>
+          </ac:spMkLst>
+        </pc:spChg>
+      </pc:sldChg>
+      <pc:sldChg chg="addSp delSp modSp mod modClrScheme chgLayout">
+        <pc:chgData name="#MURPHY WONG KAH LEONG#" userId="215c4a66-cb52-4461-8f6c-adbfeca3fdd7" providerId="ADAL" clId="{531D5B17-E35C-4949-8022-F8AF49343C73}" dt="2025-11-12T05:19:56.073" v="77"/>
+        <pc:sldMkLst>
+          <pc:docMk/>
+          <pc:sldMk cId="2068233959" sldId="264"/>
+        </pc:sldMkLst>
+        <pc:spChg chg="mod ord">
+          <ac:chgData name="#MURPHY WONG KAH LEONG#" userId="215c4a66-cb52-4461-8f6c-adbfeca3fdd7" providerId="ADAL" clId="{531D5B17-E35C-4949-8022-F8AF49343C73}" dt="2025-11-12T05:19:10.305" v="31" actId="700"/>
+          <ac:spMkLst>
+            <pc:docMk/>
+            <pc:sldMk cId="2068233959" sldId="264"/>
+            <ac:spMk id="2" creationId="{A57A9AEF-873B-144E-EBE0-6528719D2D6B}"/>
+          </ac:spMkLst>
+        </pc:spChg>
+        <pc:spChg chg="add mod ord">
+          <ac:chgData name="#MURPHY WONG KAH LEONG#" userId="215c4a66-cb52-4461-8f6c-adbfeca3fdd7" providerId="ADAL" clId="{531D5B17-E35C-4949-8022-F8AF49343C73}" dt="2025-11-12T05:19:56.073" v="77"/>
+          <ac:spMkLst>
+            <pc:docMk/>
+            <pc:sldMk cId="2068233959" sldId="264"/>
+            <ac:spMk id="5" creationId="{977177D4-E785-218D-9157-2BFA68A32616}"/>
+          </ac:spMkLst>
+        </pc:spChg>
+      </pc:sldChg>
+      <pc:sldChg chg="addSp delSp modSp mod modClrScheme chgLayout">
+        <pc:chgData name="#MURPHY WONG KAH LEONG#" userId="215c4a66-cb52-4461-8f6c-adbfeca3fdd7" providerId="ADAL" clId="{531D5B17-E35C-4949-8022-F8AF49343C73}" dt="2025-11-12T05:19:57.349" v="78"/>
+        <pc:sldMkLst>
+          <pc:docMk/>
+          <pc:sldMk cId="2462205672" sldId="265"/>
+        </pc:sldMkLst>
+        <pc:spChg chg="mod ord">
+          <ac:chgData name="#MURPHY WONG KAH LEONG#" userId="215c4a66-cb52-4461-8f6c-adbfeca3fdd7" providerId="ADAL" clId="{531D5B17-E35C-4949-8022-F8AF49343C73}" dt="2025-11-12T05:19:10.305" v="31" actId="700"/>
+          <ac:spMkLst>
+            <pc:docMk/>
+            <pc:sldMk cId="2462205672" sldId="265"/>
+            <ac:spMk id="2" creationId="{975EEBF8-4966-1AA3-F6EB-0A5CD2A5035F}"/>
+          </ac:spMkLst>
+        </pc:spChg>
+        <pc:spChg chg="add mod ord">
+          <ac:chgData name="#MURPHY WONG KAH LEONG#" userId="215c4a66-cb52-4461-8f6c-adbfeca3fdd7" providerId="ADAL" clId="{531D5B17-E35C-4949-8022-F8AF49343C73}" dt="2025-11-12T05:19:57.349" v="78"/>
+          <ac:spMkLst>
+            <pc:docMk/>
+            <pc:sldMk cId="2462205672" sldId="265"/>
+            <ac:spMk id="5" creationId="{81CA29D8-BA1B-4FAC-19A7-9A257880D274}"/>
+          </ac:spMkLst>
+        </pc:spChg>
+      </pc:sldChg>
+      <pc:sldMasterChg chg="modSldLayout">
+        <pc:chgData name="#MURPHY WONG KAH LEONG#" userId="215c4a66-cb52-4461-8f6c-adbfeca3fdd7" providerId="ADAL" clId="{531D5B17-E35C-4949-8022-F8AF49343C73}" dt="2025-11-12T05:18:59.878" v="30" actId="14100"/>
+        <pc:sldMasterMkLst>
+          <pc:docMk/>
+          <pc:sldMasterMk cId="2460954070" sldId="2147483660"/>
+        </pc:sldMasterMkLst>
+        <pc:sldLayoutChg chg="addSp delSp modSp mod">
+          <pc:chgData name="#MURPHY WONG KAH LEONG#" userId="215c4a66-cb52-4461-8f6c-adbfeca3fdd7" providerId="ADAL" clId="{531D5B17-E35C-4949-8022-F8AF49343C73}" dt="2025-11-12T05:18:59.878" v="30" actId="14100"/>
+          <pc:sldLayoutMkLst>
+            <pc:docMk/>
+            <pc:sldMasterMk cId="2460954070" sldId="2147483660"/>
+            <pc:sldLayoutMk cId="949138452" sldId="2147483662"/>
+          </pc:sldLayoutMkLst>
+          <pc:spChg chg="mod">
+            <ac:chgData name="#MURPHY WONG KAH LEONG#" userId="215c4a66-cb52-4461-8f6c-adbfeca3fdd7" providerId="ADAL" clId="{531D5B17-E35C-4949-8022-F8AF49343C73}" dt="2025-11-12T05:18:59.878" v="30" actId="14100"/>
+            <ac:spMkLst>
+              <pc:docMk/>
+              <pc:sldMasterMk cId="2460954070" sldId="2147483660"/>
+              <pc:sldLayoutMk cId="949138452" sldId="2147483662"/>
+              <ac:spMk id="3" creationId="{00000000-0000-0000-0000-000000000000}"/>
+            </ac:spMkLst>
+          </pc:spChg>
+          <pc:spChg chg="add mod">
+            <ac:chgData name="#MURPHY WONG KAH LEONG#" userId="215c4a66-cb52-4461-8f6c-adbfeca3fdd7" providerId="ADAL" clId="{531D5B17-E35C-4949-8022-F8AF49343C73}" dt="2025-11-12T05:15:54.023" v="16"/>
+            <ac:spMkLst>
+              <pc:docMk/>
+              <pc:sldMasterMk cId="2460954070" sldId="2147483660"/>
+              <pc:sldLayoutMk cId="949138452" sldId="2147483662"/>
+              <ac:spMk id="8" creationId="{365F286C-DFCA-7C2F-7250-B611DB627810}"/>
+            </ac:spMkLst>
+          </pc:spChg>
+        </pc:sldLayoutChg>
+        <pc:sldLayoutChg chg="addSp modSp">
+          <pc:chgData name="#MURPHY WONG KAH LEONG#" userId="215c4a66-cb52-4461-8f6c-adbfeca3fdd7" providerId="ADAL" clId="{531D5B17-E35C-4949-8022-F8AF49343C73}" dt="2025-11-12T05:17:21.912" v="24"/>
+          <pc:sldLayoutMkLst>
+            <pc:docMk/>
+            <pc:sldMasterMk cId="2460954070" sldId="2147483660"/>
+            <pc:sldLayoutMk cId="1203092039" sldId="2147483664"/>
+          </pc:sldLayoutMkLst>
+          <pc:spChg chg="add mod">
+            <ac:chgData name="#MURPHY WONG KAH LEONG#" userId="215c4a66-cb52-4461-8f6c-adbfeca3fdd7" providerId="ADAL" clId="{531D5B17-E35C-4949-8022-F8AF49343C73}" dt="2025-11-12T05:17:21.912" v="24"/>
+            <ac:spMkLst>
+              <pc:docMk/>
+              <pc:sldMasterMk cId="2460954070" sldId="2147483660"/>
+              <pc:sldLayoutMk cId="1203092039" sldId="2147483664"/>
+              <ac:spMk id="8" creationId="{38395949-4A38-F4E0-1017-CE2B0CC31BFA}"/>
+            </ac:spMkLst>
+          </pc:spChg>
+        </pc:sldLayoutChg>
+      </pc:sldMasterChg>
+    </pc:docChg>
+  </pc:docChgLst>
+  <pc:docChgLst>
+    <pc:chgData name="#PANG WEI JIE#" userId="S::pang0270@e.ntu.edu.sg::72bcae44-2dd7-4853-8947-6d110cf21fa4" providerId="AD" clId="Web-{280131EC-E028-9B0F-FDF1-4E7BF93DAEB6}"/>
+    <pc:docChg chg="modSld">
+      <pc:chgData name="#PANG WEI JIE#" userId="S::pang0270@e.ntu.edu.sg::72bcae44-2dd7-4853-8947-6d110cf21fa4" providerId="AD" clId="Web-{280131EC-E028-9B0F-FDF1-4E7BF93DAEB6}" dt="2025-11-15T03:25:19.875" v="152"/>
+      <pc:docMkLst>
+        <pc:docMk/>
+      </pc:docMkLst>
+      <pc:sldChg chg="modNotes">
+        <pc:chgData name="#PANG WEI JIE#" userId="S::pang0270@e.ntu.edu.sg::72bcae44-2dd7-4853-8947-6d110cf21fa4" providerId="AD" clId="Web-{280131EC-E028-9B0F-FDF1-4E7BF93DAEB6}" dt="2025-11-15T03:00:10.890" v="142"/>
+        <pc:sldMkLst>
+          <pc:docMk/>
+          <pc:sldMk cId="2027014821" sldId="262"/>
+        </pc:sldMkLst>
+      </pc:sldChg>
+      <pc:sldChg chg="modNotes">
+        <pc:chgData name="#PANG WEI JIE#" userId="S::pang0270@e.ntu.edu.sg::72bcae44-2dd7-4853-8947-6d110cf21fa4" providerId="AD" clId="Web-{280131EC-E028-9B0F-FDF1-4E7BF93DAEB6}" dt="2025-11-15T03:25:19.875" v="152"/>
+        <pc:sldMkLst>
+          <pc:docMk/>
+          <pc:sldMk cId="919294963" sldId="266"/>
+        </pc:sldMkLst>
+      </pc:sldChg>
+      <pc:sldChg chg="modNotes">
+        <pc:chgData name="#PANG WEI JIE#" userId="S::pang0270@e.ntu.edu.sg::72bcae44-2dd7-4853-8947-6d110cf21fa4" providerId="AD" clId="Web-{280131EC-E028-9B0F-FDF1-4E7BF93DAEB6}" dt="2025-11-15T01:41:47.859" v="76"/>
+        <pc:sldMkLst>
+          <pc:docMk/>
+          <pc:sldMk cId="2938145853" sldId="267"/>
+        </pc:sldMkLst>
+      </pc:sldChg>
+      <pc:sldChg chg="addSp modSp">
+        <pc:chgData name="#PANG WEI JIE#" userId="S::pang0270@e.ntu.edu.sg::72bcae44-2dd7-4853-8947-6d110cf21fa4" providerId="AD" clId="Web-{280131EC-E028-9B0F-FDF1-4E7BF93DAEB6}" dt="2025-11-15T02:41:40.733" v="139" actId="1076"/>
+        <pc:sldMkLst>
+          <pc:docMk/>
+          <pc:sldMk cId="2290913640" sldId="268"/>
+        </pc:sldMkLst>
+        <pc:picChg chg="add mod">
+          <ac:chgData name="#PANG WEI JIE#" userId="S::pang0270@e.ntu.edu.sg::72bcae44-2dd7-4853-8947-6d110cf21fa4" providerId="AD" clId="Web-{280131EC-E028-9B0F-FDF1-4E7BF93DAEB6}" dt="2025-11-15T02:41:40.733" v="139" actId="1076"/>
+          <ac:picMkLst>
+            <pc:docMk/>
+            <pc:sldMk cId="2290913640" sldId="268"/>
+            <ac:picMk id="11" creationId="{EB53A4D0-0FDE-D5DB-6B7B-34C79A7874F3}"/>
+          </ac:picMkLst>
+        </pc:picChg>
+        <pc:picChg chg="mod">
+          <ac:chgData name="#PANG WEI JIE#" userId="S::pang0270@e.ntu.edu.sg::72bcae44-2dd7-4853-8947-6d110cf21fa4" providerId="AD" clId="Web-{280131EC-E028-9B0F-FDF1-4E7BF93DAEB6}" dt="2025-11-15T02:40:29.041" v="137" actId="1076"/>
+          <ac:picMkLst>
+            <pc:docMk/>
+            <pc:sldMk cId="2290913640" sldId="268"/>
+            <ac:picMk id="18" creationId="{5D9D5CD2-7ECE-3F4B-B248-3599FDEB8EDE}"/>
+          </ac:picMkLst>
+        </pc:picChg>
+      </pc:sldChg>
+    </pc:docChg>
+  </pc:docChgLst>
+  <pc:docChgLst>
+    <pc:chgData name="#MUHAMMAD FIRDAUS BIN KAMARUDIN#" userId="S::firdaus009@e.ntu.edu.sg::b477d086-9979-4955-b571-88dd09147e74" providerId="AD" clId="Web-{ABDB5723-FFAA-C02C-C158-10D6663CE098}"/>
+    <pc:docChg chg="modSld">
+      <pc:chgData name="#MUHAMMAD FIRDAUS BIN KAMARUDIN#" userId="S::firdaus009@e.ntu.edu.sg::b477d086-9979-4955-b571-88dd09147e74" providerId="AD" clId="Web-{ABDB5723-FFAA-C02C-C158-10D6663CE098}" dt="2025-11-15T03:30:41.279" v="621"/>
+      <pc:docMkLst>
+        <pc:docMk/>
+      </pc:docMkLst>
+      <pc:sldChg chg="modSp modNotes">
+        <pc:chgData name="#MUHAMMAD FIRDAUS BIN KAMARUDIN#" userId="S::firdaus009@e.ntu.edu.sg::b477d086-9979-4955-b571-88dd09147e74" providerId="AD" clId="Web-{ABDB5723-FFAA-C02C-C158-10D6663CE098}" dt="2025-11-15T03:26:25.559" v="238"/>
+        <pc:sldMkLst>
+          <pc:docMk/>
+          <pc:sldMk cId="2997418902" sldId="259"/>
+        </pc:sldMkLst>
+        <pc:spChg chg="mod">
+          <ac:chgData name="#MUHAMMAD FIRDAUS BIN KAMARUDIN#" userId="S::firdaus009@e.ntu.edu.sg::b477d086-9979-4955-b571-88dd09147e74" providerId="AD" clId="Web-{ABDB5723-FFAA-C02C-C158-10D6663CE098}" dt="2025-11-15T03:15:19.383" v="58" actId="20577"/>
+          <ac:spMkLst>
+            <pc:docMk/>
+            <pc:sldMk cId="2997418902" sldId="259"/>
+            <ac:spMk id="6" creationId="{7453184F-6190-5D19-33CF-43374C24C7C8}"/>
+          </ac:spMkLst>
+        </pc:spChg>
+      </pc:sldChg>
+      <pc:sldChg chg="modSp modNotes">
+        <pc:chgData name="#MUHAMMAD FIRDAUS BIN KAMARUDIN#" userId="S::firdaus009@e.ntu.edu.sg::b477d086-9979-4955-b571-88dd09147e74" providerId="AD" clId="Web-{ABDB5723-FFAA-C02C-C158-10D6663CE098}" dt="2025-11-15T03:30:41.279" v="621"/>
+        <pc:sldMkLst>
+          <pc:docMk/>
+          <pc:sldMk cId="266668027" sldId="261"/>
+        </pc:sldMkLst>
+        <pc:spChg chg="mod">
+          <ac:chgData name="#MUHAMMAD FIRDAUS BIN KAMARUDIN#" userId="S::firdaus009@e.ntu.edu.sg::b477d086-9979-4955-b571-88dd09147e74" providerId="AD" clId="Web-{ABDB5723-FFAA-C02C-C158-10D6663CE098}" dt="2025-11-14T15:52:08.397" v="5" actId="1076"/>
+          <ac:spMkLst>
+            <pc:docMk/>
+            <pc:sldMk cId="266668027" sldId="261"/>
+            <ac:spMk id="5" creationId="{0A0FF736-8C72-DC2C-F0D4-7D55C464BE73}"/>
+          </ac:spMkLst>
+        </pc:spChg>
+        <pc:picChg chg="mod">
+          <ac:chgData name="#MUHAMMAD FIRDAUS BIN KAMARUDIN#" userId="S::firdaus009@e.ntu.edu.sg::b477d086-9979-4955-b571-88dd09147e74" providerId="AD" clId="Web-{ABDB5723-FFAA-C02C-C158-10D6663CE098}" dt="2025-11-15T03:10:57.425" v="9" actId="14100"/>
+          <ac:picMkLst>
+            <pc:docMk/>
+            <pc:sldMk cId="266668027" sldId="261"/>
+            <ac:picMk id="6" creationId="{0EBAC5FA-08C4-6A86-6B2C-5C62C023B865}"/>
+          </ac:picMkLst>
+        </pc:picChg>
+        <pc:picChg chg="mod">
+          <ac:chgData name="#MUHAMMAD FIRDAUS BIN KAMARUDIN#" userId="S::firdaus009@e.ntu.edu.sg::b477d086-9979-4955-b571-88dd09147e74" providerId="AD" clId="Web-{ABDB5723-FFAA-C02C-C158-10D6663CE098}" dt="2025-11-14T15:52:03.850" v="4" actId="14100"/>
+          <ac:picMkLst>
+            <pc:docMk/>
+            <pc:sldMk cId="266668027" sldId="261"/>
+            <ac:picMk id="7" creationId="{E25CA0FA-5429-744D-806D-5A6B2F54FFBD}"/>
+          </ac:picMkLst>
+        </pc:picChg>
+      </pc:sldChg>
+    </pc:docChg>
+  </pc:docChgLst>
+  <pc:docChgLst>
+    <pc:chgData name="#MURPHY WONG KAH LEONG#" userId="S::murp0002@e.ntu.edu.sg::215c4a66-cb52-4461-8f6c-adbfeca3fdd7" providerId="AD" clId="Web-{4C6671F5-C4A1-F1D8-FC7D-4866FE361830}"/>
+    <pc:docChg chg="addSld delSld modSld">
+      <pc:chgData name="#MURPHY WONG KAH LEONG#" userId="S::murp0002@e.ntu.edu.sg::215c4a66-cb52-4461-8f6c-adbfeca3fdd7" providerId="AD" clId="Web-{4C6671F5-C4A1-F1D8-FC7D-4866FE361830}" dt="2025-11-12T05:13:42.335" v="55" actId="20577"/>
+      <pc:docMkLst>
+        <pc:docMk/>
+      </pc:docMkLst>
+      <pc:sldChg chg="addSp delSp modSp new mod setBg">
+        <pc:chgData name="#MURPHY WONG KAH LEONG#" userId="S::murp0002@e.ntu.edu.sg::215c4a66-cb52-4461-8f6c-adbfeca3fdd7" providerId="AD" clId="Web-{4C6671F5-C4A1-F1D8-FC7D-4866FE361830}" dt="2025-11-12T05:13:42.335" v="55" actId="20577"/>
+        <pc:sldMkLst>
+          <pc:docMk/>
+          <pc:sldMk cId="78934428" sldId="258"/>
+        </pc:sldMkLst>
+        <pc:spChg chg="mod">
+          <ac:chgData name="#MURPHY WONG KAH LEONG#" userId="S::murp0002@e.ntu.edu.sg::215c4a66-cb52-4461-8f6c-adbfeca3fdd7" providerId="AD" clId="Web-{4C6671F5-C4A1-F1D8-FC7D-4866FE361830}" dt="2025-11-12T05:13:23.179" v="53"/>
+          <ac:spMkLst>
+            <pc:docMk/>
+            <pc:sldMk cId="78934428" sldId="258"/>
+            <ac:spMk id="2" creationId="{40408F4A-FC08-BA83-1DBF-AB7710D33D22}"/>
+          </ac:spMkLst>
+        </pc:spChg>
+        <pc:spChg chg="add mod">
+          <ac:chgData name="#MURPHY WONG KAH LEONG#" userId="S::murp0002@e.ntu.edu.sg::215c4a66-cb52-4461-8f6c-adbfeca3fdd7" providerId="AD" clId="Web-{4C6671F5-C4A1-F1D8-FC7D-4866FE361830}" dt="2025-11-12T05:13:42.335" v="55" actId="20577"/>
+          <ac:spMkLst>
+            <pc:docMk/>
+            <pc:sldMk cId="78934428" sldId="258"/>
+            <ac:spMk id="8" creationId="{F48D0F77-D87C-D055-A873-4DAB9011810E}"/>
+          </ac:spMkLst>
+        </pc:spChg>
+        <pc:picChg chg="add mod ord">
+          <ac:chgData name="#MURPHY WONG KAH LEONG#" userId="S::murp0002@e.ntu.edu.sg::215c4a66-cb52-4461-8f6c-adbfeca3fdd7" providerId="AD" clId="Web-{4C6671F5-C4A1-F1D8-FC7D-4866FE361830}" dt="2025-11-12T05:13:23.179" v="53"/>
+          <ac:picMkLst>
+            <pc:docMk/>
+            <pc:sldMk cId="78934428" sldId="258"/>
+            <ac:picMk id="4" creationId="{FA9CCE84-F783-D51B-F8C5-F843704FEFDE}"/>
+          </ac:picMkLst>
+        </pc:picChg>
+      </pc:sldChg>
+      <pc:sldChg chg="modSp add replId">
+        <pc:chgData name="#MURPHY WONG KAH LEONG#" userId="S::murp0002@e.ntu.edu.sg::215c4a66-cb52-4461-8f6c-adbfeca3fdd7" providerId="AD" clId="Web-{4C6671F5-C4A1-F1D8-FC7D-4866FE361830}" dt="2025-11-12T05:10:51.738" v="26" actId="20577"/>
+        <pc:sldMkLst>
+          <pc:docMk/>
+          <pc:sldMk cId="2997418902" sldId="259"/>
+        </pc:sldMkLst>
+        <pc:spChg chg="mod">
+          <ac:chgData name="#MURPHY WONG KAH LEONG#" userId="S::murp0002@e.ntu.edu.sg::215c4a66-cb52-4461-8f6c-adbfeca3fdd7" providerId="AD" clId="Web-{4C6671F5-C4A1-F1D8-FC7D-4866FE361830}" dt="2025-11-12T05:10:51.738" v="26" actId="20577"/>
+          <ac:spMkLst>
+            <pc:docMk/>
+            <pc:sldMk cId="2997418902" sldId="259"/>
+            <ac:spMk id="2" creationId="{1A0864BF-ACBB-23D5-B3AE-21F901E6EDA5}"/>
+          </ac:spMkLst>
+        </pc:spChg>
+      </pc:sldChg>
+      <pc:sldChg chg="modSp add replId">
+        <pc:chgData name="#MURPHY WONG KAH LEONG#" userId="S::murp0002@e.ntu.edu.sg::215c4a66-cb52-4461-8f6c-adbfeca3fdd7" providerId="AD" clId="Web-{4C6671F5-C4A1-F1D8-FC7D-4866FE361830}" dt="2025-11-12T05:11:34.786" v="32" actId="20577"/>
+        <pc:sldMkLst>
+          <pc:docMk/>
+          <pc:sldMk cId="266668027" sldId="261"/>
+        </pc:sldMkLst>
+        <pc:spChg chg="mod">
+          <ac:chgData name="#MURPHY WONG KAH LEONG#" userId="S::murp0002@e.ntu.edu.sg::215c4a66-cb52-4461-8f6c-adbfeca3fdd7" providerId="AD" clId="Web-{4C6671F5-C4A1-F1D8-FC7D-4866FE361830}" dt="2025-11-12T05:11:34.786" v="32" actId="20577"/>
+          <ac:spMkLst>
+            <pc:docMk/>
+            <pc:sldMk cId="266668027" sldId="261"/>
+            <ac:spMk id="2" creationId="{AC61A561-3594-859A-EFB9-DFD47EFB43D1}"/>
+          </ac:spMkLst>
+        </pc:spChg>
+      </pc:sldChg>
+      <pc:sldChg chg="modSp add replId">
+        <pc:chgData name="#MURPHY WONG KAH LEONG#" userId="S::murp0002@e.ntu.edu.sg::215c4a66-cb52-4461-8f6c-adbfeca3fdd7" providerId="AD" clId="Web-{4C6671F5-C4A1-F1D8-FC7D-4866FE361830}" dt="2025-11-12T05:11:42.005" v="35" actId="20577"/>
+        <pc:sldMkLst>
+          <pc:docMk/>
+          <pc:sldMk cId="2027014821" sldId="262"/>
+        </pc:sldMkLst>
+        <pc:spChg chg="mod">
+          <ac:chgData name="#MURPHY WONG KAH LEONG#" userId="S::murp0002@e.ntu.edu.sg::215c4a66-cb52-4461-8f6c-adbfeca3fdd7" providerId="AD" clId="Web-{4C6671F5-C4A1-F1D8-FC7D-4866FE361830}" dt="2025-11-12T05:11:42.005" v="35" actId="20577"/>
+          <ac:spMkLst>
+            <pc:docMk/>
+            <pc:sldMk cId="2027014821" sldId="262"/>
+            <ac:spMk id="2" creationId="{FB135779-5683-AA40-93FB-4719B6EEF287}"/>
+          </ac:spMkLst>
+        </pc:spChg>
+      </pc:sldChg>
+      <pc:sldChg chg="modSp add replId">
+        <pc:chgData name="#MURPHY WONG KAH LEONG#" userId="S::murp0002@e.ntu.edu.sg::215c4a66-cb52-4461-8f6c-adbfeca3fdd7" providerId="AD" clId="Web-{4C6671F5-C4A1-F1D8-FC7D-4866FE361830}" dt="2025-11-12T05:11:46.380" v="38" actId="20577"/>
+        <pc:sldMkLst>
+          <pc:docMk/>
+          <pc:sldMk cId="3750020553" sldId="263"/>
+        </pc:sldMkLst>
+        <pc:spChg chg="mod">
+          <ac:chgData name="#MURPHY WONG KAH LEONG#" userId="S::murp0002@e.ntu.edu.sg::215c4a66-cb52-4461-8f6c-adbfeca3fdd7" providerId="AD" clId="Web-{4C6671F5-C4A1-F1D8-FC7D-4866FE361830}" dt="2025-11-12T05:11:46.380" v="38" actId="20577"/>
+          <ac:spMkLst>
+            <pc:docMk/>
+            <pc:sldMk cId="3750020553" sldId="263"/>
+            <ac:spMk id="2" creationId="{395D3138-89EB-57BB-2ABB-116125B8BE8E}"/>
+          </ac:spMkLst>
+        </pc:spChg>
+      </pc:sldChg>
+      <pc:sldChg chg="modSp add replId">
+        <pc:chgData name="#MURPHY WONG KAH LEONG#" userId="S::murp0002@e.ntu.edu.sg::215c4a66-cb52-4461-8f6c-adbfeca3fdd7" providerId="AD" clId="Web-{4C6671F5-C4A1-F1D8-FC7D-4866FE361830}" dt="2025-11-12T05:12:01.552" v="42" actId="20577"/>
+        <pc:sldMkLst>
+          <pc:docMk/>
+          <pc:sldMk cId="2068233959" sldId="264"/>
+        </pc:sldMkLst>
+        <pc:spChg chg="mod">
+          <ac:chgData name="#MURPHY WONG KAH LEONG#" userId="S::murp0002@e.ntu.edu.sg::215c4a66-cb52-4461-8f6c-adbfeca3fdd7" providerId="AD" clId="Web-{4C6671F5-C4A1-F1D8-FC7D-4866FE361830}" dt="2025-11-12T05:12:01.552" v="42" actId="20577"/>
+          <ac:spMkLst>
+            <pc:docMk/>
+            <pc:sldMk cId="2068233959" sldId="264"/>
+            <ac:spMk id="2" creationId="{A57A9AEF-873B-144E-EBE0-6528719D2D6B}"/>
+          </ac:spMkLst>
+        </pc:spChg>
+      </pc:sldChg>
+      <pc:sldChg chg="modSp add replId">
+        <pc:chgData name="#MURPHY WONG KAH LEONG#" userId="S::murp0002@e.ntu.edu.sg::215c4a66-cb52-4461-8f6c-adbfeca3fdd7" providerId="AD" clId="Web-{4C6671F5-C4A1-F1D8-FC7D-4866FE361830}" dt="2025-11-12T05:12:05.333" v="45" actId="20577"/>
+        <pc:sldMkLst>
+          <pc:docMk/>
+          <pc:sldMk cId="2462205672" sldId="265"/>
+        </pc:sldMkLst>
+        <pc:spChg chg="mod">
+          <ac:chgData name="#MURPHY WONG KAH LEONG#" userId="S::murp0002@e.ntu.edu.sg::215c4a66-cb52-4461-8f6c-adbfeca3fdd7" providerId="AD" clId="Web-{4C6671F5-C4A1-F1D8-FC7D-4866FE361830}" dt="2025-11-12T05:12:05.333" v="45" actId="20577"/>
+          <ac:spMkLst>
+            <pc:docMk/>
+            <pc:sldMk cId="2462205672" sldId="265"/>
+            <ac:spMk id="2" creationId="{975EEBF8-4966-1AA3-F6EB-0A5CD2A5035F}"/>
+          </ac:spMkLst>
+        </pc:spChg>
+      </pc:sldChg>
+      <pc:sldChg chg="modSp add replId">
+        <pc:chgData name="#MURPHY WONG KAH LEONG#" userId="S::murp0002@e.ntu.edu.sg::215c4a66-cb52-4461-8f6c-adbfeca3fdd7" providerId="AD" clId="Web-{4C6671F5-C4A1-F1D8-FC7D-4866FE361830}" dt="2025-11-12T05:12:28.256" v="51" actId="20577"/>
+        <pc:sldMkLst>
+          <pc:docMk/>
+          <pc:sldMk cId="919294963" sldId="266"/>
+        </pc:sldMkLst>
+        <pc:spChg chg="mod">
+          <ac:chgData name="#MURPHY WONG KAH LEONG#" userId="S::murp0002@e.ntu.edu.sg::215c4a66-cb52-4461-8f6c-adbfeca3fdd7" providerId="AD" clId="Web-{4C6671F5-C4A1-F1D8-FC7D-4866FE361830}" dt="2025-11-12T05:12:28.256" v="51" actId="20577"/>
+          <ac:spMkLst>
+            <pc:docMk/>
+            <pc:sldMk cId="919294963" sldId="266"/>
+            <ac:spMk id="2" creationId="{2EB14937-612D-1CD1-A57E-3B06954B7446}"/>
+          </ac:spMkLst>
+        </pc:spChg>
+      </pc:sldChg>
+    </pc:docChg>
+  </pc:docChgLst>
+  <pc:docChgLst>
+    <pc:chgData name="#PAZHANISAMY HARISH PRABHU#" userId="S::harishpr001@e.ntu.edu.sg::35c7008f-c9e0-45f1-bf01-579da08733cb" providerId="AD" clId="Web-{91104CAB-4683-05AE-3D9A-FEF41D8A1AFC}"/>
+    <pc:docChg chg="modSld">
+      <pc:chgData name="#PAZHANISAMY HARISH PRABHU#" userId="S::harishpr001@e.ntu.edu.sg::35c7008f-c9e0-45f1-bf01-579da08733cb" providerId="AD" clId="Web-{91104CAB-4683-05AE-3D9A-FEF41D8A1AFC}" dt="2025-11-14T16:25:54.117" v="45"/>
+      <pc:docMkLst>
+        <pc:docMk/>
+      </pc:docMkLst>
+      <pc:sldChg chg="addSp delSp modSp modNotes">
+        <pc:chgData name="#PAZHANISAMY HARISH PRABHU#" userId="S::harishpr001@e.ntu.edu.sg::35c7008f-c9e0-45f1-bf01-579da08733cb" providerId="AD" clId="Web-{91104CAB-4683-05AE-3D9A-FEF41D8A1AFC}" dt="2025-11-14T15:21:19.756" v="25" actId="20577"/>
+        <pc:sldMkLst>
+          <pc:docMk/>
+          <pc:sldMk cId="2027014821" sldId="262"/>
+        </pc:sldMkLst>
+        <pc:spChg chg="add del mod">
+          <ac:chgData name="#PAZHANISAMY HARISH PRABHU#" userId="S::harishpr001@e.ntu.edu.sg::35c7008f-c9e0-45f1-bf01-579da08733cb" providerId="AD" clId="Web-{91104CAB-4683-05AE-3D9A-FEF41D8A1AFC}" dt="2025-11-14T14:59:53.084" v="1"/>
+          <ac:spMkLst>
+            <pc:docMk/>
+            <pc:sldMk cId="2027014821" sldId="262"/>
+            <ac:spMk id="4" creationId="{D9927050-9774-2B0A-2A1F-95798C5499B6}"/>
+          </ac:spMkLst>
+        </pc:spChg>
+        <pc:spChg chg="mod">
+          <ac:chgData name="#PAZHANISAMY HARISH PRABHU#" userId="S::harishpr001@e.ntu.edu.sg::35c7008f-c9e0-45f1-bf01-579da08733cb" providerId="AD" clId="Web-{91104CAB-4683-05AE-3D9A-FEF41D8A1AFC}" dt="2025-11-14T15:21:19.756" v="25" actId="20577"/>
+          <ac:spMkLst>
+            <pc:docMk/>
+            <pc:sldMk cId="2027014821" sldId="262"/>
+            <ac:spMk id="5" creationId="{49EB4D8A-7185-BB8C-869D-37F826C0CAAA}"/>
+          </ac:spMkLst>
+        </pc:spChg>
+        <pc:picChg chg="add mod ord">
+          <ac:chgData name="#PAZHANISAMY HARISH PRABHU#" userId="S::harishpr001@e.ntu.edu.sg::35c7008f-c9e0-45f1-bf01-579da08733cb" providerId="AD" clId="Web-{91104CAB-4683-05AE-3D9A-FEF41D8A1AFC}" dt="2025-11-14T15:00:10.490" v="7" actId="14100"/>
+          <ac:picMkLst>
+            <pc:docMk/>
+            <pc:sldMk cId="2027014821" sldId="262"/>
+            <ac:picMk id="6" creationId="{84520AFF-08AD-9238-3EDA-FE773290201C}"/>
+          </ac:picMkLst>
+        </pc:picChg>
+        <pc:picChg chg="del">
+          <ac:chgData name="#PAZHANISAMY HARISH PRABHU#" userId="S::harishpr001@e.ntu.edu.sg::35c7008f-c9e0-45f1-bf01-579da08733cb" providerId="AD" clId="Web-{91104CAB-4683-05AE-3D9A-FEF41D8A1AFC}" dt="2025-11-14T14:59:46.443" v="0"/>
+          <ac:picMkLst>
+            <pc:docMk/>
+            <pc:sldMk cId="2027014821" sldId="262"/>
+            <ac:picMk id="20" creationId="{766B4F54-9647-0034-6414-5B265AAED698}"/>
+          </ac:picMkLst>
+        </pc:picChg>
+      </pc:sldChg>
+      <pc:sldChg chg="modSp modNotes">
+        <pc:chgData name="#PAZHANISAMY HARISH PRABHU#" userId="S::harishpr001@e.ntu.edu.sg::35c7008f-c9e0-45f1-bf01-579da08733cb" providerId="AD" clId="Web-{91104CAB-4683-05AE-3D9A-FEF41D8A1AFC}" dt="2025-11-14T16:25:54.117" v="45"/>
+        <pc:sldMkLst>
+          <pc:docMk/>
+          <pc:sldMk cId="3750020553" sldId="263"/>
+        </pc:sldMkLst>
+        <pc:spChg chg="mod">
+          <ac:chgData name="#PAZHANISAMY HARISH PRABHU#" userId="S::harishpr001@e.ntu.edu.sg::35c7008f-c9e0-45f1-bf01-579da08733cb" providerId="AD" clId="Web-{91104CAB-4683-05AE-3D9A-FEF41D8A1AFC}" dt="2025-11-14T15:49:56.382" v="44" actId="20577"/>
+          <ac:spMkLst>
+            <pc:docMk/>
+            <pc:sldMk cId="3750020553" sldId="263"/>
+            <ac:spMk id="5" creationId="{1E530C0E-3F57-A88D-4925-2F34FD021BFF}"/>
+          </ac:spMkLst>
+        </pc:spChg>
+      </pc:sldChg>
+      <pc:sldChg chg="addSp delSp modSp">
+        <pc:chgData name="#PAZHANISAMY HARISH PRABHU#" userId="S::harishpr001@e.ntu.edu.sg::35c7008f-c9e0-45f1-bf01-579da08733cb" providerId="AD" clId="Web-{91104CAB-4683-05AE-3D9A-FEF41D8A1AFC}" dt="2025-11-14T15:26:51.615" v="36" actId="1076"/>
+        <pc:sldMkLst>
+          <pc:docMk/>
+          <pc:sldMk cId="2462205672" sldId="265"/>
+        </pc:sldMkLst>
+        <pc:spChg chg="add del mod">
+          <ac:chgData name="#PAZHANISAMY HARISH PRABHU#" userId="S::harishpr001@e.ntu.edu.sg::35c7008f-c9e0-45f1-bf01-579da08733cb" providerId="AD" clId="Web-{91104CAB-4683-05AE-3D9A-FEF41D8A1AFC}" dt="2025-11-14T15:26:09.630" v="27"/>
+          <ac:spMkLst>
+            <pc:docMk/>
+            <pc:sldMk cId="2462205672" sldId="265"/>
+            <ac:spMk id="4" creationId="{8C88BE99-3BE1-9573-8AEB-F25064AB3326}"/>
+          </ac:spMkLst>
+        </pc:spChg>
+        <pc:picChg chg="add mod ord">
+          <ac:chgData name="#PAZHANISAMY HARISH PRABHU#" userId="S::harishpr001@e.ntu.edu.sg::35c7008f-c9e0-45f1-bf01-579da08733cb" providerId="AD" clId="Web-{91104CAB-4683-05AE-3D9A-FEF41D8A1AFC}" dt="2025-11-14T15:26:11.302" v="28" actId="1076"/>
+          <ac:picMkLst>
+            <pc:docMk/>
+            <pc:sldMk cId="2462205672" sldId="265"/>
+            <ac:picMk id="6" creationId="{03C84618-CF57-75F3-0D0B-60BBBC360A23}"/>
+          </ac:picMkLst>
+        </pc:picChg>
+        <pc:picChg chg="add mod">
+          <ac:chgData name="#PAZHANISAMY HARISH PRABHU#" userId="S::harishpr001@e.ntu.edu.sg::35c7008f-c9e0-45f1-bf01-579da08733cb" providerId="AD" clId="Web-{91104CAB-4683-05AE-3D9A-FEF41D8A1AFC}" dt="2025-11-14T15:26:26.802" v="30" actId="1076"/>
+          <ac:picMkLst>
+            <pc:docMk/>
+            <pc:sldMk cId="2462205672" sldId="265"/>
+            <ac:picMk id="7" creationId="{105B33BC-AEF2-0242-01E0-35118351F210}"/>
+          </ac:picMkLst>
+        </pc:picChg>
+        <pc:picChg chg="del">
+          <ac:chgData name="#PAZHANISAMY HARISH PRABHU#" userId="S::harishpr001@e.ntu.edu.sg::35c7008f-c9e0-45f1-bf01-579da08733cb" providerId="AD" clId="Web-{91104CAB-4683-05AE-3D9A-FEF41D8A1AFC}" dt="2025-11-14T15:26:09.083" v="26"/>
+          <ac:picMkLst>
+            <pc:docMk/>
+            <pc:sldMk cId="2462205672" sldId="265"/>
+            <ac:picMk id="8" creationId="{4D7B25FF-79B5-872C-6F2E-ADD6567FC0F4}"/>
+          </ac:picMkLst>
+        </pc:picChg>
+        <pc:picChg chg="add mod">
+          <ac:chgData name="#PAZHANISAMY HARISH PRABHU#" userId="S::harishpr001@e.ntu.edu.sg::35c7008f-c9e0-45f1-bf01-579da08733cb" providerId="AD" clId="Web-{91104CAB-4683-05AE-3D9A-FEF41D8A1AFC}" dt="2025-11-14T15:26:49.615" v="35" actId="1076"/>
+          <ac:picMkLst>
+            <pc:docMk/>
+            <pc:sldMk cId="2462205672" sldId="265"/>
+            <ac:picMk id="9" creationId="{6F5952EC-304B-281B-33A6-F95890E23AA1}"/>
+          </ac:picMkLst>
+        </pc:picChg>
+        <pc:picChg chg="add mod">
+          <ac:chgData name="#PAZHANISAMY HARISH PRABHU#" userId="S::harishpr001@e.ntu.edu.sg::35c7008f-c9e0-45f1-bf01-579da08733cb" providerId="AD" clId="Web-{91104CAB-4683-05AE-3D9A-FEF41D8A1AFC}" dt="2025-11-14T15:26:51.615" v="36" actId="1076"/>
+          <ac:picMkLst>
+            <pc:docMk/>
+            <pc:sldMk cId="2462205672" sldId="265"/>
+            <ac:picMk id="10" creationId="{BEBE4ACC-665A-8BD3-BF74-F41342CE4126}"/>
+          </ac:picMkLst>
+        </pc:picChg>
+      </pc:sldChg>
+    </pc:docChg>
+  </pc:docChgLst>
+  <pc:docChgLst>
+    <pc:chgData name="#MURPHY WONG KAH LEONG#" userId="S::murp0002@e.ntu.edu.sg::215c4a66-cb52-4461-8f6c-adbfeca3fdd7" providerId="AD" clId="Web-{04BA5E01-BA23-18E1-DCF6-E5C46CF236C7}"/>
+    <pc:docChg chg="modSld">
+      <pc:chgData name="#MURPHY WONG KAH LEONG#" userId="S::murp0002@e.ntu.edu.sg::215c4a66-cb52-4461-8f6c-adbfeca3fdd7" providerId="AD" clId="Web-{04BA5E01-BA23-18E1-DCF6-E5C46CF236C7}" dt="2025-11-14T15:51:28.671" v="126" actId="20577"/>
+      <pc:docMkLst>
+        <pc:docMk/>
+      </pc:docMkLst>
+      <pc:sldChg chg="addSp delSp modSp">
+        <pc:chgData name="#MURPHY WONG KAH LEONG#" userId="S::murp0002@e.ntu.edu.sg::215c4a66-cb52-4461-8f6c-adbfeca3fdd7" providerId="AD" clId="Web-{04BA5E01-BA23-18E1-DCF6-E5C46CF236C7}" dt="2025-11-14T15:28:06.431" v="59" actId="14100"/>
+        <pc:sldMkLst>
+          <pc:docMk/>
+          <pc:sldMk cId="2703079337" sldId="257"/>
+        </pc:sldMkLst>
+        <pc:spChg chg="mod">
+          <ac:chgData name="#MURPHY WONG KAH LEONG#" userId="S::murp0002@e.ntu.edu.sg::215c4a66-cb52-4461-8f6c-adbfeca3fdd7" providerId="AD" clId="Web-{04BA5E01-BA23-18E1-DCF6-E5C46CF236C7}" dt="2025-11-14T15:28:06.431" v="59" actId="14100"/>
+          <ac:spMkLst>
+            <pc:docMk/>
+            <pc:sldMk cId="2703079337" sldId="257"/>
+            <ac:spMk id="2" creationId="{1F785A69-0D73-CC89-DF32-40F5C382B304}"/>
+          </ac:spMkLst>
+        </pc:spChg>
+        <pc:spChg chg="del">
+          <ac:chgData name="#MURPHY WONG KAH LEONG#" userId="S::murp0002@e.ntu.edu.sg::215c4a66-cb52-4461-8f6c-adbfeca3fdd7" providerId="AD" clId="Web-{04BA5E01-BA23-18E1-DCF6-E5C46CF236C7}" dt="2025-11-14T15:27:33.165" v="41"/>
+          <ac:spMkLst>
+            <pc:docMk/>
+            <pc:sldMk cId="2703079337" sldId="257"/>
+            <ac:spMk id="3" creationId="{9AC414DB-084F-F495-8291-21132BDB25C2}"/>
+          </ac:spMkLst>
+        </pc:spChg>
+        <pc:spChg chg="add del mod">
+          <ac:chgData name="#MURPHY WONG KAH LEONG#" userId="S::murp0002@e.ntu.edu.sg::215c4a66-cb52-4461-8f6c-adbfeca3fdd7" providerId="AD" clId="Web-{04BA5E01-BA23-18E1-DCF6-E5C46CF236C7}" dt="2025-11-14T15:27:35.118" v="42"/>
+          <ac:spMkLst>
+            <pc:docMk/>
+            <pc:sldMk cId="2703079337" sldId="257"/>
+            <ac:spMk id="5" creationId="{CA0F1B6B-D670-BEBC-6060-E6BC6BD14475}"/>
+          </ac:spMkLst>
+        </pc:spChg>
+      </pc:sldChg>
+      <pc:sldChg chg="addSp delSp modSp modNotes">
+        <pc:chgData name="#MURPHY WONG KAH LEONG#" userId="S::murp0002@e.ntu.edu.sg::215c4a66-cb52-4461-8f6c-adbfeca3fdd7" providerId="AD" clId="Web-{04BA5E01-BA23-18E1-DCF6-E5C46CF236C7}" dt="2025-11-14T15:46:40.790" v="74"/>
+        <pc:sldMkLst>
+          <pc:docMk/>
+          <pc:sldMk cId="266668027" sldId="261"/>
+        </pc:sldMkLst>
+        <pc:spChg chg="add del">
+          <ac:chgData name="#MURPHY WONG KAH LEONG#" userId="S::murp0002@e.ntu.edu.sg::215c4a66-cb52-4461-8f6c-adbfeca3fdd7" providerId="AD" clId="Web-{04BA5E01-BA23-18E1-DCF6-E5C46CF236C7}" dt="2025-11-14T15:22:47.023" v="12"/>
+          <ac:spMkLst>
+            <pc:docMk/>
+            <pc:sldMk cId="266668027" sldId="261"/>
+            <ac:spMk id="4" creationId="{3A2788EF-9AC4-0D5F-3092-04C7187DE18B}"/>
+          </ac:spMkLst>
+        </pc:spChg>
+        <pc:spChg chg="mod">
+          <ac:chgData name="#MURPHY WONG KAH LEONG#" userId="S::murp0002@e.ntu.edu.sg::215c4a66-cb52-4461-8f6c-adbfeca3fdd7" providerId="AD" clId="Web-{04BA5E01-BA23-18E1-DCF6-E5C46CF236C7}" dt="2025-11-14T15:44:17.958" v="60" actId="20577"/>
+          <ac:spMkLst>
+            <pc:docMk/>
+            <pc:sldMk cId="266668027" sldId="261"/>
+            <ac:spMk id="5" creationId="{0A0FF736-8C72-DC2C-F0D4-7D55C464BE73}"/>
+          </ac:spMkLst>
+        </pc:spChg>
+        <pc:picChg chg="add del mod ord">
+          <ac:chgData name="#MURPHY WONG KAH LEONG#" userId="S::murp0002@e.ntu.edu.sg::215c4a66-cb52-4461-8f6c-adbfeca3fdd7" providerId="AD" clId="Web-{04BA5E01-BA23-18E1-DCF6-E5C46CF236C7}" dt="2025-11-14T15:22:39.304" v="11"/>
+          <ac:picMkLst>
+            <pc:docMk/>
+            <pc:sldMk cId="266668027" sldId="261"/>
+            <ac:picMk id="3" creationId="{A0A62D33-37D9-4BE7-F97B-6A6EF85F8451}"/>
+          </ac:picMkLst>
+        </pc:picChg>
+        <pc:picChg chg="add mod ord modCrop">
+          <ac:chgData name="#MURPHY WONG KAH LEONG#" userId="S::murp0002@e.ntu.edu.sg::215c4a66-cb52-4461-8f6c-adbfeca3fdd7" providerId="AD" clId="Web-{04BA5E01-BA23-18E1-DCF6-E5C46CF236C7}" dt="2025-11-14T15:23:47.789" v="28" actId="1076"/>
+          <ac:picMkLst>
+            <pc:docMk/>
+            <pc:sldMk cId="266668027" sldId="261"/>
+            <ac:picMk id="6" creationId="{0EBAC5FA-08C4-6A86-6B2C-5C62C023B865}"/>
+          </ac:picMkLst>
+        </pc:picChg>
+        <pc:picChg chg="add mod">
+          <ac:chgData name="#MURPHY WONG KAH LEONG#" userId="S::murp0002@e.ntu.edu.sg::215c4a66-cb52-4461-8f6c-adbfeca3fdd7" providerId="AD" clId="Web-{04BA5E01-BA23-18E1-DCF6-E5C46CF236C7}" dt="2025-11-14T15:23:49.305" v="29" actId="1076"/>
+          <ac:picMkLst>
+            <pc:docMk/>
+            <pc:sldMk cId="266668027" sldId="261"/>
+            <ac:picMk id="7" creationId="{E25CA0FA-5429-744D-806D-5A6B2F54FFBD}"/>
+          </ac:picMkLst>
+        </pc:picChg>
+      </pc:sldChg>
+      <pc:sldChg chg="addSp delSp modSp modNotes">
+        <pc:chgData name="#MURPHY WONG KAH LEONG#" userId="S::murp0002@e.ntu.edu.sg::215c4a66-cb52-4461-8f6c-adbfeca3fdd7" providerId="AD" clId="Web-{04BA5E01-BA23-18E1-DCF6-E5C46CF236C7}" dt="2025-11-14T15:46:37.587" v="70"/>
+        <pc:sldMkLst>
+          <pc:docMk/>
+          <pc:sldMk cId="2027014821" sldId="262"/>
+        </pc:sldMkLst>
+        <pc:spChg chg="add del mod">
+          <ac:chgData name="#MURPHY WONG KAH LEONG#" userId="S::murp0002@e.ntu.edu.sg::215c4a66-cb52-4461-8f6c-adbfeca3fdd7" providerId="AD" clId="Web-{04BA5E01-BA23-18E1-DCF6-E5C46CF236C7}" dt="2025-11-14T15:25:16.930" v="31"/>
+          <ac:spMkLst>
+            <pc:docMk/>
+            <pc:sldMk cId="2027014821" sldId="262"/>
+            <ac:spMk id="4" creationId="{04A71BF2-A0CA-72C1-4DC7-A74B13343101}"/>
+          </ac:spMkLst>
+        </pc:spChg>
+        <pc:spChg chg="mod">
+          <ac:chgData name="#MURPHY WONG KAH LEONG#" userId="S::murp0002@e.ntu.edu.sg::215c4a66-cb52-4461-8f6c-adbfeca3fdd7" providerId="AD" clId="Web-{04BA5E01-BA23-18E1-DCF6-E5C46CF236C7}" dt="2025-11-14T15:25:23.368" v="33" actId="1076"/>
+          <ac:spMkLst>
+            <pc:docMk/>
+            <pc:sldMk cId="2027014821" sldId="262"/>
+            <ac:spMk id="5" creationId="{49EB4D8A-7185-BB8C-869D-37F826C0CAAA}"/>
+          </ac:spMkLst>
+        </pc:spChg>
+        <pc:picChg chg="del">
+          <ac:chgData name="#MURPHY WONG KAH LEONG#" userId="S::murp0002@e.ntu.edu.sg::215c4a66-cb52-4461-8f6c-adbfeca3fdd7" providerId="AD" clId="Web-{04BA5E01-BA23-18E1-DCF6-E5C46CF236C7}" dt="2025-11-14T15:25:16.008" v="30"/>
+          <ac:picMkLst>
+            <pc:docMk/>
+            <pc:sldMk cId="2027014821" sldId="262"/>
+            <ac:picMk id="6" creationId="{84520AFF-08AD-9238-3EDA-FE773290201C}"/>
+          </ac:picMkLst>
+        </pc:picChg>
+        <pc:picChg chg="add mod ord">
+          <ac:chgData name="#MURPHY WONG KAH LEONG#" userId="S::murp0002@e.ntu.edu.sg::215c4a66-cb52-4461-8f6c-adbfeca3fdd7" providerId="AD" clId="Web-{04BA5E01-BA23-18E1-DCF6-E5C46CF236C7}" dt="2025-11-14T15:25:45.352" v="38" actId="1076"/>
+          <ac:picMkLst>
+            <pc:docMk/>
+            <pc:sldMk cId="2027014821" sldId="262"/>
+            <ac:picMk id="7" creationId="{E0A7392A-ACB9-CE9E-6CD6-6C4056B19838}"/>
+          </ac:picMkLst>
+        </pc:picChg>
+        <pc:picChg chg="add mod">
+          <ac:chgData name="#MURPHY WONG KAH LEONG#" userId="S::murp0002@e.ntu.edu.sg::215c4a66-cb52-4461-8f6c-adbfeca3fdd7" providerId="AD" clId="Web-{04BA5E01-BA23-18E1-DCF6-E5C46CF236C7}" dt="2025-11-14T15:25:47.290" v="39" actId="1076"/>
+          <ac:picMkLst>
+            <pc:docMk/>
+            <pc:sldMk cId="2027014821" sldId="262"/>
+            <ac:picMk id="8" creationId="{0D077B96-3FEA-556D-33D2-DA7A1C9FE163}"/>
+          </ac:picMkLst>
+        </pc:picChg>
+      </pc:sldChg>
+      <pc:sldChg chg="modNotes">
+        <pc:chgData name="#MURPHY WONG KAH LEONG#" userId="S::murp0002@e.ntu.edu.sg::215c4a66-cb52-4461-8f6c-adbfeca3fdd7" providerId="AD" clId="Web-{04BA5E01-BA23-18E1-DCF6-E5C46CF236C7}" dt="2025-11-14T15:46:30.618" v="64"/>
+        <pc:sldMkLst>
+          <pc:docMk/>
+          <pc:sldMk cId="3750020553" sldId="263"/>
+        </pc:sldMkLst>
+      </pc:sldChg>
+      <pc:sldChg chg="modSp modNotes">
+        <pc:chgData name="#MURPHY WONG KAH LEONG#" userId="S::murp0002@e.ntu.edu.sg::215c4a66-cb52-4461-8f6c-adbfeca3fdd7" providerId="AD" clId="Web-{04BA5E01-BA23-18E1-DCF6-E5C46CF236C7}" dt="2025-11-14T15:51:28.671" v="126" actId="20577"/>
+        <pc:sldMkLst>
+          <pc:docMk/>
+          <pc:sldMk cId="2068233959" sldId="264"/>
+        </pc:sldMkLst>
+        <pc:spChg chg="mod">
+          <ac:chgData name="#MURPHY WONG KAH LEONG#" userId="S::murp0002@e.ntu.edu.sg::215c4a66-cb52-4461-8f6c-adbfeca3fdd7" providerId="AD" clId="Web-{04BA5E01-BA23-18E1-DCF6-E5C46CF236C7}" dt="2025-11-14T15:51:28.671" v="126" actId="20577"/>
+          <ac:spMkLst>
+            <pc:docMk/>
+            <pc:sldMk cId="2068233959" sldId="264"/>
+            <ac:spMk id="5" creationId="{977177D4-E785-218D-9157-2BFA68A32616}"/>
+          </ac:spMkLst>
+        </pc:spChg>
+      </pc:sldChg>
+      <pc:sldChg chg="addSp delSp modSp modNotes">
+        <pc:chgData name="#MURPHY WONG KAH LEONG#" userId="S::murp0002@e.ntu.edu.sg::215c4a66-cb52-4461-8f6c-adbfeca3fdd7" providerId="AD" clId="Web-{04BA5E01-BA23-18E1-DCF6-E5C46CF236C7}" dt="2025-11-14T15:49:51.747" v="88" actId="1076"/>
+        <pc:sldMkLst>
+          <pc:docMk/>
+          <pc:sldMk cId="2462205672" sldId="265"/>
+        </pc:sldMkLst>
+        <pc:picChg chg="add mod">
+          <ac:chgData name="#MURPHY WONG KAH LEONG#" userId="S::murp0002@e.ntu.edu.sg::215c4a66-cb52-4461-8f6c-adbfeca3fdd7" providerId="AD" clId="Web-{04BA5E01-BA23-18E1-DCF6-E5C46CF236C7}" dt="2025-11-14T15:49:51.747" v="88" actId="1076"/>
+          <ac:picMkLst>
+            <pc:docMk/>
+            <pc:sldMk cId="2462205672" sldId="265"/>
+            <ac:picMk id="3" creationId="{0D01EC61-CF9B-8E6F-09B7-2E5824822DFC}"/>
+          </ac:picMkLst>
+        </pc:picChg>
+        <pc:picChg chg="del">
+          <ac:chgData name="#MURPHY WONG KAH LEONG#" userId="S::murp0002@e.ntu.edu.sg::215c4a66-cb52-4461-8f6c-adbfeca3fdd7" providerId="AD" clId="Web-{04BA5E01-BA23-18E1-DCF6-E5C46CF236C7}" dt="2025-11-14T15:49:46.060" v="84"/>
+          <ac:picMkLst>
+            <pc:docMk/>
+            <pc:sldMk cId="2462205672" sldId="265"/>
+            <ac:picMk id="9" creationId="{6F5952EC-304B-281B-33A6-F95890E23AA1}"/>
+          </ac:picMkLst>
+        </pc:picChg>
+      </pc:sldChg>
+    </pc:docChg>
+  </pc:docChgLst>
+  <pc:docChgLst>
+    <pc:chgData name="#PANG WEI JIE#" userId="S::pang0270@e.ntu.edu.sg::72bcae44-2dd7-4853-8947-6d110cf21fa4" providerId="AD" clId="Web-{18F0D2DB-7FA3-E1DB-5F0B-FE77C0E486EA}"/>
+    <pc:docChg chg="modSld">
+      <pc:chgData name="#PANG WEI JIE#" userId="S::pang0270@e.ntu.edu.sg::72bcae44-2dd7-4853-8947-6d110cf21fa4" providerId="AD" clId="Web-{18F0D2DB-7FA3-E1DB-5F0B-FE77C0E486EA}" dt="2025-11-10T02:05:50.784" v="1" actId="20577"/>
+      <pc:docMkLst>
+        <pc:docMk/>
+      </pc:docMkLst>
+      <pc:sldChg chg="modSp">
+        <pc:chgData name="#PANG WEI JIE#" userId="S::pang0270@e.ntu.edu.sg::72bcae44-2dd7-4853-8947-6d110cf21fa4" providerId="AD" clId="Web-{18F0D2DB-7FA3-E1DB-5F0B-FE77C0E486EA}" dt="2025-11-10T02:05:50.784" v="1" actId="20577"/>
+        <pc:sldMkLst>
+          <pc:docMk/>
+          <pc:sldMk cId="2703079337" sldId="257"/>
+        </pc:sldMkLst>
+        <pc:spChg chg="mod">
+          <ac:chgData name="#PANG WEI JIE#" userId="S::pang0270@e.ntu.edu.sg::72bcae44-2dd7-4853-8947-6d110cf21fa4" providerId="AD" clId="Web-{18F0D2DB-7FA3-E1DB-5F0B-FE77C0E486EA}" dt="2025-11-10T02:05:50.784" v="1" actId="20577"/>
+          <ac:spMkLst>
+            <pc:docMk/>
+            <pc:sldMk cId="2703079337" sldId="257"/>
+            <ac:spMk id="2" creationId="{1F785A69-0D73-CC89-DF32-40F5C382B304}"/>
+          </ac:spMkLst>
+        </pc:spChg>
+      </pc:sldChg>
+    </pc:docChg>
+  </pc:docChgLst>
+  <pc:docChgLst>
+    <pc:chgData name="#PANG WEI JIE#" userId="S::pang0270@e.ntu.edu.sg::72bcae44-2dd7-4853-8947-6d110cf21fa4" providerId="AD" clId="Web-{8C0D2BBB-622C-D5FE-A641-77BA1B57CC28}"/>
+    <pc:docChg chg="modSld">
+      <pc:chgData name="#PANG WEI JIE#" userId="S::pang0270@e.ntu.edu.sg::72bcae44-2dd7-4853-8947-6d110cf21fa4" providerId="AD" clId="Web-{8C0D2BBB-622C-D5FE-A641-77BA1B57CC28}" dt="2025-11-13T09:07:37.363" v="839" actId="20577"/>
+      <pc:docMkLst>
+        <pc:docMk/>
+      </pc:docMkLst>
+      <pc:sldChg chg="modSp mod setBg">
+        <pc:chgData name="#PANG WEI JIE#" userId="S::pang0270@e.ntu.edu.sg::72bcae44-2dd7-4853-8947-6d110cf21fa4" providerId="AD" clId="Web-{8C0D2BBB-622C-D5FE-A641-77BA1B57CC28}" dt="2025-11-13T09:07:37.363" v="839" actId="20577"/>
+        <pc:sldMkLst>
+          <pc:docMk/>
+          <pc:sldMk cId="109857222" sldId="256"/>
+        </pc:sldMkLst>
+        <pc:spChg chg="mod">
+          <ac:chgData name="#PANG WEI JIE#" userId="S::pang0270@e.ntu.edu.sg::72bcae44-2dd7-4853-8947-6d110cf21fa4" providerId="AD" clId="Web-{8C0D2BBB-622C-D5FE-A641-77BA1B57CC28}" dt="2025-11-13T09:07:09.754" v="827" actId="20577"/>
+          <ac:spMkLst>
+            <pc:docMk/>
+            <pc:sldMk cId="109857222" sldId="256"/>
+            <ac:spMk id="2" creationId="{00000000-0000-0000-0000-000000000000}"/>
+          </ac:spMkLst>
+        </pc:spChg>
+        <pc:spChg chg="mod">
+          <ac:chgData name="#PANG WEI JIE#" userId="S::pang0270@e.ntu.edu.sg::72bcae44-2dd7-4853-8947-6d110cf21fa4" providerId="AD" clId="Web-{8C0D2BBB-622C-D5FE-A641-77BA1B57CC28}" dt="2025-11-13T09:07:37.363" v="839" actId="20577"/>
+          <ac:spMkLst>
+            <pc:docMk/>
+            <pc:sldMk cId="109857222" sldId="256"/>
+            <ac:spMk id="3" creationId="{00000000-0000-0000-0000-000000000000}"/>
+          </ac:spMkLst>
+        </pc:spChg>
+      </pc:sldChg>
+      <pc:sldChg chg="modSp mod setBg">
+        <pc:chgData name="#PANG WEI JIE#" userId="S::pang0270@e.ntu.edu.sg::72bcae44-2dd7-4853-8947-6d110cf21fa4" providerId="AD" clId="Web-{8C0D2BBB-622C-D5FE-A641-77BA1B57CC28}" dt="2025-11-13T09:05:22.408" v="822"/>
+        <pc:sldMkLst>
+          <pc:docMk/>
+          <pc:sldMk cId="2703079337" sldId="257"/>
+        </pc:sldMkLst>
+        <pc:spChg chg="mod">
+          <ac:chgData name="#PANG WEI JIE#" userId="S::pang0270@e.ntu.edu.sg::72bcae44-2dd7-4853-8947-6d110cf21fa4" providerId="AD" clId="Web-{8C0D2BBB-622C-D5FE-A641-77BA1B57CC28}" dt="2025-11-13T08:50:52.334" v="218" actId="1076"/>
+          <ac:spMkLst>
+            <pc:docMk/>
+            <pc:sldMk cId="2703079337" sldId="257"/>
+            <ac:spMk id="2" creationId="{1F785A69-0D73-CC89-DF32-40F5C382B304}"/>
+          </ac:spMkLst>
+        </pc:spChg>
+      </pc:sldChg>
+      <pc:sldChg chg="modSp mod setBg">
+        <pc:chgData name="#PANG WEI JIE#" userId="S::pang0270@e.ntu.edu.sg::72bcae44-2dd7-4853-8947-6d110cf21fa4" providerId="AD" clId="Web-{8C0D2BBB-622C-D5FE-A641-77BA1B57CC28}" dt="2025-11-13T09:05:22.189" v="815"/>
+        <pc:sldMkLst>
+          <pc:docMk/>
+          <pc:sldMk cId="78934428" sldId="258"/>
+        </pc:sldMkLst>
+        <pc:spChg chg="mod">
+          <ac:chgData name="#PANG WEI JIE#" userId="S::pang0270@e.ntu.edu.sg::72bcae44-2dd7-4853-8947-6d110cf21fa4" providerId="AD" clId="Web-{8C0D2BBB-622C-D5FE-A641-77BA1B57CC28}" dt="2025-11-13T08:47:47.691" v="80" actId="20577"/>
+          <ac:spMkLst>
+            <pc:docMk/>
+            <pc:sldMk cId="78934428" sldId="258"/>
+            <ac:spMk id="2" creationId="{40408F4A-FC08-BA83-1DBF-AB7710D33D22}"/>
+          </ac:spMkLst>
+        </pc:spChg>
+        <pc:spChg chg="mod">
+          <ac:chgData name="#PANG WEI JIE#" userId="S::pang0270@e.ntu.edu.sg::72bcae44-2dd7-4853-8947-6d110cf21fa4" providerId="AD" clId="Web-{8C0D2BBB-622C-D5FE-A641-77BA1B57CC28}" dt="2025-11-13T08:47:29.910" v="78" actId="20577"/>
+          <ac:spMkLst>
+            <pc:docMk/>
+            <pc:sldMk cId="78934428" sldId="258"/>
+            <ac:spMk id="5" creationId="{6744CE58-4E65-E0B0-6254-CCCFB0EE1140}"/>
+          </ac:spMkLst>
+        </pc:spChg>
+      </pc:sldChg>
+      <pc:sldChg chg="modSp mod setBg">
+        <pc:chgData name="#PANG WEI JIE#" userId="S::pang0270@e.ntu.edu.sg::72bcae44-2dd7-4853-8947-6d110cf21fa4" providerId="AD" clId="Web-{8C0D2BBB-622C-D5FE-A641-77BA1B57CC28}" dt="2025-11-13T09:05:22.221" v="816"/>
+        <pc:sldMkLst>
+          <pc:docMk/>
+          <pc:sldMk cId="2997418902" sldId="259"/>
+        </pc:sldMkLst>
+        <pc:spChg chg="mod">
+          <ac:chgData name="#PANG WEI JIE#" userId="S::pang0270@e.ntu.edu.sg::72bcae44-2dd7-4853-8947-6d110cf21fa4" providerId="AD" clId="Web-{8C0D2BBB-622C-D5FE-A641-77BA1B57CC28}" dt="2025-11-13T08:48:02.410" v="82" actId="1076"/>
+          <ac:spMkLst>
+            <pc:docMk/>
+            <pc:sldMk cId="2997418902" sldId="259"/>
+            <ac:spMk id="2" creationId="{1A0864BF-ACBB-23D5-B3AE-21F901E6EDA5}"/>
+          </ac:spMkLst>
+        </pc:spChg>
+        <pc:spChg chg="mod">
+          <ac:chgData name="#PANG WEI JIE#" userId="S::pang0270@e.ntu.edu.sg::72bcae44-2dd7-4853-8947-6d110cf21fa4" providerId="AD" clId="Web-{8C0D2BBB-622C-D5FE-A641-77BA1B57CC28}" dt="2025-11-13T08:58:52.274" v="681" actId="20577"/>
+          <ac:spMkLst>
+            <pc:docMk/>
+            <pc:sldMk cId="2997418902" sldId="259"/>
+            <ac:spMk id="6" creationId="{7453184F-6190-5D19-33CF-43374C24C7C8}"/>
+          </ac:spMkLst>
+        </pc:spChg>
+      </pc:sldChg>
+      <pc:sldChg chg="modSp mod setBg">
+        <pc:chgData name="#PANG WEI JIE#" userId="S::pang0270@e.ntu.edu.sg::72bcae44-2dd7-4853-8947-6d110cf21fa4" providerId="AD" clId="Web-{8C0D2BBB-622C-D5FE-A641-77BA1B57CC28}" dt="2025-11-13T09:05:22.252" v="817"/>
+        <pc:sldMkLst>
+          <pc:docMk/>
+          <pc:sldMk cId="266668027" sldId="261"/>
+        </pc:sldMkLst>
+        <pc:spChg chg="mod">
+          <ac:chgData name="#PANG WEI JIE#" userId="S::pang0270@e.ntu.edu.sg::72bcae44-2dd7-4853-8947-6d110cf21fa4" providerId="AD" clId="Web-{8C0D2BBB-622C-D5FE-A641-77BA1B57CC28}" dt="2025-11-13T08:50:08.802" v="205" actId="20577"/>
+          <ac:spMkLst>
+            <pc:docMk/>
+            <pc:sldMk cId="266668027" sldId="261"/>
+            <ac:spMk id="2" creationId="{AC61A561-3594-859A-EFB9-DFD47EFB43D1}"/>
+          </ac:spMkLst>
+        </pc:spChg>
+        <pc:spChg chg="mod">
+          <ac:chgData name="#PANG WEI JIE#" userId="S::pang0270@e.ntu.edu.sg::72bcae44-2dd7-4853-8947-6d110cf21fa4" providerId="AD" clId="Web-{8C0D2BBB-622C-D5FE-A641-77BA1B57CC28}" dt="2025-11-13T08:58:56.133" v="684" actId="20577"/>
+          <ac:spMkLst>
+            <pc:docMk/>
+            <pc:sldMk cId="266668027" sldId="261"/>
+            <ac:spMk id="5" creationId="{0A0FF736-8C72-DC2C-F0D4-7D55C464BE73}"/>
+          </ac:spMkLst>
+        </pc:spChg>
+      </pc:sldChg>
+      <pc:sldChg chg="modSp mod setBg">
+        <pc:chgData name="#PANG WEI JIE#" userId="S::pang0270@e.ntu.edu.sg::72bcae44-2dd7-4853-8947-6d110cf21fa4" providerId="AD" clId="Web-{8C0D2BBB-622C-D5FE-A641-77BA1B57CC28}" dt="2025-11-13T09:05:22.283" v="818"/>
+        <pc:sldMkLst>
+          <pc:docMk/>
+          <pc:sldMk cId="2027014821" sldId="262"/>
+        </pc:sldMkLst>
+        <pc:spChg chg="mod">
+          <ac:chgData name="#PANG WEI JIE#" userId="S::pang0270@e.ntu.edu.sg::72bcae44-2dd7-4853-8947-6d110cf21fa4" providerId="AD" clId="Web-{8C0D2BBB-622C-D5FE-A641-77BA1B57CC28}" dt="2025-11-13T08:50:32.334" v="214" actId="1076"/>
+          <ac:spMkLst>
+            <pc:docMk/>
+            <pc:sldMk cId="2027014821" sldId="262"/>
+            <ac:spMk id="2" creationId="{FB135779-5683-AA40-93FB-4719B6EEF287}"/>
+          </ac:spMkLst>
+        </pc:spChg>
+        <pc:spChg chg="mod">
+          <ac:chgData name="#PANG WEI JIE#" userId="S::pang0270@e.ntu.edu.sg::72bcae44-2dd7-4853-8947-6d110cf21fa4" providerId="AD" clId="Web-{8C0D2BBB-622C-D5FE-A641-77BA1B57CC28}" dt="2025-11-13T08:59:01.742" v="690" actId="20577"/>
+          <ac:spMkLst>
+            <pc:docMk/>
+            <pc:sldMk cId="2027014821" sldId="262"/>
+            <ac:spMk id="5" creationId="{49EB4D8A-7185-BB8C-869D-37F826C0CAAA}"/>
+          </ac:spMkLst>
+        </pc:spChg>
+      </pc:sldChg>
+      <pc:sldChg chg="modSp mod setBg">
+        <pc:chgData name="#PANG WEI JIE#" userId="S::pang0270@e.ntu.edu.sg::72bcae44-2dd7-4853-8947-6d110cf21fa4" providerId="AD" clId="Web-{8C0D2BBB-622C-D5FE-A641-77BA1B57CC28}" dt="2025-11-13T09:05:22.314" v="819"/>
+        <pc:sldMkLst>
+          <pc:docMk/>
+          <pc:sldMk cId="3750020553" sldId="263"/>
+        </pc:sldMkLst>
+        <pc:spChg chg="mod">
+          <ac:chgData name="#PANG WEI JIE#" userId="S::pang0270@e.ntu.edu.sg::72bcae44-2dd7-4853-8947-6d110cf21fa4" providerId="AD" clId="Web-{8C0D2BBB-622C-D5FE-A641-77BA1B57CC28}" dt="2025-11-13T08:50:37.099" v="215" actId="1076"/>
+          <ac:spMkLst>
+            <pc:docMk/>
+            <pc:sldMk cId="3750020553" sldId="263"/>
+            <ac:spMk id="2" creationId="{395D3138-89EB-57BB-2ABB-116125B8BE8E}"/>
+          </ac:spMkLst>
+        </pc:spChg>
+        <pc:spChg chg="mod">
+          <ac:chgData name="#PANG WEI JIE#" userId="S::pang0270@e.ntu.edu.sg::72bcae44-2dd7-4853-8947-6d110cf21fa4" providerId="AD" clId="Web-{8C0D2BBB-622C-D5FE-A641-77BA1B57CC28}" dt="2025-11-13T08:59:05.633" v="693" actId="20577"/>
+          <ac:spMkLst>
+            <pc:docMk/>
+            <pc:sldMk cId="3750020553" sldId="263"/>
+            <ac:spMk id="5" creationId="{1E530C0E-3F57-A88D-4925-2F34FD021BFF}"/>
+          </ac:spMkLst>
+        </pc:spChg>
+      </pc:sldChg>
+      <pc:sldChg chg="modSp mod setBg">
+        <pc:chgData name="#PANG WEI JIE#" userId="S::pang0270@e.ntu.edu.sg::72bcae44-2dd7-4853-8947-6d110cf21fa4" providerId="AD" clId="Web-{8C0D2BBB-622C-D5FE-A641-77BA1B57CC28}" dt="2025-11-13T09:05:22.346" v="820"/>
+        <pc:sldMkLst>
+          <pc:docMk/>
+          <pc:sldMk cId="2068233959" sldId="264"/>
+        </pc:sldMkLst>
+        <pc:spChg chg="mod">
+          <ac:chgData name="#PANG WEI JIE#" userId="S::pang0270@e.ntu.edu.sg::72bcae44-2dd7-4853-8947-6d110cf21fa4" providerId="AD" clId="Web-{8C0D2BBB-622C-D5FE-A641-77BA1B57CC28}" dt="2025-11-13T08:50:42.318" v="216" actId="1076"/>
+          <ac:spMkLst>
+            <pc:docMk/>
+            <pc:sldMk cId="2068233959" sldId="264"/>
+            <ac:spMk id="2" creationId="{A57A9AEF-873B-144E-EBE0-6528719D2D6B}"/>
+          </ac:spMkLst>
+        </pc:spChg>
+        <pc:spChg chg="mod">
+          <ac:chgData name="#PANG WEI JIE#" userId="S::pang0270@e.ntu.edu.sg::72bcae44-2dd7-4853-8947-6d110cf21fa4" providerId="AD" clId="Web-{8C0D2BBB-622C-D5FE-A641-77BA1B57CC28}" dt="2025-11-13T08:59:08.243" v="697" actId="20577"/>
+          <ac:spMkLst>
+            <pc:docMk/>
+            <pc:sldMk cId="2068233959" sldId="264"/>
+            <ac:spMk id="5" creationId="{977177D4-E785-218D-9157-2BFA68A32616}"/>
+          </ac:spMkLst>
+        </pc:spChg>
+      </pc:sldChg>
+      <pc:sldChg chg="modSp mod setBg">
+        <pc:chgData name="#PANG WEI JIE#" userId="S::pang0270@e.ntu.edu.sg::72bcae44-2dd7-4853-8947-6d110cf21fa4" providerId="AD" clId="Web-{8C0D2BBB-622C-D5FE-A641-77BA1B57CC28}" dt="2025-11-13T09:05:22.377" v="821"/>
+        <pc:sldMkLst>
+          <pc:docMk/>
+          <pc:sldMk cId="2462205672" sldId="265"/>
+        </pc:sldMkLst>
+        <pc:spChg chg="mod">
+          <ac:chgData name="#PANG WEI JIE#" userId="S::pang0270@e.ntu.edu.sg::72bcae44-2dd7-4853-8947-6d110cf21fa4" providerId="AD" clId="Web-{8C0D2BBB-622C-D5FE-A641-77BA1B57CC28}" dt="2025-11-13T08:50:46.006" v="217" actId="1076"/>
+          <ac:spMkLst>
+            <pc:docMk/>
+            <pc:sldMk cId="2462205672" sldId="265"/>
+            <ac:spMk id="2" creationId="{975EEBF8-4966-1AA3-F6EB-0A5CD2A5035F}"/>
+          </ac:spMkLst>
+        </pc:spChg>
+        <pc:spChg chg="mod">
+          <ac:chgData name="#PANG WEI JIE#" userId="S::pang0270@e.ntu.edu.sg::72bcae44-2dd7-4853-8947-6d110cf21fa4" providerId="AD" clId="Web-{8C0D2BBB-622C-D5FE-A641-77BA1B57CC28}" dt="2025-11-13T09:01:03.448" v="769" actId="20577"/>
+          <ac:spMkLst>
+            <pc:docMk/>
+            <pc:sldMk cId="2462205672" sldId="265"/>
+            <ac:spMk id="5" creationId="{81CA29D8-BA1B-4FAC-19A7-9A257880D274}"/>
+          </ac:spMkLst>
+        </pc:spChg>
+      </pc:sldChg>
+      <pc:sldChg chg="modSp mod setBg">
+        <pc:chgData name="#PANG WEI JIE#" userId="S::pang0270@e.ntu.edu.sg::72bcae44-2dd7-4853-8947-6d110cf21fa4" providerId="AD" clId="Web-{8C0D2BBB-622C-D5FE-A641-77BA1B57CC28}" dt="2025-11-13T09:05:22.439" v="823"/>
+        <pc:sldMkLst>
+          <pc:docMk/>
+          <pc:sldMk cId="919294963" sldId="266"/>
+        </pc:sldMkLst>
+        <pc:spChg chg="mod">
+          <ac:chgData name="#PANG WEI JIE#" userId="S::pang0270@e.ntu.edu.sg::72bcae44-2dd7-4853-8947-6d110cf21fa4" providerId="AD" clId="Web-{8C0D2BBB-622C-D5FE-A641-77BA1B57CC28}" dt="2025-11-13T08:50:54.334" v="219" actId="1076"/>
+          <ac:spMkLst>
+            <pc:docMk/>
+            <pc:sldMk cId="919294963" sldId="266"/>
+            <ac:spMk id="2" creationId="{2EB14937-612D-1CD1-A57E-3B06954B7446}"/>
+          </ac:spMkLst>
+        </pc:spChg>
+        <pc:spChg chg="mod">
+          <ac:chgData name="#PANG WEI JIE#" userId="S::pang0270@e.ntu.edu.sg::72bcae44-2dd7-4853-8947-6d110cf21fa4" providerId="AD" clId="Web-{8C0D2BBB-622C-D5FE-A641-77BA1B57CC28}" dt="2025-11-13T08:54:36.734" v="405" actId="20577"/>
+          <ac:spMkLst>
+            <pc:docMk/>
+            <pc:sldMk cId="919294963" sldId="266"/>
+            <ac:spMk id="3" creationId="{0B8F900A-0613-36DB-094C-4B844857BAA1}"/>
+          </ac:spMkLst>
+        </pc:spChg>
+      </pc:sldChg>
+      <pc:sldChg chg="modSp mod setBg">
+        <pc:chgData name="#PANG WEI JIE#" userId="S::pang0270@e.ntu.edu.sg::72bcae44-2dd7-4853-8947-6d110cf21fa4" providerId="AD" clId="Web-{8C0D2BBB-622C-D5FE-A641-77BA1B57CC28}" dt="2025-11-13T09:05:22.455" v="824"/>
+        <pc:sldMkLst>
+          <pc:docMk/>
+          <pc:sldMk cId="2938145853" sldId="267"/>
+        </pc:sldMkLst>
+        <pc:spChg chg="mod">
+          <ac:chgData name="#PANG WEI JIE#" userId="S::pang0270@e.ntu.edu.sg::72bcae44-2dd7-4853-8947-6d110cf21fa4" providerId="AD" clId="Web-{8C0D2BBB-622C-D5FE-A641-77BA1B57CC28}" dt="2025-11-13T08:50:57.568" v="220" actId="1076"/>
+          <ac:spMkLst>
+            <pc:docMk/>
+            <pc:sldMk cId="2938145853" sldId="267"/>
+            <ac:spMk id="2" creationId="{9A0062FA-AB51-B3CA-5DB0-943C3DC53AA8}"/>
+          </ac:spMkLst>
+        </pc:spChg>
+        <pc:spChg chg="mod">
+          <ac:chgData name="#PANG WEI JIE#" userId="S::pang0270@e.ntu.edu.sg::72bcae44-2dd7-4853-8947-6d110cf21fa4" providerId="AD" clId="Web-{8C0D2BBB-622C-D5FE-A641-77BA1B57CC28}" dt="2025-11-13T08:51:13.459" v="225" actId="20577"/>
+          <ac:spMkLst>
+            <pc:docMk/>
+            <pc:sldMk cId="2938145853" sldId="267"/>
+            <ac:spMk id="3" creationId="{ACDF7102-9A28-B8D3-E3F7-55B25A7D3DB1}"/>
+          </ac:spMkLst>
+        </pc:spChg>
+      </pc:sldChg>
+    </pc:docChg>
+  </pc:docChgLst>
+  <pc:docChgLst>
+    <pc:chgData name="#LWIN MOE OO#" userId="1dd09941-d6d3-49cc-acff-7c552bc2aac0" providerId="ADAL" clId="{E5F18AEA-E8B0-4365-BF6A-8ED9C24918B9}"/>
+    <pc:docChg chg="undo custSel modSld">
+      <pc:chgData name="#LWIN MOE OO#" userId="1dd09941-d6d3-49cc-acff-7c552bc2aac0" providerId="ADAL" clId="{E5F18AEA-E8B0-4365-BF6A-8ED9C24918B9}" dt="2025-11-14T17:02:50.632" v="810" actId="20577"/>
+      <pc:docMkLst>
+        <pc:docMk/>
+      </pc:docMkLst>
+      <pc:sldChg chg="addSp delSp modSp mod modNotesTx">
+        <pc:chgData name="#LWIN MOE OO#" userId="1dd09941-d6d3-49cc-acff-7c552bc2aac0" providerId="ADAL" clId="{E5F18AEA-E8B0-4365-BF6A-8ED9C24918B9}" dt="2025-11-14T17:02:50.632" v="810" actId="20577"/>
+        <pc:sldMkLst>
+          <pc:docMk/>
+          <pc:sldMk cId="2462205672" sldId="265"/>
+        </pc:sldMkLst>
+        <pc:spChg chg="mod">
+          <ac:chgData name="#LWIN MOE OO#" userId="1dd09941-d6d3-49cc-acff-7c552bc2aac0" providerId="ADAL" clId="{E5F18AEA-E8B0-4365-BF6A-8ED9C24918B9}" dt="2025-11-14T16:57:04.519" v="583"/>
+          <ac:spMkLst>
+            <pc:docMk/>
+            <pc:sldMk cId="2462205672" sldId="265"/>
+            <ac:spMk id="5" creationId="{81CA29D8-BA1B-4FAC-19A7-9A257880D274}"/>
+          </ac:spMkLst>
+        </pc:spChg>
+        <pc:picChg chg="add del mod modCrop">
+          <ac:chgData name="#LWIN MOE OO#" userId="1dd09941-d6d3-49cc-acff-7c552bc2aac0" providerId="ADAL" clId="{E5F18AEA-E8B0-4365-BF6A-8ED9C24918B9}" dt="2025-11-14T16:56:57.118" v="581" actId="1076"/>
+          <ac:picMkLst>
+            <pc:docMk/>
+            <pc:sldMk cId="2462205672" sldId="265"/>
+            <ac:picMk id="3" creationId="{0D01EC61-CF9B-8E6F-09B7-2E5824822DFC}"/>
+          </ac:picMkLst>
+        </pc:picChg>
+        <pc:picChg chg="add del mod">
+          <ac:chgData name="#LWIN MOE OO#" userId="1dd09941-d6d3-49cc-acff-7c552bc2aac0" providerId="ADAL" clId="{E5F18AEA-E8B0-4365-BF6A-8ED9C24918B9}" dt="2025-11-14T16:56:35.373" v="575" actId="22"/>
+          <ac:picMkLst>
+            <pc:docMk/>
+            <pc:sldMk cId="2462205672" sldId="265"/>
+            <ac:picMk id="12" creationId="{80C8E1CB-B39D-81F0-E4C9-759628DEC12A}"/>
+          </ac:picMkLst>
+        </pc:picChg>
+      </pc:sldChg>
+    </pc:docChg>
+  </pc:docChgLst>
+  <pc:docChgLst>
+    <pc:chgData name="#PAZHANISAMY HARISH PRABHU#" userId="S::harishpr001@e.ntu.edu.sg::35c7008f-c9e0-45f1-bf01-579da08733cb" providerId="AD" clId="Web-{C89215D8-8C39-B47C-C02E-ACF192385A8C}"/>
+    <pc:docChg chg="modSld">
+      <pc:chgData name="#PAZHANISAMY HARISH PRABHU#" userId="S::harishpr001@e.ntu.edu.sg::35c7008f-c9e0-45f1-bf01-579da08733cb" providerId="AD" clId="Web-{C89215D8-8C39-B47C-C02E-ACF192385A8C}" dt="2025-11-14T12:57:50.253" v="327"/>
+      <pc:docMkLst>
+        <pc:docMk/>
+      </pc:docMkLst>
+      <pc:sldChg chg="addSp delSp">
+        <pc:chgData name="#PAZHANISAMY HARISH PRABHU#" userId="S::harishpr001@e.ntu.edu.sg::35c7008f-c9e0-45f1-bf01-579da08733cb" providerId="AD" clId="Web-{C89215D8-8C39-B47C-C02E-ACF192385A8C}" dt="2025-11-14T12:57:50.253" v="327"/>
+        <pc:sldMkLst>
+          <pc:docMk/>
+          <pc:sldMk cId="78934428" sldId="258"/>
+        </pc:sldMkLst>
+        <pc:picChg chg="add del">
+          <ac:chgData name="#PAZHANISAMY HARISH PRABHU#" userId="S::harishpr001@e.ntu.edu.sg::35c7008f-c9e0-45f1-bf01-579da08733cb" providerId="AD" clId="Web-{C89215D8-8C39-B47C-C02E-ACF192385A8C}" dt="2025-11-14T12:57:50.253" v="327"/>
+          <ac:picMkLst>
+            <pc:docMk/>
+            <pc:sldMk cId="78934428" sldId="258"/>
+            <ac:picMk id="4" creationId="{FA9CCE84-F783-D51B-F8C5-F843704FEFDE}"/>
+          </ac:picMkLst>
+        </pc:picChg>
+      </pc:sldChg>
+      <pc:sldChg chg="addSp delSp modSp mod setBg modNotes">
+        <pc:chgData name="#PAZHANISAMY HARISH PRABHU#" userId="S::harishpr001@e.ntu.edu.sg::35c7008f-c9e0-45f1-bf01-579da08733cb" providerId="AD" clId="Web-{C89215D8-8C39-B47C-C02E-ACF192385A8C}" dt="2025-11-14T12:55:19.377" v="311" actId="20577"/>
+        <pc:sldMkLst>
+          <pc:docMk/>
+          <pc:sldMk cId="2027014821" sldId="262"/>
+        </pc:sldMkLst>
+        <pc:spChg chg="mod">
+          <ac:chgData name="#PAZHANISAMY HARISH PRABHU#" userId="S::harishpr001@e.ntu.edu.sg::35c7008f-c9e0-45f1-bf01-579da08733cb" providerId="AD" clId="Web-{C89215D8-8C39-B47C-C02E-ACF192385A8C}" dt="2025-11-14T11:59:17.662" v="11"/>
+          <ac:spMkLst>
+            <pc:docMk/>
+            <pc:sldMk cId="2027014821" sldId="262"/>
+            <ac:spMk id="2" creationId="{FB135779-5683-AA40-93FB-4719B6EEF287}"/>
+          </ac:spMkLst>
+        </pc:spChg>
+        <pc:spChg chg="del">
+          <ac:chgData name="#PAZHANISAMY HARISH PRABHU#" userId="S::harishpr001@e.ntu.edu.sg::35c7008f-c9e0-45f1-bf01-579da08733cb" providerId="AD" clId="Web-{C89215D8-8C39-B47C-C02E-ACF192385A8C}" dt="2025-11-14T11:55:19.659" v="0"/>
+          <ac:spMkLst>
+            <pc:docMk/>
+            <pc:sldMk cId="2027014821" sldId="262"/>
+            <ac:spMk id="4" creationId="{FE6840EC-1337-A21A-F6E3-552CAA964994}"/>
+          </ac:spMkLst>
+        </pc:spChg>
+        <pc:spChg chg="mod">
+          <ac:chgData name="#PAZHANISAMY HARISH PRABHU#" userId="S::harishpr001@e.ntu.edu.sg::35c7008f-c9e0-45f1-bf01-579da08733cb" providerId="AD" clId="Web-{C89215D8-8C39-B47C-C02E-ACF192385A8C}" dt="2025-11-14T12:55:19.377" v="311" actId="20577"/>
+          <ac:spMkLst>
+            <pc:docMk/>
+            <pc:sldMk cId="2027014821" sldId="262"/>
+            <ac:spMk id="5" creationId="{49EB4D8A-7185-BB8C-869D-37F826C0CAAA}"/>
+          </ac:spMkLst>
+        </pc:spChg>
+        <pc:spChg chg="add del mod">
+          <ac:chgData name="#PAZHANISAMY HARISH PRABHU#" userId="S::harishpr001@e.ntu.edu.sg::35c7008f-c9e0-45f1-bf01-579da08733cb" providerId="AD" clId="Web-{C89215D8-8C39-B47C-C02E-ACF192385A8C}" dt="2025-11-14T11:58:51.755" v="5"/>
+          <ac:spMkLst>
+            <pc:docMk/>
+            <pc:sldMk cId="2027014821" sldId="262"/>
+            <ac:spMk id="7" creationId="{486BD4E6-1862-5147-6918-6E7740017AFD}"/>
+          </ac:spMkLst>
+        </pc:spChg>
+        <pc:spChg chg="add del mod">
+          <ac:chgData name="#PAZHANISAMY HARISH PRABHU#" userId="S::harishpr001@e.ntu.edu.sg::35c7008f-c9e0-45f1-bf01-579da08733cb" providerId="AD" clId="Web-{C89215D8-8C39-B47C-C02E-ACF192385A8C}" dt="2025-11-14T12:04:56.857" v="19"/>
+          <ac:spMkLst>
+            <pc:docMk/>
+            <pc:sldMk cId="2027014821" sldId="262"/>
+            <ac:spMk id="10" creationId="{6E71B5AD-0388-F994-D3EC-AD0C5A665576}"/>
+          </ac:spMkLst>
+        </pc:spChg>
+        <pc:spChg chg="add del mod">
+          <ac:chgData name="#PAZHANISAMY HARISH PRABHU#" userId="S::harishpr001@e.ntu.edu.sg::35c7008f-c9e0-45f1-bf01-579da08733cb" providerId="AD" clId="Web-{C89215D8-8C39-B47C-C02E-ACF192385A8C}" dt="2025-11-14T12:09:58.351" v="28"/>
+          <ac:spMkLst>
+            <pc:docMk/>
+            <pc:sldMk cId="2027014821" sldId="262"/>
+            <ac:spMk id="13" creationId="{A145BE16-FF11-EEBA-4B29-E6B974E51E48}"/>
+          </ac:spMkLst>
+        </pc:spChg>
+        <pc:spChg chg="add del mod">
+          <ac:chgData name="#PAZHANISAMY HARISH PRABHU#" userId="S::harishpr001@e.ntu.edu.sg::35c7008f-c9e0-45f1-bf01-579da08733cb" providerId="AD" clId="Web-{C89215D8-8C39-B47C-C02E-ACF192385A8C}" dt="2025-11-14T12:30:37.549" v="117"/>
+          <ac:spMkLst>
+            <pc:docMk/>
+            <pc:sldMk cId="2027014821" sldId="262"/>
+            <ac:spMk id="16" creationId="{36477E8F-415A-96B0-E748-BDA61C4419EB}"/>
+          </ac:spMkLst>
+        </pc:spChg>
+        <pc:spChg chg="add del mod">
+          <ac:chgData name="#PAZHANISAMY HARISH PRABHU#" userId="S::harishpr001@e.ntu.edu.sg::35c7008f-c9e0-45f1-bf01-579da08733cb" providerId="AD" clId="Web-{C89215D8-8C39-B47C-C02E-ACF192385A8C}" dt="2025-11-14T12:36:14.314" v="126"/>
+          <ac:spMkLst>
+            <pc:docMk/>
+            <pc:sldMk cId="2027014821" sldId="262"/>
+            <ac:spMk id="19" creationId="{F07131AA-1F51-197C-656F-5BC42067A6E8}"/>
+          </ac:spMkLst>
+        </pc:spChg>
+        <pc:picChg chg="add del mod ord">
+          <ac:chgData name="#PAZHANISAMY HARISH PRABHU#" userId="S::harishpr001@e.ntu.edu.sg::35c7008f-c9e0-45f1-bf01-579da08733cb" providerId="AD" clId="Web-{C89215D8-8C39-B47C-C02E-ACF192385A8C}" dt="2025-11-14T11:58:17.724" v="4"/>
+          <ac:picMkLst>
+            <pc:docMk/>
+            <pc:sldMk cId="2027014821" sldId="262"/>
+            <ac:picMk id="3" creationId="{79F30ED4-CDFF-7333-84B6-7232FD1AA269}"/>
+          </ac:picMkLst>
+        </pc:picChg>
+        <pc:picChg chg="add del mod ord">
+          <ac:chgData name="#PAZHANISAMY HARISH PRABHU#" userId="S::harishpr001@e.ntu.edu.sg::35c7008f-c9e0-45f1-bf01-579da08733cb" providerId="AD" clId="Web-{C89215D8-8C39-B47C-C02E-ACF192385A8C}" dt="2025-11-14T12:04:44.356" v="18"/>
+          <ac:picMkLst>
+            <pc:docMk/>
+            <pc:sldMk cId="2027014821" sldId="262"/>
+            <ac:picMk id="8" creationId="{F801FB8A-FFC7-C0CC-9844-850C5B03646C}"/>
+          </ac:picMkLst>
+        </pc:picChg>
+        <pc:picChg chg="add del mod ord">
+          <ac:chgData name="#PAZHANISAMY HARISH PRABHU#" userId="S::harishpr001@e.ntu.edu.sg::35c7008f-c9e0-45f1-bf01-579da08733cb" providerId="AD" clId="Web-{C89215D8-8C39-B47C-C02E-ACF192385A8C}" dt="2025-11-14T12:09:52.663" v="27"/>
+          <ac:picMkLst>
+            <pc:docMk/>
+            <pc:sldMk cId="2027014821" sldId="262"/>
+            <ac:picMk id="11" creationId="{9FCB995D-2FA9-FD35-243F-441BDCFFC0FB}"/>
+          </ac:picMkLst>
+        </pc:picChg>
+        <pc:picChg chg="add del mod ord">
+          <ac:chgData name="#PAZHANISAMY HARISH PRABHU#" userId="S::harishpr001@e.ntu.edu.sg::35c7008f-c9e0-45f1-bf01-579da08733cb" providerId="AD" clId="Web-{C89215D8-8C39-B47C-C02E-ACF192385A8C}" dt="2025-11-14T12:30:10.080" v="116"/>
+          <ac:picMkLst>
+            <pc:docMk/>
+            <pc:sldMk cId="2027014821" sldId="262"/>
+            <ac:picMk id="14" creationId="{1461E9C6-6FDF-476F-EAA6-A8348B514980}"/>
+          </ac:picMkLst>
+        </pc:picChg>
+        <pc:picChg chg="add del mod ord">
+          <ac:chgData name="#PAZHANISAMY HARISH PRABHU#" userId="S::harishpr001@e.ntu.edu.sg::35c7008f-c9e0-45f1-bf01-579da08733cb" providerId="AD" clId="Web-{C89215D8-8C39-B47C-C02E-ACF192385A8C}" dt="2025-11-14T12:36:08.798" v="125"/>
+          <ac:picMkLst>
+            <pc:docMk/>
+            <pc:sldMk cId="2027014821" sldId="262"/>
+            <ac:picMk id="17" creationId="{5461C87E-3449-1915-DB80-3A9E2C89EA41}"/>
+          </ac:picMkLst>
+        </pc:picChg>
+        <pc:picChg chg="add mod ord">
+          <ac:chgData name="#PAZHANISAMY HARISH PRABHU#" userId="S::harishpr001@e.ntu.edu.sg::35c7008f-c9e0-45f1-bf01-579da08733cb" providerId="AD" clId="Web-{C89215D8-8C39-B47C-C02E-ACF192385A8C}" dt="2025-11-14T12:50:03.756" v="195" actId="14100"/>
+          <ac:picMkLst>
+            <pc:docMk/>
+            <pc:sldMk cId="2027014821" sldId="262"/>
+            <ac:picMk id="20" creationId="{766B4F54-9647-0034-6414-5B265AAED698}"/>
+          </ac:picMkLst>
+        </pc:picChg>
+      </pc:sldChg>
+      <pc:sldChg chg="modSp">
+        <pc:chgData name="#PAZHANISAMY HARISH PRABHU#" userId="S::harishpr001@e.ntu.edu.sg::35c7008f-c9e0-45f1-bf01-579da08733cb" providerId="AD" clId="Web-{C89215D8-8C39-B47C-C02E-ACF192385A8C}" dt="2025-11-14T12:51:26.118" v="231"/>
+        <pc:sldMkLst>
+          <pc:docMk/>
+          <pc:sldMk cId="3750020553" sldId="263"/>
+        </pc:sldMkLst>
+        <pc:spChg chg="mod">
+          <ac:chgData name="#PAZHANISAMY HARISH PRABHU#" userId="S::harishpr001@e.ntu.edu.sg::35c7008f-c9e0-45f1-bf01-579da08733cb" providerId="AD" clId="Web-{C89215D8-8C39-B47C-C02E-ACF192385A8C}" dt="2025-11-14T12:51:26.118" v="231"/>
+          <ac:spMkLst>
+            <pc:docMk/>
+            <pc:sldMk cId="3750020553" sldId="263"/>
+            <ac:spMk id="5" creationId="{1E530C0E-3F57-A88D-4925-2F34FD021BFF}"/>
+          </ac:spMkLst>
+        </pc:spChg>
+      </pc:sldChg>
+      <pc:sldChg chg="modSp">
+        <pc:chgData name="#PAZHANISAMY HARISH PRABHU#" userId="S::harishpr001@e.ntu.edu.sg::35c7008f-c9e0-45f1-bf01-579da08733cb" providerId="AD" clId="Web-{C89215D8-8C39-B47C-C02E-ACF192385A8C}" dt="2025-11-14T12:51:30.696" v="237"/>
+        <pc:sldMkLst>
+          <pc:docMk/>
+          <pc:sldMk cId="2068233959" sldId="264"/>
+        </pc:sldMkLst>
+        <pc:spChg chg="mod">
+          <ac:chgData name="#PAZHANISAMY HARISH PRABHU#" userId="S::harishpr001@e.ntu.edu.sg::35c7008f-c9e0-45f1-bf01-579da08733cb" providerId="AD" clId="Web-{C89215D8-8C39-B47C-C02E-ACF192385A8C}" dt="2025-11-14T12:51:30.696" v="237"/>
+          <ac:spMkLst>
+            <pc:docMk/>
+            <pc:sldMk cId="2068233959" sldId="264"/>
+            <ac:spMk id="5" creationId="{977177D4-E785-218D-9157-2BFA68A32616}"/>
+          </ac:spMkLst>
+        </pc:spChg>
+      </pc:sldChg>
+      <pc:sldChg chg="addSp delSp modSp">
+        <pc:chgData name="#PAZHANISAMY HARISH PRABHU#" userId="S::harishpr001@e.ntu.edu.sg::35c7008f-c9e0-45f1-bf01-579da08733cb" providerId="AD" clId="Web-{C89215D8-8C39-B47C-C02E-ACF192385A8C}" dt="2025-11-14T12:57:01.237" v="325" actId="20577"/>
+        <pc:sldMkLst>
+          <pc:docMk/>
+          <pc:sldMk cId="2462205672" sldId="265"/>
+        </pc:sldMkLst>
+        <pc:spChg chg="del">
+          <ac:chgData name="#PAZHANISAMY HARISH PRABHU#" userId="S::harishpr001@e.ntu.edu.sg::35c7008f-c9e0-45f1-bf01-579da08733cb" providerId="AD" clId="Web-{C89215D8-8C39-B47C-C02E-ACF192385A8C}" dt="2025-11-14T12:43:02.701" v="132"/>
+          <ac:spMkLst>
+            <pc:docMk/>
+            <pc:sldMk cId="2462205672" sldId="265"/>
+            <ac:spMk id="4" creationId="{C3779997-3DF4-35CC-9D60-A6E48A2D2D42}"/>
+          </ac:spMkLst>
+        </pc:spChg>
+        <pc:spChg chg="mod">
+          <ac:chgData name="#PAZHANISAMY HARISH PRABHU#" userId="S::harishpr001@e.ntu.edu.sg::35c7008f-c9e0-45f1-bf01-579da08733cb" providerId="AD" clId="Web-{C89215D8-8C39-B47C-C02E-ACF192385A8C}" dt="2025-11-14T12:57:01.237" v="325" actId="20577"/>
+          <ac:spMkLst>
+            <pc:docMk/>
+            <pc:sldMk cId="2462205672" sldId="265"/>
+            <ac:spMk id="5" creationId="{81CA29D8-BA1B-4FAC-19A7-9A257880D274}"/>
+          </ac:spMkLst>
+        </pc:spChg>
+        <pc:spChg chg="add del mod">
+          <ac:chgData name="#PAZHANISAMY HARISH PRABHU#" userId="S::harishpr001@e.ntu.edu.sg::35c7008f-c9e0-45f1-bf01-579da08733cb" providerId="AD" clId="Web-{C89215D8-8C39-B47C-C02E-ACF192385A8C}" dt="2025-11-14T12:46:01.139" v="139"/>
+          <ac:spMkLst>
+            <pc:docMk/>
+            <pc:sldMk cId="2462205672" sldId="265"/>
+            <ac:spMk id="7" creationId="{B6ECE2CB-DFC8-5FD1-7A2C-3101067EC052}"/>
+          </ac:spMkLst>
+        </pc:spChg>
+        <pc:picChg chg="add del mod ord">
+          <ac:chgData name="#PAZHANISAMY HARISH PRABHU#" userId="S::harishpr001@e.ntu.edu.sg::35c7008f-c9e0-45f1-bf01-579da08733cb" providerId="AD" clId="Web-{C89215D8-8C39-B47C-C02E-ACF192385A8C}" dt="2025-11-14T12:45:55.717" v="138"/>
+          <ac:picMkLst>
+            <pc:docMk/>
+            <pc:sldMk cId="2462205672" sldId="265"/>
+            <ac:picMk id="3" creationId="{EFB7DE3D-1A8C-E1B5-FF33-70F212335107}"/>
+          </ac:picMkLst>
+        </pc:picChg>
+        <pc:picChg chg="add mod ord">
+          <ac:chgData name="#PAZHANISAMY HARISH PRABHU#" userId="S::harishpr001@e.ntu.edu.sg::35c7008f-c9e0-45f1-bf01-579da08733cb" providerId="AD" clId="Web-{C89215D8-8C39-B47C-C02E-ACF192385A8C}" dt="2025-11-14T12:46:46.139" v="155" actId="1076"/>
+          <ac:picMkLst>
+            <pc:docMk/>
+            <pc:sldMk cId="2462205672" sldId="265"/>
+            <ac:picMk id="8" creationId="{4D7B25FF-79B5-872C-6F2E-ADD6567FC0F4}"/>
+          </ac:picMkLst>
+        </pc:picChg>
+      </pc:sldChg>
+    </pc:docChg>
+  </pc:docChgLst>
+  <pc:docChgLst>
+    <pc:chgData name="#PANG WEI JIE#" userId="S::pang0270@e.ntu.edu.sg::72bcae44-2dd7-4853-8947-6d110cf21fa4" providerId="AD" clId="Web-{BE1971C7-85DA-671A-5C03-87B2AA02E9C4}"/>
+    <pc:docChg chg="modSld">
+      <pc:chgData name="#PANG WEI JIE#" userId="S::pang0270@e.ntu.edu.sg::72bcae44-2dd7-4853-8947-6d110cf21fa4" providerId="AD" clId="Web-{BE1971C7-85DA-671A-5C03-87B2AA02E9C4}" dt="2025-11-14T16:23:38.534" v="1003"/>
+      <pc:docMkLst>
+        <pc:docMk/>
+      </pc:docMkLst>
+      <pc:sldChg chg="addSp delSp modSp">
+        <pc:chgData name="#PANG WEI JIE#" userId="S::pang0270@e.ntu.edu.sg::72bcae44-2dd7-4853-8947-6d110cf21fa4" providerId="AD" clId="Web-{BE1971C7-85DA-671A-5C03-87B2AA02E9C4}" dt="2025-11-14T15:42:34.450" v="100"/>
+        <pc:sldMkLst>
+          <pc:docMk/>
+          <pc:sldMk cId="2997418902" sldId="259"/>
+        </pc:sldMkLst>
+        <pc:spChg chg="add del mod">
+          <ac:chgData name="#PANG WEI JIE#" userId="S::pang0270@e.ntu.edu.sg::72bcae44-2dd7-4853-8947-6d110cf21fa4" providerId="AD" clId="Web-{BE1971C7-85DA-671A-5C03-87B2AA02E9C4}" dt="2025-11-14T15:21:35.943" v="96"/>
+          <ac:spMkLst>
+            <pc:docMk/>
+            <pc:sldMk cId="2997418902" sldId="259"/>
+            <ac:spMk id="4" creationId="{2FB4C7F4-8DE3-BC2C-AE07-11601ADAB60D}"/>
+          </ac:spMkLst>
+        </pc:spChg>
+        <pc:spChg chg="del">
+          <ac:chgData name="#PANG WEI JIE#" userId="S::pang0270@e.ntu.edu.sg::72bcae44-2dd7-4853-8947-6d110cf21fa4" providerId="AD" clId="Web-{BE1971C7-85DA-671A-5C03-87B2AA02E9C4}" dt="2025-11-14T13:44:07.351" v="46"/>
+          <ac:spMkLst>
+            <pc:docMk/>
+            <pc:sldMk cId="2997418902" sldId="259"/>
+            <ac:spMk id="5" creationId="{5D8EB816-C2B8-3706-69CE-3288B60F8392}"/>
+          </ac:spMkLst>
+        </pc:spChg>
+        <pc:spChg chg="mod">
+          <ac:chgData name="#PANG WEI JIE#" userId="S::pang0270@e.ntu.edu.sg::72bcae44-2dd7-4853-8947-6d110cf21fa4" providerId="AD" clId="Web-{BE1971C7-85DA-671A-5C03-87B2AA02E9C4}" dt="2025-11-14T13:46:21.966" v="93" actId="1076"/>
+          <ac:spMkLst>
+            <pc:docMk/>
+            <pc:sldMk cId="2997418902" sldId="259"/>
+            <ac:spMk id="6" creationId="{7453184F-6190-5D19-33CF-43374C24C7C8}"/>
+          </ac:spMkLst>
+        </pc:spChg>
+        <pc:spChg chg="add del mod">
+          <ac:chgData name="#PANG WEI JIE#" userId="S::pang0270@e.ntu.edu.sg::72bcae44-2dd7-4853-8947-6d110cf21fa4" providerId="AD" clId="Web-{BE1971C7-85DA-671A-5C03-87B2AA02E9C4}" dt="2025-11-14T13:46:09.450" v="90"/>
+          <ac:spMkLst>
+            <pc:docMk/>
+            <pc:sldMk cId="2997418902" sldId="259"/>
+            <ac:spMk id="7" creationId="{A3B07A68-FF29-8A5D-2C71-037E64574619}"/>
+          </ac:spMkLst>
+        </pc:spChg>
+        <pc:picChg chg="add del mod ord">
+          <ac:chgData name="#PANG WEI JIE#" userId="S::pang0270@e.ntu.edu.sg::72bcae44-2dd7-4853-8947-6d110cf21fa4" providerId="AD" clId="Web-{BE1971C7-85DA-671A-5C03-87B2AA02E9C4}" dt="2025-11-14T13:45:33.559" v="89"/>
+          <ac:picMkLst>
+            <pc:docMk/>
+            <pc:sldMk cId="2997418902" sldId="259"/>
+            <ac:picMk id="3" creationId="{B5CA7C3F-F028-3E99-63F4-05B74B28EC35}"/>
+          </ac:picMkLst>
+        </pc:picChg>
+        <pc:picChg chg="add mod ord">
+          <ac:chgData name="#PANG WEI JIE#" userId="S::pang0270@e.ntu.edu.sg::72bcae44-2dd7-4853-8947-6d110cf21fa4" providerId="AD" clId="Web-{BE1971C7-85DA-671A-5C03-87B2AA02E9C4}" dt="2025-11-14T15:42:34.450" v="100"/>
+          <ac:picMkLst>
+            <pc:docMk/>
+            <pc:sldMk cId="2997418902" sldId="259"/>
+            <ac:picMk id="5" creationId="{F540DBB2-2EF1-B7DD-6270-087B913C277F}"/>
+          </ac:picMkLst>
+        </pc:picChg>
+        <pc:picChg chg="add del mod ord">
+          <ac:chgData name="#PANG WEI JIE#" userId="S::pang0270@e.ntu.edu.sg::72bcae44-2dd7-4853-8947-6d110cf21fa4" providerId="AD" clId="Web-{BE1971C7-85DA-671A-5C03-87B2AA02E9C4}" dt="2025-11-14T15:21:30.225" v="95"/>
+          <ac:picMkLst>
+            <pc:docMk/>
+            <pc:sldMk cId="2997418902" sldId="259"/>
+            <ac:picMk id="8" creationId="{36A62385-7637-6A8B-B492-34F87279BA19}"/>
+          </ac:picMkLst>
+        </pc:picChg>
+      </pc:sldChg>
+      <pc:sldChg chg="modNotes">
+        <pc:chgData name="#PANG WEI JIE#" userId="S::pang0270@e.ntu.edu.sg::72bcae44-2dd7-4853-8947-6d110cf21fa4" providerId="AD" clId="Web-{BE1971C7-85DA-671A-5C03-87B2AA02E9C4}" dt="2025-11-14T16:16:00.294" v="512"/>
+        <pc:sldMkLst>
+          <pc:docMk/>
+          <pc:sldMk cId="2027014821" sldId="262"/>
+        </pc:sldMkLst>
+      </pc:sldChg>
+      <pc:sldChg chg="modSp">
+        <pc:chgData name="#PANG WEI JIE#" userId="S::pang0270@e.ntu.edu.sg::72bcae44-2dd7-4853-8947-6d110cf21fa4" providerId="AD" clId="Web-{BE1971C7-85DA-671A-5C03-87B2AA02E9C4}" dt="2025-11-14T11:43:51.346" v="18" actId="20577"/>
+        <pc:sldMkLst>
+          <pc:docMk/>
+          <pc:sldMk cId="3750020553" sldId="263"/>
+        </pc:sldMkLst>
+        <pc:spChg chg="mod">
+          <ac:chgData name="#PANG WEI JIE#" userId="S::pang0270@e.ntu.edu.sg::72bcae44-2dd7-4853-8947-6d110cf21fa4" providerId="AD" clId="Web-{BE1971C7-85DA-671A-5C03-87B2AA02E9C4}" dt="2025-11-14T11:43:51.346" v="18" actId="20577"/>
+          <ac:spMkLst>
+            <pc:docMk/>
+            <pc:sldMk cId="3750020553" sldId="263"/>
+            <ac:spMk id="5" creationId="{1E530C0E-3F57-A88D-4925-2F34FD021BFF}"/>
+          </ac:spMkLst>
+        </pc:spChg>
+      </pc:sldChg>
+      <pc:sldChg chg="modSp">
+        <pc:chgData name="#PANG WEI JIE#" userId="S::pang0270@e.ntu.edu.sg::72bcae44-2dd7-4853-8947-6d110cf21fa4" providerId="AD" clId="Web-{BE1971C7-85DA-671A-5C03-87B2AA02E9C4}" dt="2025-11-14T11:44:38.335" v="45" actId="20577"/>
+        <pc:sldMkLst>
+          <pc:docMk/>
+          <pc:sldMk cId="2068233959" sldId="264"/>
+        </pc:sldMkLst>
+        <pc:spChg chg="mod">
+          <ac:chgData name="#PANG WEI JIE#" userId="S::pang0270@e.ntu.edu.sg::72bcae44-2dd7-4853-8947-6d110cf21fa4" providerId="AD" clId="Web-{BE1971C7-85DA-671A-5C03-87B2AA02E9C4}" dt="2025-11-14T11:44:38.335" v="45" actId="20577"/>
+          <ac:spMkLst>
+            <pc:docMk/>
+            <pc:sldMk cId="2068233959" sldId="264"/>
+            <ac:spMk id="5" creationId="{977177D4-E785-218D-9157-2BFA68A32616}"/>
+          </ac:spMkLst>
+        </pc:spChg>
+      </pc:sldChg>
+      <pc:sldChg chg="modNotes">
+        <pc:chgData name="#PANG WEI JIE#" userId="S::pang0270@e.ntu.edu.sg::72bcae44-2dd7-4853-8947-6d110cf21fa4" providerId="AD" clId="Web-{BE1971C7-85DA-671A-5C03-87B2AA02E9C4}" dt="2025-11-14T16:22:10.265" v="949"/>
+        <pc:sldMkLst>
+          <pc:docMk/>
+          <pc:sldMk cId="919294963" sldId="266"/>
+        </pc:sldMkLst>
+      </pc:sldChg>
+      <pc:sldChg chg="modNotes">
+        <pc:chgData name="#PANG WEI JIE#" userId="S::pang0270@e.ntu.edu.sg::72bcae44-2dd7-4853-8947-6d110cf21fa4" providerId="AD" clId="Web-{BE1971C7-85DA-671A-5C03-87B2AA02E9C4}" dt="2025-11-14T16:23:38.534" v="1003"/>
+        <pc:sldMkLst>
+          <pc:docMk/>
+          <pc:sldMk cId="2938145853" sldId="267"/>
+        </pc:sldMkLst>
+      </pc:sldChg>
+    </pc:docChg>
+  </pc:docChgLst>
+  <pc:docChgLst>
+    <pc:chgData name="#PAZHANISAMY HARISH PRABHU#" userId="35c7008f-c9e0-45f1-bf01-579da08733cb" providerId="ADAL" clId="{6675E1E3-F3A2-3D67-AED3-4C0B923C8A72}"/>
+    <pc:docChg chg="modSld">
+      <pc:chgData name="#PAZHANISAMY HARISH PRABHU#" userId="35c7008f-c9e0-45f1-bf01-579da08733cb" providerId="ADAL" clId="{6675E1E3-F3A2-3D67-AED3-4C0B923C8A72}" dt="2025-11-15T00:58:16.488" v="38" actId="114"/>
+      <pc:docMkLst>
+        <pc:docMk/>
+      </pc:docMkLst>
+      <pc:sldChg chg="modSp mod">
+        <pc:chgData name="#PAZHANISAMY HARISH PRABHU#" userId="35c7008f-c9e0-45f1-bf01-579da08733cb" providerId="ADAL" clId="{6675E1E3-F3A2-3D67-AED3-4C0B923C8A72}" dt="2025-11-15T00:58:16.488" v="38" actId="114"/>
+        <pc:sldMkLst>
+          <pc:docMk/>
+          <pc:sldMk cId="3750020553" sldId="263"/>
+        </pc:sldMkLst>
+        <pc:spChg chg="mod">
+          <ac:chgData name="#PAZHANISAMY HARISH PRABHU#" userId="35c7008f-c9e0-45f1-bf01-579da08733cb" providerId="ADAL" clId="{6675E1E3-F3A2-3D67-AED3-4C0B923C8A72}" dt="2025-11-15T00:58:16.488" v="38" actId="114"/>
+          <ac:spMkLst>
+            <pc:docMk/>
+            <pc:sldMk cId="3750020553" sldId="263"/>
+            <ac:spMk id="5" creationId="{1E530C0E-3F57-A88D-4925-2F34FD021BFF}"/>
+          </ac:spMkLst>
+        </pc:spChg>
+      </pc:sldChg>
+    </pc:docChg>
+  </pc:docChgLst>
+  <pc:docChgLst>
+    <pc:chgData name="#LWIN MOE OO#" userId="S::c250007@e.ntu.edu.sg::1dd09941-d6d3-49cc-acff-7c552bc2aac0" providerId="AD" clId="Web-{0FFB4083-3B2E-2A6A-F0E7-C0FF5C836540}"/>
+    <pc:docChg chg="addSld delSld modSld sldOrd">
+      <pc:chgData name="#LWIN MOE OO#" userId="S::c250007@e.ntu.edu.sg::1dd09941-d6d3-49cc-acff-7c552bc2aac0" providerId="AD" clId="Web-{0FFB4083-3B2E-2A6A-F0E7-C0FF5C836540}" dt="2025-11-15T03:30:08.242" v="224" actId="20577"/>
+      <pc:docMkLst>
+        <pc:docMk/>
+      </pc:docMkLst>
+      <pc:sldChg chg="modSp">
+        <pc:chgData name="#LWIN MOE OO#" userId="S::c250007@e.ntu.edu.sg::1dd09941-d6d3-49cc-acff-7c552bc2aac0" providerId="AD" clId="Web-{0FFB4083-3B2E-2A6A-F0E7-C0FF5C836540}" dt="2025-11-15T03:30:08.242" v="224" actId="20577"/>
+        <pc:sldMkLst>
+          <pc:docMk/>
+          <pc:sldMk cId="109857222" sldId="256"/>
+        </pc:sldMkLst>
+        <pc:spChg chg="mod">
+          <ac:chgData name="#LWIN MOE OO#" userId="S::c250007@e.ntu.edu.sg::1dd09941-d6d3-49cc-acff-7c552bc2aac0" providerId="AD" clId="Web-{0FFB4083-3B2E-2A6A-F0E7-C0FF5C836540}" dt="2025-11-15T03:30:08.242" v="224" actId="20577"/>
+          <ac:spMkLst>
+            <pc:docMk/>
+            <pc:sldMk cId="109857222" sldId="256"/>
+            <ac:spMk id="3" creationId="{00000000-0000-0000-0000-000000000000}"/>
+          </ac:spMkLst>
+        </pc:spChg>
+      </pc:sldChg>
+      <pc:sldChg chg="modNotes">
+        <pc:chgData name="#LWIN MOE OO#" userId="S::c250007@e.ntu.edu.sg::1dd09941-d6d3-49cc-acff-7c552bc2aac0" providerId="AD" clId="Web-{0FFB4083-3B2E-2A6A-F0E7-C0FF5C836540}" dt="2025-11-15T01:55:14.126" v="88"/>
+        <pc:sldMkLst>
+          <pc:docMk/>
+          <pc:sldMk cId="2703079337" sldId="257"/>
+        </pc:sldMkLst>
+      </pc:sldChg>
+      <pc:sldChg chg="modNotes">
+        <pc:chgData name="#LWIN MOE OO#" userId="S::c250007@e.ntu.edu.sg::1dd09941-d6d3-49cc-acff-7c552bc2aac0" providerId="AD" clId="Web-{0FFB4083-3B2E-2A6A-F0E7-C0FF5C836540}" dt="2025-11-15T03:29:39.255" v="218"/>
+        <pc:sldMkLst>
+          <pc:docMk/>
+          <pc:sldMk cId="2462205672" sldId="265"/>
+        </pc:sldMkLst>
+      </pc:sldChg>
+      <pc:sldChg chg="new del ord">
+        <pc:chgData name="#LWIN MOE OO#" userId="S::c250007@e.ntu.edu.sg::1dd09941-d6d3-49cc-acff-7c552bc2aac0" providerId="AD" clId="Web-{0FFB4083-3B2E-2A6A-F0E7-C0FF5C836540}" dt="2025-11-15T01:50:28.494" v="2"/>
+        <pc:sldMkLst>
+          <pc:docMk/>
+          <pc:sldMk cId="1784699216" sldId="268"/>
+        </pc:sldMkLst>
+      </pc:sldChg>
+      <pc:sldChg chg="addSp delSp modSp add replId modNotes">
+        <pc:chgData name="#LWIN MOE OO#" userId="S::c250007@e.ntu.edu.sg::1dd09941-d6d3-49cc-acff-7c552bc2aac0" providerId="AD" clId="Web-{0FFB4083-3B2E-2A6A-F0E7-C0FF5C836540}" dt="2025-11-15T01:54:59.297" v="83"/>
+        <pc:sldMkLst>
+          <pc:docMk/>
+          <pc:sldMk cId="2290913640" sldId="268"/>
+        </pc:sldMkLst>
+        <pc:spChg chg="mod">
+          <ac:chgData name="#LWIN MOE OO#" userId="S::c250007@e.ntu.edu.sg::1dd09941-d6d3-49cc-acff-7c552bc2aac0" providerId="AD" clId="Web-{0FFB4083-3B2E-2A6A-F0E7-C0FF5C836540}" dt="2025-11-15T01:50:36.166" v="14" actId="20577"/>
+          <ac:spMkLst>
+            <pc:docMk/>
+            <pc:sldMk cId="2290913640" sldId="268"/>
+            <ac:spMk id="2" creationId="{CF9F2A83-2C2A-2C28-4E04-3765D39B5276}"/>
+          </ac:spMkLst>
+        </pc:spChg>
+        <pc:spChg chg="del">
+          <ac:chgData name="#LWIN MOE OO#" userId="S::c250007@e.ntu.edu.sg::1dd09941-d6d3-49cc-acff-7c552bc2aac0" providerId="AD" clId="Web-{0FFB4083-3B2E-2A6A-F0E7-C0FF5C836540}" dt="2025-11-15T01:50:48.151" v="21"/>
+          <ac:spMkLst>
+            <pc:docMk/>
+            <pc:sldMk cId="2290913640" sldId="268"/>
+            <ac:spMk id="4" creationId="{36C1E517-BB27-B401-429B-3FA3AC3D914E}"/>
+          </ac:spMkLst>
+        </pc:spChg>
+        <pc:spChg chg="del">
+          <ac:chgData name="#LWIN MOE OO#" userId="S::c250007@e.ntu.edu.sg::1dd09941-d6d3-49cc-acff-7c552bc2aac0" providerId="AD" clId="Web-{0FFB4083-3B2E-2A6A-F0E7-C0FF5C836540}" dt="2025-11-15T01:50:49.932" v="22"/>
+          <ac:spMkLst>
+            <pc:docMk/>
+            <pc:sldMk cId="2290913640" sldId="268"/>
+            <ac:spMk id="5" creationId="{7A264743-D80B-00DD-0E49-F6F3EC331B95}"/>
+          </ac:spMkLst>
+        </pc:spChg>
+        <pc:spChg chg="del">
+          <ac:chgData name="#LWIN MOE OO#" userId="S::c250007@e.ntu.edu.sg::1dd09941-d6d3-49cc-acff-7c552bc2aac0" providerId="AD" clId="Web-{0FFB4083-3B2E-2A6A-F0E7-C0FF5C836540}" dt="2025-11-15T01:50:46.198" v="20"/>
+          <ac:spMkLst>
+            <pc:docMk/>
+            <pc:sldMk cId="2290913640" sldId="268"/>
+            <ac:spMk id="8" creationId="{A62BA736-A0B3-1A37-959C-251231AC5F95}"/>
+          </ac:spMkLst>
+        </pc:spChg>
+        <pc:spChg chg="del">
+          <ac:chgData name="#LWIN MOE OO#" userId="S::c250007@e.ntu.edu.sg::1dd09941-d6d3-49cc-acff-7c552bc2aac0" providerId="AD" clId="Web-{0FFB4083-3B2E-2A6A-F0E7-C0FF5C836540}" dt="2025-11-15T01:50:40.588" v="15"/>
+          <ac:spMkLst>
+            <pc:docMk/>
+            <pc:sldMk cId="2290913640" sldId="268"/>
+            <ac:spMk id="9" creationId="{ACD535E7-C894-7211-C671-431CEDC6FAB7}"/>
+          </ac:spMkLst>
+        </pc:spChg>
+        <pc:spChg chg="add del mod">
+          <ac:chgData name="#LWIN MOE OO#" userId="S::c250007@e.ntu.edu.sg::1dd09941-d6d3-49cc-acff-7c552bc2aac0" providerId="AD" clId="Web-{0FFB4083-3B2E-2A6A-F0E7-C0FF5C836540}" dt="2025-11-15T01:51:37.215" v="23"/>
+          <ac:spMkLst>
+            <pc:docMk/>
+            <pc:sldMk cId="2290913640" sldId="268"/>
+            <ac:spMk id="12" creationId="{48B7580D-998A-73F6-4970-3668344850D6}"/>
+          </ac:spMkLst>
+        </pc:spChg>
+        <pc:spChg chg="add mod">
+          <ac:chgData name="#LWIN MOE OO#" userId="S::c250007@e.ntu.edu.sg::1dd09941-d6d3-49cc-acff-7c552bc2aac0" providerId="AD" clId="Web-{0FFB4083-3B2E-2A6A-F0E7-C0FF5C836540}" dt="2025-11-15T01:53:24.608" v="74" actId="14100"/>
+          <ac:spMkLst>
+            <pc:docMk/>
+            <pc:sldMk cId="2290913640" sldId="268"/>
+            <ac:spMk id="14" creationId="{0FC3220C-89B3-CE69-CB38-3FFB5D52D568}"/>
+          </ac:spMkLst>
+        </pc:spChg>
+        <pc:spChg chg="add del mod">
+          <ac:chgData name="#LWIN MOE OO#" userId="S::c250007@e.ntu.edu.sg::1dd09941-d6d3-49cc-acff-7c552bc2aac0" providerId="AD" clId="Web-{0FFB4083-3B2E-2A6A-F0E7-C0FF5C836540}" dt="2025-11-15T01:53:07.951" v="66"/>
+          <ac:spMkLst>
+            <pc:docMk/>
+            <pc:sldMk cId="2290913640" sldId="268"/>
+            <ac:spMk id="17" creationId="{78A7E279-D28D-548B-B7CE-1ADF761CA0ED}"/>
+          </ac:spMkLst>
+        </pc:spChg>
+        <pc:picChg chg="del">
+          <ac:chgData name="#LWIN MOE OO#" userId="S::c250007@e.ntu.edu.sg::1dd09941-d6d3-49cc-acff-7c552bc2aac0" providerId="AD" clId="Web-{0FFB4083-3B2E-2A6A-F0E7-C0FF5C836540}" dt="2025-11-15T01:50:43.588" v="18"/>
+          <ac:picMkLst>
+            <pc:docMk/>
+            <pc:sldMk cId="2290913640" sldId="268"/>
+            <ac:picMk id="3" creationId="{2A055D93-B870-5190-220E-E1A7E538C51D}"/>
+          </ac:picMkLst>
+        </pc:picChg>
+        <pc:picChg chg="del">
+          <ac:chgData name="#LWIN MOE OO#" userId="S::c250007@e.ntu.edu.sg::1dd09941-d6d3-49cc-acff-7c552bc2aac0" providerId="AD" clId="Web-{0FFB4083-3B2E-2A6A-F0E7-C0FF5C836540}" dt="2025-11-15T01:50:42.369" v="16"/>
+          <ac:picMkLst>
+            <pc:docMk/>
+            <pc:sldMk cId="2290913640" sldId="268"/>
+            <ac:picMk id="6" creationId="{69B104B1-EC6D-5CCB-EA6A-95FB8FBA12AF}"/>
+          </ac:picMkLst>
+        </pc:picChg>
+        <pc:picChg chg="del">
+          <ac:chgData name="#LWIN MOE OO#" userId="S::c250007@e.ntu.edu.sg::1dd09941-d6d3-49cc-acff-7c552bc2aac0" providerId="AD" clId="Web-{0FFB4083-3B2E-2A6A-F0E7-C0FF5C836540}" dt="2025-11-15T01:50:43.057" v="17"/>
+          <ac:picMkLst>
+            <pc:docMk/>
+            <pc:sldMk cId="2290913640" sldId="268"/>
+            <ac:picMk id="7" creationId="{AC2F3776-EA9D-E7E8-DA3E-8B2785AC293B}"/>
+          </ac:picMkLst>
+        </pc:picChg>
+        <pc:picChg chg="del">
+          <ac:chgData name="#LWIN MOE OO#" userId="S::c250007@e.ntu.edu.sg::1dd09941-d6d3-49cc-acff-7c552bc2aac0" providerId="AD" clId="Web-{0FFB4083-3B2E-2A6A-F0E7-C0FF5C836540}" dt="2025-11-15T01:50:44.354" v="19"/>
+          <ac:picMkLst>
+            <pc:docMk/>
+            <pc:sldMk cId="2290913640" sldId="268"/>
+            <ac:picMk id="10" creationId="{87DAD690-85F1-0028-EF17-04375BAE3DD2}"/>
+          </ac:picMkLst>
+        </pc:picChg>
+        <pc:picChg chg="add del mod ord">
+          <ac:chgData name="#LWIN MOE OO#" userId="S::c250007@e.ntu.edu.sg::1dd09941-d6d3-49cc-acff-7c552bc2aac0" providerId="AD" clId="Web-{0FFB4083-3B2E-2A6A-F0E7-C0FF5C836540}" dt="2025-11-15T01:53:07.030" v="65"/>
+          <ac:picMkLst>
+            <pc:docMk/>
+            <pc:sldMk cId="2290913640" sldId="268"/>
+            <ac:picMk id="15" creationId="{5E0BAAA4-792E-6106-797A-EF7E1B0906D5}"/>
+          </ac:picMkLst>
+        </pc:picChg>
+        <pc:picChg chg="add mod ord">
+          <ac:chgData name="#LWIN MOE OO#" userId="S::c250007@e.ntu.edu.sg::1dd09941-d6d3-49cc-acff-7c552bc2aac0" providerId="AD" clId="Web-{0FFB4083-3B2E-2A6A-F0E7-C0FF5C836540}" dt="2025-11-15T01:53:32.155" v="78" actId="1076"/>
+          <ac:picMkLst>
+            <pc:docMk/>
+            <pc:sldMk cId="2290913640" sldId="268"/>
+            <ac:picMk id="18" creationId="{5D9D5CD2-7ECE-3F4B-B248-3599FDEB8EDE}"/>
+          </ac:picMkLst>
+        </pc:picChg>
+      </pc:sldChg>
+    </pc:docChg>
+  </pc:docChgLst>
+  <pc:docChgLst>
+    <pc:chgData name="#PANG WEI JIE#" userId="S::pang0270@e.ntu.edu.sg::72bcae44-2dd7-4853-8947-6d110cf21fa4" providerId="AD" clId="Web-{EE17A552-D654-6A9E-1CCE-A3E26FF5F752}"/>
+    <pc:docChg chg="addSld modSld">
+      <pc:chgData name="#PANG WEI JIE#" userId="S::pang0270@e.ntu.edu.sg::72bcae44-2dd7-4853-8947-6d110cf21fa4" providerId="AD" clId="Web-{EE17A552-D654-6A9E-1CCE-A3E26FF5F752}" dt="2025-11-13T02:27:33.630" v="3" actId="20577"/>
+      <pc:docMkLst>
+        <pc:docMk/>
+      </pc:docMkLst>
+      <pc:sldChg chg="modSp new">
+        <pc:chgData name="#PANG WEI JIE#" userId="S::pang0270@e.ntu.edu.sg::72bcae44-2dd7-4853-8947-6d110cf21fa4" providerId="AD" clId="Web-{EE17A552-D654-6A9E-1CCE-A3E26FF5F752}" dt="2025-11-13T02:27:33.630" v="3" actId="20577"/>
+        <pc:sldMkLst>
+          <pc:docMk/>
+          <pc:sldMk cId="2938145853" sldId="267"/>
+        </pc:sldMkLst>
+        <pc:spChg chg="mod">
+          <ac:chgData name="#PANG WEI JIE#" userId="S::pang0270@e.ntu.edu.sg::72bcae44-2dd7-4853-8947-6d110cf21fa4" providerId="AD" clId="Web-{EE17A552-D654-6A9E-1CCE-A3E26FF5F752}" dt="2025-11-13T02:27:33.630" v="3" actId="20577"/>
+          <ac:spMkLst>
+            <pc:docMk/>
+            <pc:sldMk cId="2938145853" sldId="267"/>
+            <ac:spMk id="2" creationId="{9A0062FA-AB51-B3CA-5DB0-943C3DC53AA8}"/>
+          </ac:spMkLst>
+        </pc:spChg>
+      </pc:sldChg>
+    </pc:docChg>
+  </pc:docChgLst>
+  <pc:docChgLst>
+    <pc:chgData name="#MURPHY WONG KAH LEONG#" userId="S::murp0002@e.ntu.edu.sg::215c4a66-cb52-4461-8f6c-adbfeca3fdd7" providerId="AD" clId="Web-{4D5FD745-66A4-826D-CC6B-AD216AA2BB48}"/>
+    <pc:docChg chg="modSld">
+      <pc:chgData name="#MURPHY WONG KAH LEONG#" userId="S::murp0002@e.ntu.edu.sg::215c4a66-cb52-4461-8f6c-adbfeca3fdd7" providerId="AD" clId="Web-{4D5FD745-66A4-826D-CC6B-AD216AA2BB48}" dt="2025-11-14T11:10:54.366" v="21"/>
+      <pc:docMkLst>
+        <pc:docMk/>
+      </pc:docMkLst>
+      <pc:sldChg chg="addSp delSp modSp">
+        <pc:chgData name="#MURPHY WONG KAH LEONG#" userId="S::murp0002@e.ntu.edu.sg::215c4a66-cb52-4461-8f6c-adbfeca3fdd7" providerId="AD" clId="Web-{4D5FD745-66A4-826D-CC6B-AD216AA2BB48}" dt="2025-11-14T11:07:04.174" v="17" actId="1076"/>
+        <pc:sldMkLst>
+          <pc:docMk/>
+          <pc:sldMk cId="3750020553" sldId="263"/>
+        </pc:sldMkLst>
+        <pc:spChg chg="del">
+          <ac:chgData name="#MURPHY WONG KAH LEONG#" userId="S::murp0002@e.ntu.edu.sg::215c4a66-cb52-4461-8f6c-adbfeca3fdd7" providerId="AD" clId="Web-{4D5FD745-66A4-826D-CC6B-AD216AA2BB48}" dt="2025-11-14T11:06:50.487" v="14"/>
+          <ac:spMkLst>
+            <pc:docMk/>
+            <pc:sldMk cId="3750020553" sldId="263"/>
+            <ac:spMk id="4" creationId="{9BA393D6-05DB-0DCE-8273-E5BF970E60A7}"/>
+          </ac:spMkLst>
+        </pc:spChg>
+        <pc:picChg chg="add mod ord">
+          <ac:chgData name="#MURPHY WONG KAH LEONG#" userId="S::murp0002@e.ntu.edu.sg::215c4a66-cb52-4461-8f6c-adbfeca3fdd7" providerId="AD" clId="Web-{4D5FD745-66A4-826D-CC6B-AD216AA2BB48}" dt="2025-11-14T11:07:04.174" v="17" actId="1076"/>
+          <ac:picMkLst>
+            <pc:docMk/>
+            <pc:sldMk cId="3750020553" sldId="263"/>
+            <ac:picMk id="3" creationId="{ECF32245-771B-6201-D219-516F28A0632A}"/>
+          </ac:picMkLst>
+        </pc:picChg>
+      </pc:sldChg>
+      <pc:sldChg chg="addSp delSp modSp">
+        <pc:chgData name="#MURPHY WONG KAH LEONG#" userId="S::murp0002@e.ntu.edu.sg::215c4a66-cb52-4461-8f6c-adbfeca3fdd7" providerId="AD" clId="Web-{4D5FD745-66A4-826D-CC6B-AD216AA2BB48}" dt="2025-11-14T11:10:54.366" v="21"/>
+        <pc:sldMkLst>
+          <pc:docMk/>
+          <pc:sldMk cId="2068233959" sldId="264"/>
+        </pc:sldMkLst>
+        <pc:spChg chg="del">
+          <ac:chgData name="#MURPHY WONG KAH LEONG#" userId="S::murp0002@e.ntu.edu.sg::215c4a66-cb52-4461-8f6c-adbfeca3fdd7" providerId="AD" clId="Web-{4D5FD745-66A4-826D-CC6B-AD216AA2BB48}" dt="2025-11-14T10:52:20.992" v="0"/>
+          <ac:spMkLst>
+            <pc:docMk/>
+            <pc:sldMk cId="2068233959" sldId="264"/>
+            <ac:spMk id="4" creationId="{5F1605E7-A522-1924-4F86-B77A1C4D23F3}"/>
+          </ac:spMkLst>
+        </pc:spChg>
+        <pc:spChg chg="mod">
+          <ac:chgData name="#MURPHY WONG KAH LEONG#" userId="S::murp0002@e.ntu.edu.sg::215c4a66-cb52-4461-8f6c-adbfeca3fdd7" providerId="AD" clId="Web-{4D5FD745-66A4-826D-CC6B-AD216AA2BB48}" dt="2025-11-14T10:53:01.758" v="13" actId="20577"/>
+          <ac:spMkLst>
+            <pc:docMk/>
+            <pc:sldMk cId="2068233959" sldId="264"/>
+            <ac:spMk id="5" creationId="{977177D4-E785-218D-9157-2BFA68A32616}"/>
+          </ac:spMkLst>
+        </pc:spChg>
+        <pc:picChg chg="add mod ord">
+          <ac:chgData name="#MURPHY WONG KAH LEONG#" userId="S::murp0002@e.ntu.edu.sg::215c4a66-cb52-4461-8f6c-adbfeca3fdd7" providerId="AD" clId="Web-{4D5FD745-66A4-826D-CC6B-AD216AA2BB48}" dt="2025-11-14T10:52:23.539" v="1" actId="1076"/>
+          <ac:picMkLst>
+            <pc:docMk/>
+            <pc:sldMk cId="2068233959" sldId="264"/>
+            <ac:picMk id="3" creationId="{C6263184-BBFC-730F-6BA9-C875CA087BA9}"/>
+          </ac:picMkLst>
+        </pc:picChg>
+        <pc:picChg chg="add del mod">
+          <ac:chgData name="#MURPHY WONG KAH LEONG#" userId="S::murp0002@e.ntu.edu.sg::215c4a66-cb52-4461-8f6c-adbfeca3fdd7" providerId="AD" clId="Web-{4D5FD745-66A4-826D-CC6B-AD216AA2BB48}" dt="2025-11-14T10:52:31.602" v="6"/>
+          <ac:picMkLst>
+            <pc:docMk/>
+            <pc:sldMk cId="2068233959" sldId="264"/>
+            <ac:picMk id="6" creationId="{B95DBDCA-CAC0-DAFE-2201-9792180E4E00}"/>
+          </ac:picMkLst>
+        </pc:picChg>
+        <pc:picChg chg="add del mod">
+          <ac:chgData name="#MURPHY WONG KAH LEONG#" userId="S::murp0002@e.ntu.edu.sg::215c4a66-cb52-4461-8f6c-adbfeca3fdd7" providerId="AD" clId="Web-{4D5FD745-66A4-826D-CC6B-AD216AA2BB48}" dt="2025-11-14T11:10:31.257" v="19"/>
+          <ac:picMkLst>
+            <pc:docMk/>
+            <pc:sldMk cId="2068233959" sldId="264"/>
+            <ac:picMk id="7" creationId="{EAA8AC98-2316-2B42-8A90-0A470CE170DD}"/>
+          </ac:picMkLst>
+        </pc:picChg>
+        <pc:picChg chg="add del">
+          <ac:chgData name="#MURPHY WONG KAH LEONG#" userId="S::murp0002@e.ntu.edu.sg::215c4a66-cb52-4461-8f6c-adbfeca3fdd7" providerId="AD" clId="Web-{4D5FD745-66A4-826D-CC6B-AD216AA2BB48}" dt="2025-11-14T11:10:54.366" v="21"/>
+          <ac:picMkLst>
+            <pc:docMk/>
+            <pc:sldMk cId="2068233959" sldId="264"/>
+            <ac:picMk id="9" creationId="{BADFDDAF-9D56-041C-63B4-22A0DDCB332B}"/>
+          </ac:picMkLst>
+        </pc:picChg>
+      </pc:sldChg>
+    </pc:docChg>
+  </pc:docChgLst>
+  <pc:docChgLst>
+    <pc:chgData name="#PAZHANISAMY HARISH PRABHU#" userId="S::harishpr001@e.ntu.edu.sg::35c7008f-c9e0-45f1-bf01-579da08733cb" providerId="AD" clId="Web-{57B659E1-75D9-087F-E1B2-74E737E57077}"/>
+    <pc:docChg chg="modSld">
+      <pc:chgData name="#PAZHANISAMY HARISH PRABHU#" userId="S::harishpr001@e.ntu.edu.sg::35c7008f-c9e0-45f1-bf01-579da08733cb" providerId="AD" clId="Web-{57B659E1-75D9-087F-E1B2-74E737E57077}" dt="2025-11-15T02:56:53.203" v="392"/>
+      <pc:docMkLst>
+        <pc:docMk/>
+      </pc:docMkLst>
+    </pc:docChg>
+  </pc:docChgLst>
+  <pc:docChgLst>
+    <pc:chgData name="#MURPHY WONG KAH LEONG#" userId="S::murp0002@e.ntu.edu.sg::215c4a66-cb52-4461-8f6c-adbfeca3fdd7" providerId="AD" clId="Web-{9D2C9B19-56C7-17EF-A3E0-2961AF1D54ED}"/>
+    <pc:docChg chg="addSld delSld modSld">
+      <pc:chgData name="#MURPHY WONG KAH LEONG#" userId="S::murp0002@e.ntu.edu.sg::215c4a66-cb52-4461-8f6c-adbfeca3fdd7" providerId="AD" clId="Web-{9D2C9B19-56C7-17EF-A3E0-2961AF1D54ED}" dt="2025-11-12T13:07:47.826" v="4"/>
+      <pc:docMkLst>
+        <pc:docMk/>
+      </pc:docMkLst>
+      <pc:sldChg chg="modSp">
+        <pc:chgData name="#MURPHY WONG KAH LEONG#" userId="S::murp0002@e.ntu.edu.sg::215c4a66-cb52-4461-8f6c-adbfeca3fdd7" providerId="AD" clId="Web-{9D2C9B19-56C7-17EF-A3E0-2961AF1D54ED}" dt="2025-11-12T13:02:00.245" v="1" actId="1076"/>
+        <pc:sldMkLst>
+          <pc:docMk/>
+          <pc:sldMk cId="78934428" sldId="258"/>
+        </pc:sldMkLst>
+        <pc:picChg chg="mod">
+          <ac:chgData name="#MURPHY WONG KAH LEONG#" userId="S::murp0002@e.ntu.edu.sg::215c4a66-cb52-4461-8f6c-adbfeca3fdd7" providerId="AD" clId="Web-{9D2C9B19-56C7-17EF-A3E0-2961AF1D54ED}" dt="2025-11-12T13:02:00.245" v="1" actId="1076"/>
+          <ac:picMkLst>
+            <pc:docMk/>
+            <pc:sldMk cId="78934428" sldId="258"/>
+            <ac:picMk id="4" creationId="{FA9CCE84-F783-D51B-F8C5-F843704FEFDE}"/>
+          </ac:picMkLst>
+        </pc:picChg>
+      </pc:sldChg>
+    </pc:docChg>
+  </pc:docChgLst>
+</pc:chgInfo>
 </file>
 
 <file path=ppt/notesMasters/notesMaster1.xml><?xml version="1.0" encoding="utf-8"?>
@@ -531,11 +2459,11 @@
           <a:lstStyle/>
           <a:p>
             <a:r>
-              <a:rPr lang="en-US" dirty="0">
+              <a:rPr lang="en-US">
                 <a:ea typeface="Calibri"/>
                 <a:cs typeface="Calibri"/>
               </a:rPr>
-              <a:t>Firdaus</a:t>
+              <a:t>Leo</a:t>
             </a:r>
           </a:p>
         </p:txBody>
@@ -556,17 +2484,352 @@
           <a:lstStyle/>
           <a:p>
             <a:fld id="{33EA0104-69CC-4E0E-A353-08C9AB0756C3}" type="slidenum">
-              <a:rPr lang="en-US"/>
-              <a:t>4</a:t>
+              <a:rPr lang="en-GB"/>
+              <a:t>1</a:t>
             </a:fld>
-            <a:endParaRPr lang="en-US"/>
+            <a:endParaRPr lang="en-GB"/>
           </a:p>
         </p:txBody>
       </p:sp>
     </p:spTree>
     <p:extLst>
       <p:ext uri="{BB962C8B-B14F-4D97-AF65-F5344CB8AC3E}">
-        <p14:creationId xmlns:p14="http://schemas.microsoft.com/office/powerpoint/2010/main" val="3998519324"/>
+        <p14:creationId xmlns:p14="http://schemas.microsoft.com/office/powerpoint/2010/main" val="4159495391"/>
+      </p:ext>
+    </p:extLst>
+  </p:cSld>
+  <p:clrMapOvr>
+    <a:masterClrMapping/>
+  </p:clrMapOvr>
+</p:notes>
+</file>
+
+<file path=ppt/notesSlides/notesSlide10.xml><?xml version="1.0" encoding="utf-8"?>
+<p:notes xmlns:a="http://schemas.openxmlformats.org/drawingml/2006/main" xmlns:r="http://schemas.openxmlformats.org/officeDocument/2006/relationships" xmlns:p="http://schemas.openxmlformats.org/presentationml/2006/main">
+  <p:cSld>
+    <p:spTree>
+      <p:nvGrpSpPr>
+        <p:cNvPr id="1" name=""/>
+        <p:cNvGrpSpPr/>
+        <p:nvPr/>
+      </p:nvGrpSpPr>
+      <p:grpSpPr>
+        <a:xfrm>
+          <a:off x="0" y="0"/>
+          <a:ext cx="0" cy="0"/>
+          <a:chOff x="0" y="0"/>
+          <a:chExt cx="0" cy="0"/>
+        </a:xfrm>
+      </p:grpSpPr>
+      <p:sp>
+        <p:nvSpPr>
+          <p:cNvPr id="2" name="Slide Image Placeholder 1"/>
+          <p:cNvSpPr>
+            <a:spLocks noGrp="1" noRot="1" noChangeAspect="1"/>
+          </p:cNvSpPr>
+          <p:nvPr>
+            <p:ph type="sldImg"/>
+          </p:nvPr>
+        </p:nvSpPr>
+        <p:spPr/>
+      </p:sp>
+      <p:sp>
+        <p:nvSpPr>
+          <p:cNvPr id="3" name="Notes Placeholder 2"/>
+          <p:cNvSpPr>
+            <a:spLocks noGrp="1"/>
+          </p:cNvSpPr>
+          <p:nvPr>
+            <p:ph type="body" idx="1"/>
+          </p:nvPr>
+        </p:nvSpPr>
+        <p:spPr/>
+        <p:txBody>
+          <a:bodyPr/>
+          <a:lstStyle/>
+          <a:p>
+            <a:r>
+              <a:rPr lang="en-US">
+                <a:ea typeface="Calibri"/>
+                <a:cs typeface="Calibri"/>
+              </a:rPr>
+              <a:t>Murphy</a:t>
+            </a:r>
+          </a:p>
+        </p:txBody>
+      </p:sp>
+      <p:sp>
+        <p:nvSpPr>
+          <p:cNvPr id="4" name="Slide Number Placeholder 3"/>
+          <p:cNvSpPr>
+            <a:spLocks noGrp="1"/>
+          </p:cNvSpPr>
+          <p:nvPr>
+            <p:ph type="sldNum" sz="quarter" idx="5"/>
+          </p:nvPr>
+        </p:nvSpPr>
+        <p:spPr/>
+        <p:txBody>
+          <a:bodyPr/>
+          <a:lstStyle/>
+          <a:p>
+            <a:fld id="{33EA0104-69CC-4E0E-A353-08C9AB0756C3}" type="slidenum">
+              <a:rPr lang="en-GB"/>
+              <a:t>10</a:t>
+            </a:fld>
+            <a:endParaRPr lang="en-GB"/>
+          </a:p>
+        </p:txBody>
+      </p:sp>
+    </p:spTree>
+    <p:extLst>
+      <p:ext uri="{BB962C8B-B14F-4D97-AF65-F5344CB8AC3E}">
+        <p14:creationId xmlns:p14="http://schemas.microsoft.com/office/powerpoint/2010/main" val="555860279"/>
+      </p:ext>
+    </p:extLst>
+  </p:cSld>
+  <p:clrMapOvr>
+    <a:masterClrMapping/>
+  </p:clrMapOvr>
+</p:notes>
+</file>
+
+<file path=ppt/notesSlides/notesSlide11.xml><?xml version="1.0" encoding="utf-8"?>
+<p:notes xmlns:a="http://schemas.openxmlformats.org/drawingml/2006/main" xmlns:r="http://schemas.openxmlformats.org/officeDocument/2006/relationships" xmlns:p="http://schemas.openxmlformats.org/presentationml/2006/main">
+  <p:cSld>
+    <p:spTree>
+      <p:nvGrpSpPr>
+        <p:cNvPr id="1" name=""/>
+        <p:cNvGrpSpPr/>
+        <p:nvPr/>
+      </p:nvGrpSpPr>
+      <p:grpSpPr>
+        <a:xfrm>
+          <a:off x="0" y="0"/>
+          <a:ext cx="0" cy="0"/>
+          <a:chOff x="0" y="0"/>
+          <a:chExt cx="0" cy="0"/>
+        </a:xfrm>
+      </p:grpSpPr>
+      <p:sp>
+        <p:nvSpPr>
+          <p:cNvPr id="2" name="Slide Image Placeholder 1"/>
+          <p:cNvSpPr>
+            <a:spLocks noGrp="1" noRot="1" noChangeAspect="1"/>
+          </p:cNvSpPr>
+          <p:nvPr>
+            <p:ph type="sldImg"/>
+          </p:nvPr>
+        </p:nvSpPr>
+        <p:spPr/>
+      </p:sp>
+      <p:sp>
+        <p:nvSpPr>
+          <p:cNvPr id="3" name="Notes Placeholder 2"/>
+          <p:cNvSpPr>
+            <a:spLocks noGrp="1"/>
+          </p:cNvSpPr>
+          <p:nvPr>
+            <p:ph type="body" idx="1"/>
+          </p:nvPr>
+        </p:nvSpPr>
+        <p:spPr/>
+        <p:txBody>
+          <a:bodyPr/>
+          <a:lstStyle/>
+          <a:p>
+            <a:r>
+              <a:rPr lang="en-US">
+                <a:ea typeface="Calibri"/>
+                <a:cs typeface="Calibri"/>
+              </a:rPr>
+              <a:t>Wei Jie</a:t>
+            </a:r>
+          </a:p>
+          <a:p>
+            <a:pPr marL="171450" indent="-171450">
+              <a:buFont typeface="Arial"/>
+              <a:buChar char="•"/>
+            </a:pPr>
+            <a:r>
+              <a:rPr lang="en-US">
+                <a:ea typeface="Calibri"/>
+                <a:cs typeface="Calibri"/>
+              </a:rPr>
+              <a:t>After going through this group assignment, we learnt to plan when developing a program by designing the class diagram to identify the attributes and methods</a:t>
+            </a:r>
+          </a:p>
+          <a:p>
+            <a:pPr marL="171450" indent="-171450">
+              <a:buFont typeface="Arial"/>
+              <a:buChar char="•"/>
+            </a:pPr>
+            <a:r>
+              <a:rPr lang="en-US">
+                <a:ea typeface="Calibri"/>
+                <a:cs typeface="Calibri"/>
+              </a:rPr>
+              <a:t>We distributed the implementation tasks among team members based on our strengths.</a:t>
+            </a:r>
+          </a:p>
+          <a:p>
+            <a:pPr marL="171450" indent="-171450">
+              <a:buFont typeface="Arial"/>
+              <a:buChar char="•"/>
+            </a:pPr>
+            <a:r>
+              <a:rPr lang="en-US">
+                <a:ea typeface="Calibri"/>
+                <a:cs typeface="Calibri"/>
+              </a:rPr>
+              <a:t>We also did regular meetings to discuss the issues that we faced during implementation</a:t>
+            </a:r>
+          </a:p>
+          <a:p>
+            <a:pPr marL="171450" indent="-171450">
+              <a:buFont typeface="Arial"/>
+              <a:buChar char="•"/>
+            </a:pPr>
+            <a:r>
+              <a:rPr lang="en-US">
+                <a:ea typeface="Calibri"/>
+                <a:cs typeface="Calibri"/>
+              </a:rPr>
+              <a:t>We also learnt to apply SOLID principles after last week lesson, to improve our program for better maintainability</a:t>
+            </a:r>
+          </a:p>
+          <a:p>
+            <a:pPr marL="171450" indent="-171450">
+              <a:buFont typeface="Arial"/>
+              <a:buChar char="•"/>
+            </a:pPr>
+            <a:r>
+              <a:rPr lang="en-US">
+                <a:ea typeface="Calibri"/>
+                <a:cs typeface="Calibri"/>
+              </a:rPr>
+              <a:t>Lastly, we have written a detailed documentation for the program to act as a reference for future.</a:t>
+            </a:r>
+          </a:p>
+        </p:txBody>
+      </p:sp>
+      <p:sp>
+        <p:nvSpPr>
+          <p:cNvPr id="4" name="Slide Number Placeholder 3"/>
+          <p:cNvSpPr>
+            <a:spLocks noGrp="1"/>
+          </p:cNvSpPr>
+          <p:nvPr>
+            <p:ph type="sldNum" sz="quarter" idx="5"/>
+          </p:nvPr>
+        </p:nvSpPr>
+        <p:spPr/>
+        <p:txBody>
+          <a:bodyPr/>
+          <a:lstStyle/>
+          <a:p>
+            <a:fld id="{33EA0104-69CC-4E0E-A353-08C9AB0756C3}" type="slidenum">
+              <a:rPr lang="en-GB"/>
+              <a:t>11</a:t>
+            </a:fld>
+            <a:endParaRPr lang="en-GB"/>
+          </a:p>
+        </p:txBody>
+      </p:sp>
+    </p:spTree>
+    <p:extLst>
+      <p:ext uri="{BB962C8B-B14F-4D97-AF65-F5344CB8AC3E}">
+        <p14:creationId xmlns:p14="http://schemas.microsoft.com/office/powerpoint/2010/main" val="838517473"/>
+      </p:ext>
+    </p:extLst>
+  </p:cSld>
+  <p:clrMapOvr>
+    <a:masterClrMapping/>
+  </p:clrMapOvr>
+</p:notes>
+</file>
+
+<file path=ppt/notesSlides/notesSlide12.xml><?xml version="1.0" encoding="utf-8"?>
+<p:notes xmlns:a="http://schemas.openxmlformats.org/drawingml/2006/main" xmlns:r="http://schemas.openxmlformats.org/officeDocument/2006/relationships" xmlns:p="http://schemas.openxmlformats.org/presentationml/2006/main">
+  <p:cSld>
+    <p:spTree>
+      <p:nvGrpSpPr>
+        <p:cNvPr id="1" name=""/>
+        <p:cNvGrpSpPr/>
+        <p:nvPr/>
+      </p:nvGrpSpPr>
+      <p:grpSpPr>
+        <a:xfrm>
+          <a:off x="0" y="0"/>
+          <a:ext cx="0" cy="0"/>
+          <a:chOff x="0" y="0"/>
+          <a:chExt cx="0" cy="0"/>
+        </a:xfrm>
+      </p:grpSpPr>
+      <p:sp>
+        <p:nvSpPr>
+          <p:cNvPr id="2" name="Slide Image Placeholder 1"/>
+          <p:cNvSpPr>
+            <a:spLocks noGrp="1" noRot="1" noChangeAspect="1"/>
+          </p:cNvSpPr>
+          <p:nvPr>
+            <p:ph type="sldImg"/>
+          </p:nvPr>
+        </p:nvSpPr>
+        <p:spPr/>
+      </p:sp>
+      <p:sp>
+        <p:nvSpPr>
+          <p:cNvPr id="3" name="Notes Placeholder 2"/>
+          <p:cNvSpPr>
+            <a:spLocks noGrp="1"/>
+          </p:cNvSpPr>
+          <p:nvPr>
+            <p:ph type="body" idx="1"/>
+          </p:nvPr>
+        </p:nvSpPr>
+        <p:spPr/>
+        <p:txBody>
+          <a:bodyPr/>
+          <a:lstStyle/>
+          <a:p>
+            <a:r>
+              <a:rPr lang="en-US">
+                <a:ea typeface="Calibri"/>
+                <a:cs typeface="Calibri"/>
+              </a:rPr>
+              <a:t>That is all for our presentation. Thanks for your attention. Any questions?</a:t>
+            </a:r>
+          </a:p>
+        </p:txBody>
+      </p:sp>
+      <p:sp>
+        <p:nvSpPr>
+          <p:cNvPr id="4" name="Slide Number Placeholder 3"/>
+          <p:cNvSpPr>
+            <a:spLocks noGrp="1"/>
+          </p:cNvSpPr>
+          <p:nvPr>
+            <p:ph type="sldNum" sz="quarter" idx="5"/>
+          </p:nvPr>
+        </p:nvSpPr>
+        <p:spPr/>
+        <p:txBody>
+          <a:bodyPr/>
+          <a:lstStyle/>
+          <a:p>
+            <a:fld id="{33EA0104-69CC-4E0E-A353-08C9AB0756C3}" type="slidenum">
+              <a:rPr lang="en-US"/>
+              <a:t>12</a:t>
+            </a:fld>
+            <a:endParaRPr lang="en-US"/>
+          </a:p>
+        </p:txBody>
+      </p:sp>
+    </p:spTree>
+    <p:extLst>
+      <p:ext uri="{BB962C8B-B14F-4D97-AF65-F5344CB8AC3E}">
+        <p14:creationId xmlns:p14="http://schemas.microsoft.com/office/powerpoint/2010/main" val="2857344008"/>
       </p:ext>
     </p:extLst>
   </p:cSld>
@@ -620,16 +2883,12 @@
           <a:bodyPr/>
           <a:lstStyle/>
           <a:p>
-            <a:pPr marL="285750" indent="-285750">
-              <a:buFont typeface="Arial"/>
-              <a:buChar char="•"/>
-            </a:pPr>
-            <a:r>
-              <a:rPr lang="en-US" dirty="0">
+            <a:r>
+              <a:rPr lang="en-US">
                 <a:ea typeface="Calibri"/>
                 <a:cs typeface="Calibri"/>
               </a:rPr>
-              <a:t>Wei Jie</a:t>
+              <a:t>Leo</a:t>
             </a:r>
           </a:p>
         </p:txBody>
@@ -650,16 +2909,17 @@
           <a:lstStyle/>
           <a:p>
             <a:fld id="{33EA0104-69CC-4E0E-A353-08C9AB0756C3}" type="slidenum">
-              <a:t>5</a:t>
+              <a:rPr lang="en-GB"/>
+              <a:t>2</a:t>
             </a:fld>
-            <a:endParaRPr lang="en-US"/>
+            <a:endParaRPr lang="en-GB"/>
           </a:p>
         </p:txBody>
       </p:sp>
     </p:spTree>
     <p:extLst>
       <p:ext uri="{BB962C8B-B14F-4D97-AF65-F5344CB8AC3E}">
-        <p14:creationId xmlns:p14="http://schemas.microsoft.com/office/powerpoint/2010/main" val="3408715078"/>
+        <p14:creationId xmlns:p14="http://schemas.microsoft.com/office/powerpoint/2010/main" val="1810424518"/>
       </p:ext>
     </p:extLst>
   </p:cSld>
@@ -714,12 +2974,68 @@
           <a:lstStyle/>
           <a:p>
             <a:r>
-              <a:rPr lang="en-US" dirty="0">
+              <a:rPr lang="en-US">
                 <a:ea typeface="Calibri"/>
                 <a:cs typeface="Calibri"/>
               </a:rPr>
-              <a:t>Harish</a:t>
-            </a:r>
+              <a:t>Firdaus</a:t>
+            </a:r>
+          </a:p>
+          <a:p>
+            <a:r>
+              <a:rPr lang="en-US">
+                <a:ea typeface="Calibri"/>
+                <a:cs typeface="Calibri"/>
+              </a:rPr>
+              <a:t>1- </a:t>
+            </a:r>
+            <a:r>
+              <a:rPr lang="en-US" err="1">
+                <a:ea typeface="Calibri"/>
+                <a:cs typeface="Calibri"/>
+              </a:rPr>
+              <a:t>enaable</a:t>
+            </a:r>
+            <a:r>
+              <a:rPr lang="en-US">
+                <a:ea typeface="Calibri"/>
+                <a:cs typeface="Calibri"/>
+              </a:rPr>
+              <a:t> to reuse shared attributes and while still allowing each user to have their own attributes and methods</a:t>
+            </a:r>
+          </a:p>
+          <a:p>
+            <a:r>
+              <a:rPr lang="en-US">
+                <a:ea typeface="Calibri"/>
+                <a:cs typeface="Calibri"/>
+              </a:rPr>
+              <a:t>2- so that system maintain data consistency </a:t>
+            </a:r>
+          </a:p>
+          <a:p>
+            <a:r>
+              <a:rPr lang="en-US">
+                <a:ea typeface="Calibri"/>
+                <a:cs typeface="Calibri"/>
+              </a:rPr>
+              <a:t>3- follow slide</a:t>
+            </a:r>
+          </a:p>
+          <a:p>
+            <a:r>
+              <a:rPr lang="en-US">
+                <a:ea typeface="Calibri"/>
+                <a:cs typeface="Calibri"/>
+              </a:rPr>
+              <a:t>4- to provide flexibility</a:t>
+            </a:r>
+          </a:p>
+          <a:p>
+            <a:endParaRPr lang="en-US">
+              <a:ea typeface="Calibri"/>
+              <a:cs typeface="Calibri"/>
+            </a:endParaRPr>
           </a:p>
         </p:txBody>
       </p:sp>
@@ -739,17 +3055,17 @@
           <a:lstStyle/>
           <a:p>
             <a:fld id="{33EA0104-69CC-4E0E-A353-08C9AB0756C3}" type="slidenum">
-              <a:rPr lang="en-US"/>
-              <a:t>6</a:t>
+              <a:rPr lang="en-GB"/>
+              <a:t>3</a:t>
             </a:fld>
-            <a:endParaRPr lang="en-US"/>
+            <a:endParaRPr lang="en-GB"/>
           </a:p>
         </p:txBody>
       </p:sp>
     </p:spTree>
     <p:extLst>
       <p:ext uri="{BB962C8B-B14F-4D97-AF65-F5344CB8AC3E}">
-        <p14:creationId xmlns:p14="http://schemas.microsoft.com/office/powerpoint/2010/main" val="2850232698"/>
+        <p14:creationId xmlns:p14="http://schemas.microsoft.com/office/powerpoint/2010/main" val="2133654974"/>
       </p:ext>
     </p:extLst>
   </p:cSld>
@@ -804,11 +3120,93 @@
           <a:lstStyle/>
           <a:p>
             <a:r>
-              <a:rPr lang="en-US" dirty="0">
+              <a:rPr lang="en-US">
                 <a:ea typeface="Calibri"/>
                 <a:cs typeface="Calibri"/>
               </a:rPr>
-              <a:t>: D</a:t>
+              <a:t>Firdaus</a:t>
+            </a:r>
+          </a:p>
+          <a:p>
+            <a:r>
+              <a:rPr lang="en-US">
+                <a:ea typeface="Calibri"/>
+                <a:cs typeface="Calibri"/>
+              </a:rPr>
+              <a:t>SRP – states </a:t>
+            </a:r>
+            <a:r>
+              <a:rPr lang="en-US" err="1">
+                <a:ea typeface="Calibri"/>
+                <a:cs typeface="Calibri"/>
+              </a:rPr>
+              <a:t>ecery</a:t>
+            </a:r>
+            <a:r>
+              <a:rPr lang="en-US">
+                <a:ea typeface="Calibri"/>
+                <a:cs typeface="Calibri"/>
+              </a:rPr>
+              <a:t> class should have only one main responsibility</a:t>
+            </a:r>
+          </a:p>
+          <a:p>
+            <a:r>
+              <a:rPr lang="en-US">
+                <a:ea typeface="Calibri"/>
+                <a:cs typeface="Calibri"/>
+              </a:rPr>
+              <a:t>Example we will be using is the </a:t>
+            </a:r>
+            <a:r>
+              <a:rPr lang="en-US" err="1">
+                <a:ea typeface="Calibri"/>
+                <a:cs typeface="Calibri"/>
+              </a:rPr>
+              <a:t>InternshipFilter</a:t>
+            </a:r>
+            <a:r>
+              <a:rPr lang="en-US">
+                <a:ea typeface="Calibri"/>
+                <a:cs typeface="Calibri"/>
+              </a:rPr>
+              <a:t>. </a:t>
+            </a:r>
+          </a:p>
+          <a:p>
+            <a:r>
+              <a:rPr lang="en-US">
+                <a:ea typeface="Calibri"/>
+                <a:cs typeface="Calibri"/>
+              </a:rPr>
+              <a:t>Prev, all were mixed together into a class. Violated SRP rule. </a:t>
+            </a:r>
+          </a:p>
+          <a:p>
+            <a:r>
+              <a:rPr lang="en-US">
+                <a:ea typeface="Calibri"/>
+                <a:cs typeface="Calibri"/>
+              </a:rPr>
+              <a:t>Amended into 3 different class </a:t>
+            </a:r>
+          </a:p>
+          <a:p>
+            <a:r>
+              <a:rPr lang="en-US">
+                <a:ea typeface="Calibri"/>
+                <a:cs typeface="Calibri"/>
+              </a:rPr>
+              <a:t>Ensure each class handles 1 responsibility</a:t>
+            </a:r>
+          </a:p>
+          <a:p>
+            <a:r>
+              <a:rPr lang="en-US">
+                <a:ea typeface="Calibri"/>
+                <a:cs typeface="Calibri"/>
+              </a:rPr>
+              <a:t>Helps to keep the system maintainable, reduces risk of error when modifying</a:t>
             </a:r>
           </a:p>
         </p:txBody>
@@ -830,7 +3228,7 @@
           <a:p>
             <a:fld id="{33EA0104-69CC-4E0E-A353-08C9AB0756C3}" type="slidenum">
               <a:rPr lang="en-US"/>
-              <a:t>7</a:t>
+              <a:t>4</a:t>
             </a:fld>
             <a:endParaRPr lang="en-US"/>
           </a:p>
@@ -839,7 +3237,7 @@
     </p:spTree>
     <p:extLst>
       <p:ext uri="{BB962C8B-B14F-4D97-AF65-F5344CB8AC3E}">
-        <p14:creationId xmlns:p14="http://schemas.microsoft.com/office/powerpoint/2010/main" val="3002802064"/>
+        <p14:creationId xmlns:p14="http://schemas.microsoft.com/office/powerpoint/2010/main" val="3998519324"/>
       </p:ext>
     </p:extLst>
   </p:cSld>
@@ -893,12 +3291,803 @@
           <a:bodyPr/>
           <a:lstStyle/>
           <a:p>
-            <a:r>
-              <a:rPr lang="en-US" dirty="0">
+            <a:pPr marL="285750" indent="-285750">
+              <a:buFont typeface="Arial"/>
+              <a:buChar char="•"/>
+            </a:pPr>
+            <a:r>
+              <a:rPr lang="en-US">
                 <a:ea typeface="Calibri"/>
                 <a:cs typeface="Calibri"/>
               </a:rPr>
-              <a:t>Moe</a:t>
+              <a:t>Wei Jie</a:t>
+            </a:r>
+          </a:p>
+          <a:p>
+            <a:pPr marL="285750" indent="-285750">
+              <a:buFont typeface="Arial"/>
+              <a:buChar char="•"/>
+            </a:pPr>
+            <a:r>
+              <a:rPr lang="en-US">
+                <a:ea typeface="Calibri"/>
+                <a:cs typeface="Calibri"/>
+              </a:rPr>
+              <a:t>Before applying OCP, every user type have </a:t>
+            </a:r>
+            <a:r>
+              <a:rPr lang="en-US" err="1">
+                <a:ea typeface="Calibri"/>
+                <a:cs typeface="Calibri"/>
+              </a:rPr>
+              <a:t>showMenu</a:t>
+            </a:r>
+            <a:r>
+              <a:rPr lang="en-US">
+                <a:ea typeface="Calibri"/>
+                <a:cs typeface="Calibri"/>
+              </a:rPr>
+              <a:t> method in their respective controller class.</a:t>
+            </a:r>
+          </a:p>
+          <a:p>
+            <a:pPr marL="285750" indent="-285750">
+              <a:buFont typeface="Arial"/>
+              <a:buChar char="•"/>
+            </a:pPr>
+            <a:r>
+              <a:rPr lang="en-US">
+                <a:ea typeface="Calibri"/>
+                <a:cs typeface="Calibri"/>
+              </a:rPr>
+              <a:t>This makes the extension becomes more difficult in the future when we want to add a new user type like admin.</a:t>
+            </a:r>
+          </a:p>
+          <a:p>
+            <a:pPr marL="285750" indent="-285750">
+              <a:buFont typeface="Arial"/>
+              <a:buChar char="•"/>
+            </a:pPr>
+            <a:r>
+              <a:rPr lang="en-US">
+                <a:ea typeface="Calibri"/>
+                <a:cs typeface="Calibri"/>
+              </a:rPr>
+              <a:t>After applying the OCP, we have created a new abstract class called </a:t>
+            </a:r>
+            <a:r>
+              <a:rPr lang="en-US" err="1">
+                <a:ea typeface="Calibri"/>
+                <a:cs typeface="Calibri"/>
+              </a:rPr>
+              <a:t>UserController</a:t>
+            </a:r>
+            <a:r>
+              <a:rPr lang="en-US">
+                <a:ea typeface="Calibri"/>
+                <a:cs typeface="Calibri"/>
+              </a:rPr>
+              <a:t> which can be extends by different user type controller classes.</a:t>
+            </a:r>
+          </a:p>
+          <a:p>
+            <a:pPr marL="285750" indent="-285750">
+              <a:buFont typeface="Arial"/>
+              <a:buChar char="•"/>
+            </a:pPr>
+            <a:r>
+              <a:rPr lang="en-US">
+                <a:ea typeface="Calibri"/>
+                <a:cs typeface="Calibri"/>
+              </a:rPr>
+              <a:t>This superclass has an abstract method called </a:t>
+            </a:r>
+            <a:r>
+              <a:rPr lang="en-US" err="1">
+                <a:ea typeface="Calibri"/>
+                <a:cs typeface="Calibri"/>
+              </a:rPr>
+              <a:t>showMenu</a:t>
+            </a:r>
+            <a:r>
+              <a:rPr lang="en-US">
+                <a:ea typeface="Calibri"/>
+                <a:cs typeface="Calibri"/>
+              </a:rPr>
+              <a:t>, where all the subclasses will implement it with different menu respectively.</a:t>
+            </a:r>
+          </a:p>
+          <a:p>
+            <a:pPr marL="285750" indent="-285750">
+              <a:buFont typeface="Arial"/>
+              <a:buChar char="•"/>
+            </a:pPr>
+            <a:r>
+              <a:rPr lang="en-US">
+                <a:ea typeface="Calibri"/>
+                <a:cs typeface="Calibri"/>
+              </a:rPr>
+              <a:t>This will prevent the modification to the main program flow, but also able to extend a new user type, which satisfied the OCP.</a:t>
+            </a:r>
+          </a:p>
+        </p:txBody>
+      </p:sp>
+      <p:sp>
+        <p:nvSpPr>
+          <p:cNvPr id="4" name="Slide Number Placeholder 3"/>
+          <p:cNvSpPr>
+            <a:spLocks noGrp="1"/>
+          </p:cNvSpPr>
+          <p:nvPr>
+            <p:ph type="sldNum" sz="quarter" idx="5"/>
+          </p:nvPr>
+        </p:nvSpPr>
+        <p:spPr/>
+        <p:txBody>
+          <a:bodyPr/>
+          <a:lstStyle/>
+          <a:p>
+            <a:fld id="{33EA0104-69CC-4E0E-A353-08C9AB0756C3}" type="slidenum">
+              <a:t>5</a:t>
+            </a:fld>
+            <a:endParaRPr lang="en-US"/>
+          </a:p>
+        </p:txBody>
+      </p:sp>
+    </p:spTree>
+    <p:extLst>
+      <p:ext uri="{BB962C8B-B14F-4D97-AF65-F5344CB8AC3E}">
+        <p14:creationId xmlns:p14="http://schemas.microsoft.com/office/powerpoint/2010/main" val="3408715078"/>
+      </p:ext>
+    </p:extLst>
+  </p:cSld>
+  <p:clrMapOvr>
+    <a:masterClrMapping/>
+  </p:clrMapOvr>
+</p:notes>
+</file>
+
+<file path=ppt/notesSlides/notesSlide6.xml><?xml version="1.0" encoding="utf-8"?>
+<p:notes xmlns:a="http://schemas.openxmlformats.org/drawingml/2006/main" xmlns:r="http://schemas.openxmlformats.org/officeDocument/2006/relationships" xmlns:p="http://schemas.openxmlformats.org/presentationml/2006/main">
+  <p:cSld>
+    <p:spTree>
+      <p:nvGrpSpPr>
+        <p:cNvPr id="1" name=""/>
+        <p:cNvGrpSpPr/>
+        <p:nvPr/>
+      </p:nvGrpSpPr>
+      <p:grpSpPr>
+        <a:xfrm>
+          <a:off x="0" y="0"/>
+          <a:ext cx="0" cy="0"/>
+          <a:chOff x="0" y="0"/>
+          <a:chExt cx="0" cy="0"/>
+        </a:xfrm>
+      </p:grpSpPr>
+      <p:sp>
+        <p:nvSpPr>
+          <p:cNvPr id="2" name="Slide Image Placeholder 1"/>
+          <p:cNvSpPr>
+            <a:spLocks noGrp="1" noRot="1" noChangeAspect="1"/>
+          </p:cNvSpPr>
+          <p:nvPr>
+            <p:ph type="sldImg"/>
+          </p:nvPr>
+        </p:nvSpPr>
+        <p:spPr/>
+      </p:sp>
+      <p:sp>
+        <p:nvSpPr>
+          <p:cNvPr id="3" name="Notes Placeholder 2"/>
+          <p:cNvSpPr>
+            <a:spLocks noGrp="1"/>
+          </p:cNvSpPr>
+          <p:nvPr>
+            <p:ph type="body" idx="1"/>
+          </p:nvPr>
+        </p:nvSpPr>
+        <p:spPr/>
+        <p:txBody>
+          <a:bodyPr/>
+          <a:lstStyle/>
+          <a:p>
+            <a:r>
+              <a:rPr lang="en-US">
+                <a:ea typeface="Calibri"/>
+                <a:cs typeface="Calibri"/>
+              </a:rPr>
+              <a:t>Harish</a:t>
+            </a:r>
+          </a:p>
+          <a:p>
+            <a:r>
+              <a:rPr lang="en-US">
+                <a:ea typeface="Calibri"/>
+                <a:cs typeface="Calibri"/>
+              </a:rPr>
+              <a:t>I'll will explain how we have implemented LSP in our project.</a:t>
+            </a:r>
+          </a:p>
+          <a:p>
+            <a:r>
+              <a:rPr lang="en-US"/>
+              <a:t>LSP ensures objects of a superclass can be replaced with objects of a subclass without breaking the application.</a:t>
+            </a:r>
+            <a:r>
+              <a:rPr lang="en-US">
+                <a:ea typeface="Calibri"/>
+                <a:cs typeface="Calibri"/>
+              </a:rPr>
+              <a:t> </a:t>
+            </a:r>
+          </a:p>
+          <a:p>
+            <a:endParaRPr lang="en-US"/>
+          </a:p>
+          <a:p>
+            <a:r>
+              <a:rPr lang="en-US"/>
+              <a:t>Our system initially had three separate user classes with duplicated login, logout, and password code. By applying LSP, we created a User base class that Student, </a:t>
+            </a:r>
+            <a:r>
+              <a:rPr lang="en-US" err="1"/>
+              <a:t>CompanyRep</a:t>
+            </a:r>
+            <a:r>
+              <a:rPr lang="en-US"/>
+              <a:t>, and </a:t>
+            </a:r>
+            <a:r>
+              <a:rPr lang="en-US" err="1"/>
+              <a:t>CareerCenterStaff</a:t>
+            </a:r>
+            <a:r>
+              <a:rPr lang="en-US"/>
+              <a:t> all extend from. This reduced the code duplication across the codebase [and means bug fixes only happen in one place].</a:t>
+            </a:r>
+            <a:endParaRPr lang="en-US">
+              <a:ea typeface="Calibri"/>
+              <a:cs typeface="Calibri"/>
+            </a:endParaRPr>
+          </a:p>
+          <a:p>
+            <a:endParaRPr lang="en-US">
+              <a:ea typeface="Calibri"/>
+              <a:cs typeface="Calibri"/>
+            </a:endParaRPr>
+          </a:p>
+          <a:p>
+            <a:r>
+              <a:rPr lang="en-US">
+                <a:ea typeface="Calibri"/>
+                <a:cs typeface="Calibri"/>
+              </a:rPr>
+              <a:t>After we used LSP it enabled </a:t>
+            </a:r>
+            <a:endParaRPr lang="en-US"/>
+          </a:p>
+          <a:p>
+            <a:r>
+              <a:rPr lang="en-US"/>
+              <a:t>Substitutability in our project:</a:t>
+            </a:r>
+            <a:endParaRPr lang="en-US">
+              <a:ea typeface="Calibri"/>
+              <a:cs typeface="Calibri"/>
+            </a:endParaRPr>
+          </a:p>
+          <a:p>
+            <a:r>
+              <a:rPr lang="en-US"/>
+              <a:t> Our system has three subclasses that inherit from User: Student, </a:t>
+            </a:r>
+            <a:r>
+              <a:rPr lang="en-US" err="1"/>
+              <a:t>CompanyRep</a:t>
+            </a:r>
+            <a:r>
+              <a:rPr lang="en-US"/>
+              <a:t>, and </a:t>
+            </a:r>
+            <a:r>
+              <a:rPr lang="en-US" err="1"/>
+              <a:t>CareerCenterStaff</a:t>
+            </a:r>
+            <a:r>
+              <a:rPr lang="en-US"/>
+              <a:t>. Anywhere our code expects a User object, we can substitute any of these three subclasses without breaking functionality. This allows our authentication system to work uniformly across all user types.</a:t>
+            </a:r>
+            <a:endParaRPr lang="en-US">
+              <a:ea typeface="Calibri"/>
+              <a:cs typeface="Calibri"/>
+            </a:endParaRPr>
+          </a:p>
+          <a:p>
+            <a:endParaRPr lang="en-US">
+              <a:ea typeface="Calibri"/>
+              <a:cs typeface="+mn-lt"/>
+            </a:endParaRPr>
+          </a:p>
+          <a:p>
+            <a:r>
+              <a:rPr lang="en-US"/>
+              <a:t>Next, is </a:t>
+            </a:r>
+            <a:r>
+              <a:rPr lang="en-US" err="1"/>
+              <a:t>Behavioural</a:t>
+            </a:r>
+            <a:r>
+              <a:rPr lang="en-US"/>
+              <a:t> Consistency:</a:t>
+            </a:r>
+            <a:endParaRPr lang="en-US">
+              <a:ea typeface="Calibri"/>
+              <a:cs typeface="Calibri"/>
+            </a:endParaRPr>
+          </a:p>
+          <a:p>
+            <a:r>
+              <a:rPr lang="en-US">
+                <a:ea typeface="Calibri"/>
+                <a:cs typeface="+mn-lt"/>
+              </a:rPr>
+              <a:t> </a:t>
+            </a:r>
+            <a:r>
+              <a:rPr lang="en-US"/>
+              <a:t>All three subclasses inherit the login, logout, and </a:t>
+            </a:r>
+            <a:r>
+              <a:rPr lang="en-US" err="1"/>
+              <a:t>changePassword</a:t>
+            </a:r>
+            <a:r>
+              <a:rPr lang="en-US"/>
+              <a:t> methods unchanged from the User class. When login is called, it checks the </a:t>
+            </a:r>
+            <a:r>
+              <a:rPr lang="en-US" err="1"/>
+              <a:t>loginState</a:t>
+            </a:r>
+            <a:r>
+              <a:rPr lang="en-US"/>
+              <a:t> </a:t>
+            </a:r>
+            <a:r>
+              <a:rPr lang="en-US" err="1"/>
+              <a:t>boolean</a:t>
+            </a:r>
+            <a:r>
+              <a:rPr lang="en-US"/>
+              <a:t> and either prevents duplicate logins or sets </a:t>
+            </a:r>
+            <a:r>
+              <a:rPr lang="en-US" err="1"/>
+              <a:t>loginState</a:t>
+            </a:r>
+            <a:r>
+              <a:rPr lang="en-US"/>
+              <a:t> to true. This exact same logic applies whether you're calling it on a Student, </a:t>
+            </a:r>
+            <a:r>
+              <a:rPr lang="en-US" err="1"/>
+              <a:t>CompanyRep</a:t>
+            </a:r>
+            <a:r>
+              <a:rPr lang="en-US"/>
+              <a:t>, or </a:t>
+            </a:r>
+            <a:r>
+              <a:rPr lang="en-US" err="1"/>
+              <a:t>CareerCenterStaff</a:t>
+            </a:r>
+            <a:r>
+              <a:rPr lang="en-US"/>
+              <a:t> object.</a:t>
+            </a:r>
+            <a:endParaRPr lang="en-US">
+              <a:ea typeface="Calibri"/>
+              <a:cs typeface="Calibri"/>
+            </a:endParaRPr>
+          </a:p>
+          <a:p>
+            <a:endParaRPr lang="en-US">
+              <a:ea typeface="Calibri"/>
+              <a:cs typeface="+mn-lt"/>
+            </a:endParaRPr>
+          </a:p>
+          <a:p>
+            <a:r>
+              <a:rPr lang="en-US"/>
+              <a:t>Finally, Extension Without Modification:</a:t>
+            </a:r>
+            <a:endParaRPr lang="en-US">
+              <a:ea typeface="Calibri"/>
+              <a:cs typeface="Calibri"/>
+            </a:endParaRPr>
+          </a:p>
+          <a:p>
+            <a:r>
+              <a:rPr lang="en-US"/>
+              <a:t> Each subclass extends User by adding role-specific attributes without changing inherited behavior. For example, Student adds major and </a:t>
+            </a:r>
+            <a:r>
+              <a:rPr lang="en-US" err="1"/>
+              <a:t>yearOfStudy</a:t>
+            </a:r>
+            <a:r>
+              <a:rPr lang="en-US"/>
+              <a:t>, </a:t>
+            </a:r>
+            <a:r>
+              <a:rPr lang="en-US" err="1"/>
+              <a:t>CompanyRep</a:t>
+            </a:r>
+            <a:r>
+              <a:rPr lang="en-US"/>
+              <a:t> adds </a:t>
+            </a:r>
+            <a:r>
+              <a:rPr lang="en-US" err="1"/>
+              <a:t>companyName</a:t>
+            </a:r>
+            <a:r>
+              <a:rPr lang="en-US"/>
+              <a:t> and department, and </a:t>
+            </a:r>
+            <a:r>
+              <a:rPr lang="en-US" err="1"/>
+              <a:t>CareerCenterStaff</a:t>
+            </a:r>
+            <a:r>
+              <a:rPr lang="en-US"/>
+              <a:t> adds role information. These additions don't interfere with the core User functionality that the rest of our system depends on.</a:t>
+            </a:r>
+            <a:endParaRPr lang="en-US">
+              <a:ea typeface="Calibri"/>
+              <a:cs typeface="Calibri"/>
+            </a:endParaRPr>
+          </a:p>
+          <a:p>
+            <a:endParaRPr lang="en-US">
+              <a:ea typeface="Calibri"/>
+              <a:cs typeface="+mn-lt"/>
+            </a:endParaRPr>
+          </a:p>
+          <a:p>
+            <a:r>
+              <a:rPr lang="en-US">
+                <a:ea typeface="Calibri"/>
+                <a:cs typeface="+mn-lt"/>
+              </a:rPr>
+              <a:t>Next Murphy will explain about ISP</a:t>
+            </a:r>
+            <a:br>
+              <a:rPr lang="en-US">
+                <a:ea typeface="Calibri"/>
+                <a:cs typeface="+mn-lt"/>
+              </a:rPr>
+            </a:br>
+            <a:endParaRPr lang="en-US">
+              <a:ea typeface="Calibri"/>
+              <a:cs typeface="Calibri"/>
+            </a:endParaRPr>
+          </a:p>
+        </p:txBody>
+      </p:sp>
+      <p:sp>
+        <p:nvSpPr>
+          <p:cNvPr id="4" name="Slide Number Placeholder 3"/>
+          <p:cNvSpPr>
+            <a:spLocks noGrp="1"/>
+          </p:cNvSpPr>
+          <p:nvPr>
+            <p:ph type="sldNum" sz="quarter" idx="5"/>
+          </p:nvPr>
+        </p:nvSpPr>
+        <p:spPr/>
+        <p:txBody>
+          <a:bodyPr/>
+          <a:lstStyle/>
+          <a:p>
+            <a:fld id="{33EA0104-69CC-4E0E-A353-08C9AB0756C3}" type="slidenum">
+              <a:rPr lang="en-US"/>
+              <a:t>6</a:t>
+            </a:fld>
+            <a:endParaRPr lang="en-US"/>
+          </a:p>
+        </p:txBody>
+      </p:sp>
+    </p:spTree>
+    <p:extLst>
+      <p:ext uri="{BB962C8B-B14F-4D97-AF65-F5344CB8AC3E}">
+        <p14:creationId xmlns:p14="http://schemas.microsoft.com/office/powerpoint/2010/main" val="2850232698"/>
+      </p:ext>
+    </p:extLst>
+  </p:cSld>
+  <p:clrMapOvr>
+    <a:masterClrMapping/>
+  </p:clrMapOvr>
+</p:notes>
+</file>
+
+<file path=ppt/notesSlides/notesSlide7.xml><?xml version="1.0" encoding="utf-8"?>
+<p:notes xmlns:a="http://schemas.openxmlformats.org/drawingml/2006/main" xmlns:r="http://schemas.openxmlformats.org/officeDocument/2006/relationships" xmlns:p="http://schemas.openxmlformats.org/presentationml/2006/main">
+  <p:cSld>
+    <p:spTree>
+      <p:nvGrpSpPr>
+        <p:cNvPr id="1" name=""/>
+        <p:cNvGrpSpPr/>
+        <p:nvPr/>
+      </p:nvGrpSpPr>
+      <p:grpSpPr>
+        <a:xfrm>
+          <a:off x="0" y="0"/>
+          <a:ext cx="0" cy="0"/>
+          <a:chOff x="0" y="0"/>
+          <a:chExt cx="0" cy="0"/>
+        </a:xfrm>
+      </p:grpSpPr>
+      <p:sp>
+        <p:nvSpPr>
+          <p:cNvPr id="2" name="Slide Image Placeholder 1"/>
+          <p:cNvSpPr>
+            <a:spLocks noGrp="1" noRot="1" noChangeAspect="1"/>
+          </p:cNvSpPr>
+          <p:nvPr>
+            <p:ph type="sldImg"/>
+          </p:nvPr>
+        </p:nvSpPr>
+        <p:spPr/>
+      </p:sp>
+      <p:sp>
+        <p:nvSpPr>
+          <p:cNvPr id="3" name="Notes Placeholder 2"/>
+          <p:cNvSpPr>
+            <a:spLocks noGrp="1"/>
+          </p:cNvSpPr>
+          <p:nvPr>
+            <p:ph type="body" idx="1"/>
+          </p:nvPr>
+        </p:nvSpPr>
+        <p:spPr/>
+        <p:txBody>
+          <a:bodyPr/>
+          <a:lstStyle/>
+          <a:p>
+            <a:r>
+              <a:rPr lang="en-US">
+                <a:ea typeface="Calibri"/>
+                <a:cs typeface="Calibri"/>
+              </a:rPr>
+              <a:t>: D</a:t>
+            </a:r>
+          </a:p>
+        </p:txBody>
+      </p:sp>
+      <p:sp>
+        <p:nvSpPr>
+          <p:cNvPr id="4" name="Slide Number Placeholder 3"/>
+          <p:cNvSpPr>
+            <a:spLocks noGrp="1"/>
+          </p:cNvSpPr>
+          <p:nvPr>
+            <p:ph type="sldNum" sz="quarter" idx="5"/>
+          </p:nvPr>
+        </p:nvSpPr>
+        <p:spPr/>
+        <p:txBody>
+          <a:bodyPr/>
+          <a:lstStyle/>
+          <a:p>
+            <a:fld id="{33EA0104-69CC-4E0E-A353-08C9AB0756C3}" type="slidenum">
+              <a:rPr lang="en-US"/>
+              <a:t>7</a:t>
+            </a:fld>
+            <a:endParaRPr lang="en-US"/>
+          </a:p>
+        </p:txBody>
+      </p:sp>
+    </p:spTree>
+    <p:extLst>
+      <p:ext uri="{BB962C8B-B14F-4D97-AF65-F5344CB8AC3E}">
+        <p14:creationId xmlns:p14="http://schemas.microsoft.com/office/powerpoint/2010/main" val="3002802064"/>
+      </p:ext>
+    </p:extLst>
+  </p:cSld>
+  <p:clrMapOvr>
+    <a:masterClrMapping/>
+  </p:clrMapOvr>
+</p:notes>
+</file>
+
+<file path=ppt/notesSlides/notesSlide8.xml><?xml version="1.0" encoding="utf-8"?>
+<p:notes xmlns:a="http://schemas.openxmlformats.org/drawingml/2006/main" xmlns:r="http://schemas.openxmlformats.org/officeDocument/2006/relationships" xmlns:p="http://schemas.openxmlformats.org/presentationml/2006/main">
+  <p:cSld>
+    <p:spTree>
+      <p:nvGrpSpPr>
+        <p:cNvPr id="1" name=""/>
+        <p:cNvGrpSpPr/>
+        <p:nvPr/>
+      </p:nvGrpSpPr>
+      <p:grpSpPr>
+        <a:xfrm>
+          <a:off x="0" y="0"/>
+          <a:ext cx="0" cy="0"/>
+          <a:chOff x="0" y="0"/>
+          <a:chExt cx="0" cy="0"/>
+        </a:xfrm>
+      </p:grpSpPr>
+      <p:sp>
+        <p:nvSpPr>
+          <p:cNvPr id="2" name="Slide Image Placeholder 1"/>
+          <p:cNvSpPr>
+            <a:spLocks noGrp="1" noRot="1" noChangeAspect="1"/>
+          </p:cNvSpPr>
+          <p:nvPr>
+            <p:ph type="sldImg"/>
+          </p:nvPr>
+        </p:nvSpPr>
+        <p:spPr/>
+      </p:sp>
+      <p:sp>
+        <p:nvSpPr>
+          <p:cNvPr id="3" name="Notes Placeholder 2"/>
+          <p:cNvSpPr>
+            <a:spLocks noGrp="1"/>
+          </p:cNvSpPr>
+          <p:nvPr>
+            <p:ph type="body" idx="1"/>
+          </p:nvPr>
+        </p:nvSpPr>
+        <p:spPr/>
+        <p:txBody>
+          <a:bodyPr/>
+          <a:lstStyle/>
+          <a:p>
+            <a:r>
+              <a:rPr lang="en-US">
+                <a:ea typeface="Calibri"/>
+                <a:cs typeface="Calibri"/>
+              </a:rPr>
+              <a:t>Moe Oo (Leo):</a:t>
+            </a:r>
+          </a:p>
+          <a:p>
+            <a:pPr marL="171450" indent="-171450">
+              <a:buFont typeface="Calibri"/>
+              <a:buChar char="-"/>
+            </a:pPr>
+            <a:r>
+              <a:rPr lang="en-US">
+                <a:ea typeface="Calibri"/>
+                <a:cs typeface="Calibri"/>
+              </a:rPr>
+              <a:t>For DIP, I will be showing an example from the CreateInternshipAction.java which is the high level module.</a:t>
+            </a:r>
+          </a:p>
+          <a:p>
+            <a:pPr marL="171450" indent="-171450">
+              <a:buFont typeface="Calibri"/>
+              <a:buChar char="-"/>
+            </a:pPr>
+            <a:r>
+              <a:rPr lang="en-US">
+                <a:ea typeface="Calibri"/>
+                <a:cs typeface="Calibri"/>
+              </a:rPr>
+              <a:t>As you can see in the before screenshot, the </a:t>
+            </a:r>
+            <a:r>
+              <a:rPr lang="en-US" err="1">
+                <a:ea typeface="Calibri"/>
+                <a:cs typeface="Calibri"/>
+              </a:rPr>
+              <a:t>CreateInternshipAction</a:t>
+            </a:r>
+            <a:r>
+              <a:rPr lang="en-US">
+                <a:ea typeface="Calibri"/>
+                <a:cs typeface="Calibri"/>
+              </a:rPr>
+              <a:t> is depending on the </a:t>
+            </a:r>
+            <a:r>
+              <a:rPr lang="en-US" err="1">
+                <a:ea typeface="Calibri"/>
+                <a:cs typeface="Calibri"/>
+              </a:rPr>
+              <a:t>FileBoundary</a:t>
+            </a:r>
+            <a:r>
+              <a:rPr lang="en-US">
+                <a:ea typeface="Calibri"/>
+                <a:cs typeface="Calibri"/>
+              </a:rPr>
+              <a:t> concreate class which violates DIP.</a:t>
+            </a:r>
+          </a:p>
+          <a:p>
+            <a:pPr marL="171450" indent="-171450">
+              <a:buFont typeface="Calibri"/>
+              <a:buChar char="-"/>
+            </a:pPr>
+            <a:r>
+              <a:rPr lang="en-US">
+                <a:ea typeface="Calibri"/>
+                <a:cs typeface="Calibri"/>
+              </a:rPr>
+              <a:t>The solution is to make the high level module depend on the </a:t>
+            </a:r>
+            <a:r>
+              <a:rPr lang="en-US" err="1">
+                <a:ea typeface="Calibri"/>
+                <a:cs typeface="Calibri"/>
+              </a:rPr>
+              <a:t>InternshipCsvRepository</a:t>
+            </a:r>
+            <a:r>
+              <a:rPr lang="en-US">
+                <a:ea typeface="Calibri"/>
+                <a:cs typeface="Calibri"/>
+              </a:rPr>
+              <a:t> interface instead of the </a:t>
+            </a:r>
+            <a:r>
+              <a:rPr lang="en-US" err="1">
+                <a:ea typeface="Calibri"/>
+                <a:cs typeface="Calibri"/>
+              </a:rPr>
+              <a:t>FileBoundary</a:t>
+            </a:r>
+            <a:r>
+              <a:rPr lang="en-US">
+                <a:ea typeface="Calibri"/>
+                <a:cs typeface="Calibri"/>
+              </a:rPr>
+              <a:t> concrete class.</a:t>
+            </a:r>
+          </a:p>
+          <a:p>
+            <a:pPr marL="171450" indent="-171450">
+              <a:buFont typeface="Calibri"/>
+              <a:buChar char="-"/>
+            </a:pPr>
+            <a:r>
+              <a:rPr lang="en-US">
+                <a:ea typeface="Calibri"/>
+                <a:cs typeface="Calibri"/>
+              </a:rPr>
+              <a:t>This allows for future extension such as </a:t>
+            </a:r>
+            <a:r>
+              <a:rPr lang="en-US" err="1">
+                <a:ea typeface="Calibri"/>
+                <a:cs typeface="Calibri"/>
+              </a:rPr>
+              <a:t>JsonFileBoundary</a:t>
+            </a:r>
+            <a:r>
+              <a:rPr lang="en-US">
+                <a:ea typeface="Calibri"/>
+                <a:cs typeface="Calibri"/>
+              </a:rPr>
+              <a:t> to be passed into </a:t>
+            </a:r>
+            <a:r>
+              <a:rPr lang="en-US" err="1">
+                <a:ea typeface="Calibri"/>
+                <a:cs typeface="Calibri"/>
+              </a:rPr>
+              <a:t>CreateInternshipAction</a:t>
+            </a:r>
+            <a:r>
+              <a:rPr lang="en-US">
+                <a:ea typeface="Calibri"/>
+                <a:cs typeface="Calibri"/>
+              </a:rPr>
+              <a:t> constructor without modifying CreateInternshipAction.java.</a:t>
             </a:r>
           </a:p>
         </p:txBody>
@@ -930,6 +4119,121 @@
     <p:extLst>
       <p:ext uri="{BB962C8B-B14F-4D97-AF65-F5344CB8AC3E}">
         <p14:creationId xmlns:p14="http://schemas.microsoft.com/office/powerpoint/2010/main" val="1173327508"/>
+      </p:ext>
+    </p:extLst>
+  </p:cSld>
+  <p:clrMapOvr>
+    <a:masterClrMapping/>
+  </p:clrMapOvr>
+</p:notes>
+</file>
+
+<file path=ppt/notesSlides/notesSlide9.xml><?xml version="1.0" encoding="utf-8"?>
+<p:notes xmlns:a="http://schemas.openxmlformats.org/drawingml/2006/main" xmlns:r="http://schemas.openxmlformats.org/officeDocument/2006/relationships" xmlns:p="http://schemas.openxmlformats.org/presentationml/2006/main">
+  <p:cSld>
+    <p:spTree>
+      <p:nvGrpSpPr>
+        <p:cNvPr id="1" name="">
+          <a:extLst>
+            <a:ext uri="{FF2B5EF4-FFF2-40B4-BE49-F238E27FC236}">
+              <a16:creationId xmlns:a16="http://schemas.microsoft.com/office/drawing/2014/main" id="{71697DF4-DD40-D753-1B72-B8A41D507BB1}"/>
+            </a:ext>
+          </a:extLst>
+        </p:cNvPr>
+        <p:cNvGrpSpPr/>
+        <p:nvPr/>
+      </p:nvGrpSpPr>
+      <p:grpSpPr>
+        <a:xfrm>
+          <a:off x="0" y="0"/>
+          <a:ext cx="0" cy="0"/>
+          <a:chOff x="0" y="0"/>
+          <a:chExt cx="0" cy="0"/>
+        </a:xfrm>
+      </p:grpSpPr>
+      <p:sp>
+        <p:nvSpPr>
+          <p:cNvPr id="2" name="Slide Image Placeholder 1">
+            <a:extLst>
+              <a:ext uri="{FF2B5EF4-FFF2-40B4-BE49-F238E27FC236}">
+                <a16:creationId xmlns:a16="http://schemas.microsoft.com/office/drawing/2014/main" id="{D1DB3E2F-C507-F630-753C-BB461E7A14A8}"/>
+              </a:ext>
+            </a:extLst>
+          </p:cNvPr>
+          <p:cNvSpPr>
+            <a:spLocks noGrp="1" noRot="1" noChangeAspect="1"/>
+          </p:cNvSpPr>
+          <p:nvPr>
+            <p:ph type="sldImg"/>
+          </p:nvPr>
+        </p:nvSpPr>
+        <p:spPr/>
+      </p:sp>
+      <p:sp>
+        <p:nvSpPr>
+          <p:cNvPr id="3" name="Notes Placeholder 2">
+            <a:extLst>
+              <a:ext uri="{FF2B5EF4-FFF2-40B4-BE49-F238E27FC236}">
+                <a16:creationId xmlns:a16="http://schemas.microsoft.com/office/drawing/2014/main" id="{5B7D1644-ACD2-1690-5495-156195870A9E}"/>
+              </a:ext>
+            </a:extLst>
+          </p:cNvPr>
+          <p:cNvSpPr>
+            <a:spLocks noGrp="1"/>
+          </p:cNvSpPr>
+          <p:nvPr>
+            <p:ph type="body" idx="1"/>
+          </p:nvPr>
+        </p:nvSpPr>
+        <p:spPr/>
+        <p:txBody>
+          <a:bodyPr/>
+          <a:lstStyle/>
+          <a:p>
+            <a:r>
+              <a:rPr lang="en-US">
+                <a:ea typeface="Calibri"/>
+                <a:cs typeface="Calibri"/>
+              </a:rPr>
+              <a:t>Murphy</a:t>
+            </a:r>
+            <a:endParaRPr lang="en-US"/>
+          </a:p>
+        </p:txBody>
+      </p:sp>
+      <p:sp>
+        <p:nvSpPr>
+          <p:cNvPr id="4" name="Slide Number Placeholder 3">
+            <a:extLst>
+              <a:ext uri="{FF2B5EF4-FFF2-40B4-BE49-F238E27FC236}">
+                <a16:creationId xmlns:a16="http://schemas.microsoft.com/office/drawing/2014/main" id="{FFE7F0D2-D83B-F8AA-2732-D93DD59E421F}"/>
+              </a:ext>
+            </a:extLst>
+          </p:cNvPr>
+          <p:cNvSpPr>
+            <a:spLocks noGrp="1"/>
+          </p:cNvSpPr>
+          <p:nvPr>
+            <p:ph type="sldNum" sz="quarter" idx="5"/>
+          </p:nvPr>
+        </p:nvSpPr>
+        <p:spPr/>
+        <p:txBody>
+          <a:bodyPr/>
+          <a:lstStyle/>
+          <a:p>
+            <a:fld id="{33EA0104-69CC-4E0E-A353-08C9AB0756C3}" type="slidenum">
+              <a:rPr lang="en-US"/>
+              <a:t>9</a:t>
+            </a:fld>
+            <a:endParaRPr lang="en-US"/>
+          </a:p>
+        </p:txBody>
+      </p:sp>
+    </p:spTree>
+    <p:extLst>
+      <p:ext uri="{BB962C8B-B14F-4D97-AF65-F5344CB8AC3E}">
+        <p14:creationId xmlns:p14="http://schemas.microsoft.com/office/powerpoint/2010/main" val="4259234008"/>
       </p:ext>
     </p:extLst>
   </p:cSld>
@@ -3971,7 +7275,7 @@
                   </a:schemeClr>
                 </a:solidFill>
               </a:rPr>
-              <a:t>LWIN MOE OO</a:t>
+              <a:t>LWIN MOE OO (LEO)</a:t>
             </a:r>
             <a:endParaRPr lang="en-US">
               <a:solidFill>
@@ -4065,6 +7369,84 @@
 </file>
 
 <file path=ppt/slides/slide10.xml><?xml version="1.0" encoding="utf-8"?>
+<p:sld xmlns:a="http://schemas.openxmlformats.org/drawingml/2006/main" xmlns:r="http://schemas.openxmlformats.org/officeDocument/2006/relationships" xmlns:p="http://schemas.openxmlformats.org/presentationml/2006/main">
+  <p:cSld>
+    <p:bg>
+      <p:bgPr>
+        <a:solidFill>
+          <a:schemeClr val="accent2">
+            <a:lumMod val="20000"/>
+            <a:lumOff val="80000"/>
+          </a:schemeClr>
+        </a:solidFill>
+        <a:effectLst/>
+      </p:bgPr>
+    </p:bg>
+    <p:spTree>
+      <p:nvGrpSpPr>
+        <p:cNvPr id="1" name=""/>
+        <p:cNvGrpSpPr/>
+        <p:nvPr/>
+      </p:nvGrpSpPr>
+      <p:grpSpPr>
+        <a:xfrm>
+          <a:off x="0" y="0"/>
+          <a:ext cx="0" cy="0"/>
+          <a:chOff x="0" y="0"/>
+          <a:chExt cx="0" cy="0"/>
+        </a:xfrm>
+      </p:grpSpPr>
+      <p:sp>
+        <p:nvSpPr>
+          <p:cNvPr id="2" name="Title 1">
+            <a:extLst>
+              <a:ext uri="{FF2B5EF4-FFF2-40B4-BE49-F238E27FC236}">
+                <a16:creationId xmlns:a16="http://schemas.microsoft.com/office/drawing/2014/main" id="{1F785A69-0D73-CC89-DF32-40F5C382B304}"/>
+              </a:ext>
+            </a:extLst>
+          </p:cNvPr>
+          <p:cNvSpPr>
+            <a:spLocks noGrp="1"/>
+          </p:cNvSpPr>
+          <p:nvPr>
+            <p:ph type="title"/>
+          </p:nvPr>
+        </p:nvSpPr>
+        <p:spPr>
+          <a:xfrm>
+            <a:off x="4176713" y="2764652"/>
+            <a:ext cx="3838414" cy="1325563"/>
+          </a:xfrm>
+        </p:spPr>
+        <p:txBody>
+          <a:bodyPr>
+            <a:noAutofit/>
+          </a:bodyPr>
+          <a:lstStyle/>
+          <a:p>
+            <a:pPr algn="ctr"/>
+            <a:r>
+              <a:rPr lang="en-GB" sz="9600" b="1"/>
+              <a:t>Demo Time</a:t>
+            </a:r>
+            <a:endParaRPr lang="en-US" sz="9600"/>
+          </a:p>
+        </p:txBody>
+      </p:sp>
+    </p:spTree>
+    <p:extLst>
+      <p:ext uri="{BB962C8B-B14F-4D97-AF65-F5344CB8AC3E}">
+        <p14:creationId xmlns:p14="http://schemas.microsoft.com/office/powerpoint/2010/main" val="2703079337"/>
+      </p:ext>
+    </p:extLst>
+  </p:cSld>
+  <p:clrMapOvr>
+    <a:masterClrMapping/>
+  </p:clrMapOvr>
+</p:sld>
+</file>
+
+<file path=ppt/slides/slide11.xml><?xml version="1.0" encoding="utf-8"?>
 <p:sld xmlns:a="http://schemas.openxmlformats.org/drawingml/2006/main" xmlns:r="http://schemas.openxmlformats.org/officeDocument/2006/relationships" xmlns:p="http://schemas.openxmlformats.org/presentationml/2006/main">
   <p:cSld>
     <p:bg>
@@ -4201,7 +7583,7 @@
 </p:sld>
 </file>
 
-<file path=ppt/slides/slide11.xml><?xml version="1.0" encoding="utf-8"?>
+<file path=ppt/slides/slide12.xml><?xml version="1.0" encoding="utf-8"?>
 <p:sld xmlns:a="http://schemas.openxmlformats.org/drawingml/2006/main" xmlns:r="http://schemas.openxmlformats.org/officeDocument/2006/relationships" xmlns:p="http://schemas.openxmlformats.org/presentationml/2006/main">
   <p:cSld>
     <p:bg>
@@ -4460,7 +7842,7 @@
           <p:nvPr/>
         </p:nvPicPr>
         <p:blipFill>
-          <a:blip r:embed="rId2"/>
+          <a:blip r:embed="rId3"/>
           <a:srcRect r="-1" b="3682"/>
           <a:stretch>
             <a:fillRect/>
@@ -4603,7 +7985,15 @@
           <a:p>
             <a:r>
               <a:rPr lang="en-SG" sz="2400"/>
-              <a:t>Implemented Enum classes for easy interpretation for different status</a:t>
+              <a:t>Implemented Enum classes for easy interpretation for different status (</a:t>
+            </a:r>
+            <a:r>
+              <a:rPr lang="en-SG" sz="2400" err="1"/>
+              <a:t>userType</a:t>
+            </a:r>
+            <a:r>
+              <a:rPr lang="en-SG" sz="2400"/>
+              <a:t>, student major, Internship level etc)</a:t>
             </a:r>
           </a:p>
           <a:p>
@@ -4631,7 +8021,7 @@
           </p:nvPr>
         </p:nvPicPr>
         <p:blipFill>
-          <a:blip r:embed="rId2"/>
+          <a:blip r:embed="rId3"/>
           <a:stretch>
             <a:fillRect/>
           </a:stretch>
@@ -4757,7 +8147,7 @@
         <p:spPr>
           <a:xfrm>
             <a:off x="1250442" y="1483457"/>
-            <a:ext cx="4414708" cy="2127077"/>
+            <a:ext cx="4423888" cy="2172980"/>
           </a:xfrm>
           <a:prstGeom prst="rect">
             <a:avLst/>
@@ -4793,23 +8183,23 @@
           <a:lstStyle/>
           <a:p>
             <a:r>
-              <a:rPr lang="en-SG" sz="2400" dirty="0"/>
+              <a:rPr lang="en-SG" sz="2400"/>
               <a:t>Each class will only focus on one main task</a:t>
             </a:r>
           </a:p>
           <a:p>
             <a:r>
-              <a:rPr lang="en-SG" sz="2400" dirty="0"/>
+              <a:rPr lang="en-SG" sz="2400"/>
               <a:t>Only have one reasons for modification</a:t>
             </a:r>
           </a:p>
           <a:p>
             <a:r>
-              <a:rPr lang="en-SG" sz="2400" dirty="0"/>
+              <a:rPr lang="en-SG" sz="2400"/>
               <a:t>E.g. </a:t>
             </a:r>
             <a:r>
-              <a:rPr lang="en-SG" sz="2400" dirty="0" err="1"/>
+              <a:rPr lang="en-SG" sz="2400" err="1"/>
               <a:t>InternshipFilter</a:t>
             </a:r>
           </a:p>
@@ -5348,7 +8738,12 @@
             <p:ph sz="half" idx="2"/>
           </p:nvPr>
         </p:nvSpPr>
-        <p:spPr/>
+        <p:spPr>
+          <a:xfrm>
+            <a:off x="6174783" y="1825625"/>
+            <a:ext cx="5181600" cy="4351338"/>
+          </a:xfrm>
+        </p:spPr>
         <p:txBody>
           <a:bodyPr vert="horz" lIns="91440" tIns="45720" rIns="91440" bIns="45720" rtlCol="0" anchor="t">
             <a:noAutofit/>
@@ -5356,332 +8751,186 @@
           <a:lstStyle/>
           <a:p>
             <a:r>
-              <a:rPr lang="en-SG" sz="1600" b="1">
+              <a:rPr lang="en-SG" sz="1800" b="1">
                 <a:ea typeface="+mn-lt"/>
                 <a:cs typeface="+mn-lt"/>
               </a:rPr>
-              <a:t>True Substitutability:</a:t>
-            </a:r>
-            <a:r>
-              <a:rPr lang="en-SG" sz="1600">
-                <a:ea typeface="+mn-lt"/>
-                <a:cs typeface="+mn-lt"/>
-              </a:rPr>
-              <a:t> </a:t>
-            </a:r>
-          </a:p>
-          <a:p>
-            <a:pPr lvl="1"/>
-            <a:r>
-              <a:rPr lang="en-SG" sz="1600">
-                <a:ea typeface="+mn-lt"/>
-                <a:cs typeface="+mn-lt"/>
-              </a:rPr>
-              <a:t>Any code designed to work with a superclass object (e.g., a </a:t>
-            </a:r>
-            <a:r>
-              <a:rPr lang="en-SG" sz="1600">
-                <a:latin typeface="Consolas"/>
-              </a:rPr>
-              <a:t>User</a:t>
-            </a:r>
-            <a:r>
-              <a:rPr lang="en-SG" sz="1600">
-                <a:ea typeface="+mn-lt"/>
-                <a:cs typeface="+mn-lt"/>
-              </a:rPr>
-              <a:t> object) must also work perfectly if it's given a subclass object (e.g., a </a:t>
-            </a:r>
-            <a:r>
-              <a:rPr lang="en-SG" sz="1600">
-                <a:latin typeface="Consolas"/>
-              </a:rPr>
-              <a:t>Student</a:t>
-            </a:r>
-            <a:r>
-              <a:rPr lang="en-SG" sz="1600">
-                <a:ea typeface="+mn-lt"/>
-                <a:cs typeface="+mn-lt"/>
-              </a:rPr>
-              <a:t> or </a:t>
-            </a:r>
-            <a:r>
-              <a:rPr lang="en-SG" sz="1600" err="1">
-                <a:latin typeface="Consolas"/>
-              </a:rPr>
-              <a:t>CompanyRep</a:t>
-            </a:r>
-            <a:r>
-              <a:rPr lang="en-SG" sz="1600">
-                <a:ea typeface="+mn-lt"/>
-                <a:cs typeface="+mn-lt"/>
-              </a:rPr>
-              <a:t>) instead.</a:t>
-            </a:r>
-            <a:endParaRPr lang="en-US" sz="1600">
+              <a:t>Substitutability: </a:t>
+            </a:r>
+            <a:endParaRPr lang="en-GB" sz="1800" b="1">
               <a:ea typeface="+mn-lt"/>
               <a:cs typeface="+mn-lt"/>
             </a:endParaRPr>
           </a:p>
           <a:p>
-            <a:r>
-              <a:rPr lang="en-SG" sz="1600" b="1" err="1">
+            <a:pPr lvl="1"/>
+            <a:r>
+              <a:rPr lang="en-SG" sz="1800" b="1" i="1">
                 <a:ea typeface="+mn-lt"/>
                 <a:cs typeface="+mn-lt"/>
               </a:rPr>
-              <a:t>Behavioral</a:t>
-            </a:r>
-            <a:r>
-              <a:rPr lang="en-SG" sz="1600" b="1">
+              <a:t>Student</a:t>
+            </a:r>
+            <a:r>
+              <a:rPr lang="en-SG" sz="1800">
                 <a:ea typeface="+mn-lt"/>
                 <a:cs typeface="+mn-lt"/>
               </a:rPr>
-              <a:t> Consistency:</a:t>
-            </a:r>
-            <a:r>
-              <a:rPr lang="en-SG" sz="1600">
+              <a:t>, </a:t>
+            </a:r>
+            <a:r>
+              <a:rPr lang="en-SG" sz="1800" b="1" i="1" err="1">
                 <a:ea typeface="+mn-lt"/>
                 <a:cs typeface="+mn-lt"/>
               </a:rPr>
-              <a:t> The subclass must </a:t>
-            </a:r>
-            <a:r>
-              <a:rPr lang="en-SG" sz="1600" err="1">
+              <a:t>CompanyRep</a:t>
+            </a:r>
+            <a:r>
+              <a:rPr lang="en-SG" sz="1800">
                 <a:ea typeface="+mn-lt"/>
                 <a:cs typeface="+mn-lt"/>
               </a:rPr>
-              <a:t>honor</a:t>
-            </a:r>
-            <a:r>
-              <a:rPr lang="en-SG" sz="1600">
+              <a:t>, and </a:t>
+            </a:r>
+            <a:r>
+              <a:rPr lang="en-SG" sz="1800" b="1" i="1" err="1">
                 <a:ea typeface="+mn-lt"/>
                 <a:cs typeface="+mn-lt"/>
               </a:rPr>
-              <a:t> the "contract" and expected </a:t>
-            </a:r>
-            <a:r>
-              <a:rPr lang="en-SG" sz="1600" err="1">
+              <a:t>CareerCenterStaff</a:t>
+            </a:r>
+            <a:r>
+              <a:rPr lang="en-SG" sz="1800">
                 <a:ea typeface="+mn-lt"/>
                 <a:cs typeface="+mn-lt"/>
               </a:rPr>
-              <a:t>behavior</a:t>
-            </a:r>
-            <a:r>
-              <a:rPr lang="en-SG" sz="1600">
+              <a:t> can replace </a:t>
+            </a:r>
+            <a:r>
+              <a:rPr lang="en-SG" sz="1800" b="1" i="1">
                 <a:ea typeface="+mn-lt"/>
                 <a:cs typeface="+mn-lt"/>
               </a:rPr>
-              <a:t> of its superclass.</a:t>
-            </a:r>
-            <a:endParaRPr lang="en-SG" sz="1600"/>
-          </a:p>
-          <a:p>
-            <a:pPr lvl="1"/>
-            <a:r>
-              <a:rPr lang="en-SG" sz="1600">
+              <a:t>User</a:t>
+            </a:r>
+            <a:r>
+              <a:rPr lang="en-SG" sz="1800">
                 <a:ea typeface="+mn-lt"/>
                 <a:cs typeface="+mn-lt"/>
               </a:rPr>
-              <a:t>It can </a:t>
-            </a:r>
-            <a:r>
-              <a:rPr lang="en-SG" sz="1600" b="1">
+              <a:t> objects anywhere in our code without breaking functionality.</a:t>
+            </a:r>
+            <a:endParaRPr lang="en-GB" sz="1800">
+              <a:ea typeface="+mn-lt"/>
+              <a:cs typeface="+mn-lt"/>
+            </a:endParaRPr>
+          </a:p>
+          <a:p>
+            <a:r>
+              <a:rPr lang="en-SG" sz="1800" b="1">
                 <a:ea typeface="+mn-lt"/>
                 <a:cs typeface="+mn-lt"/>
               </a:rPr>
-              <a:t>add</a:t>
-            </a:r>
-            <a:r>
-              <a:rPr lang="en-SG" sz="1600">
+              <a:t> Consistent Behaviour:</a:t>
+            </a:r>
+            <a:endParaRPr lang="en-GB" sz="1800" b="1">
+              <a:ea typeface="+mn-lt"/>
+              <a:cs typeface="+mn-lt"/>
+            </a:endParaRPr>
+          </a:p>
+          <a:p>
+            <a:pPr lvl="1"/>
+            <a:r>
+              <a:rPr lang="en-SG" sz="1800">
                 <a:ea typeface="+mn-lt"/>
                 <a:cs typeface="+mn-lt"/>
               </a:rPr>
-              <a:t> new methods and properties (like </a:t>
-            </a:r>
-            <a:r>
-              <a:rPr lang="en-SG" sz="1600">
-                <a:latin typeface="Consolas"/>
-              </a:rPr>
-              <a:t>Student</a:t>
-            </a:r>
-            <a:r>
-              <a:rPr lang="en-SG" sz="1600">
+              <a:t> Core methods like </a:t>
+            </a:r>
+            <a:r>
+              <a:rPr lang="en-SG" sz="1800" b="1" i="1">
                 <a:ea typeface="+mn-lt"/>
                 <a:cs typeface="+mn-lt"/>
               </a:rPr>
-              <a:t> adding </a:t>
-            </a:r>
-            <a:r>
-              <a:rPr lang="en-SG" sz="1600">
-                <a:latin typeface="Consolas"/>
-              </a:rPr>
-              <a:t>major</a:t>
-            </a:r>
-            <a:r>
-              <a:rPr lang="en-SG" sz="1600">
+              <a:t>login</a:t>
+            </a:r>
+            <a:r>
+              <a:rPr lang="en-SG" sz="1800">
                 <a:ea typeface="+mn-lt"/>
                 <a:cs typeface="+mn-lt"/>
               </a:rPr>
-              <a:t>).</a:t>
-            </a:r>
-            <a:endParaRPr lang="en-SG" sz="1600"/>
-          </a:p>
-          <a:p>
-            <a:pPr lvl="1"/>
-            <a:r>
-              <a:rPr lang="en-SG" sz="1600">
+              <a:t>, </a:t>
+            </a:r>
+            <a:r>
+              <a:rPr lang="en-SG" sz="1800" b="1" i="1">
                 <a:ea typeface="+mn-lt"/>
                 <a:cs typeface="+mn-lt"/>
               </a:rPr>
-              <a:t>It </a:t>
-            </a:r>
-            <a:r>
-              <a:rPr lang="en-SG" sz="1600" b="1">
+              <a:t>logout</a:t>
+            </a:r>
+            <a:r>
+              <a:rPr lang="en-SG" sz="1800">
                 <a:ea typeface="+mn-lt"/>
                 <a:cs typeface="+mn-lt"/>
               </a:rPr>
-              <a:t>cannot change</a:t>
-            </a:r>
-            <a:r>
-              <a:rPr lang="en-SG" sz="1600">
+              <a:t>, and </a:t>
+            </a:r>
+            <a:r>
+              <a:rPr lang="en-SG" sz="1800" b="1" i="1" err="1">
                 <a:ea typeface="+mn-lt"/>
                 <a:cs typeface="+mn-lt"/>
               </a:rPr>
-              <a:t> the fundamental </a:t>
-            </a:r>
-            <a:r>
-              <a:rPr lang="en-SG" sz="1600" err="1">
+              <a:t>changePassword</a:t>
+            </a:r>
+            <a:r>
+              <a:rPr lang="en-SG" sz="1800">
                 <a:ea typeface="+mn-lt"/>
                 <a:cs typeface="+mn-lt"/>
               </a:rPr>
-              <a:t>behavior</a:t>
-            </a:r>
-            <a:r>
-              <a:rPr lang="en-SG" sz="1600">
+              <a:t> work identically across all user types through inheritance.</a:t>
+            </a:r>
+            <a:endParaRPr lang="en-GB" sz="1800">
+              <a:ea typeface="+mn-lt"/>
+              <a:cs typeface="+mn-lt"/>
+            </a:endParaRPr>
+          </a:p>
+          <a:p>
+            <a:r>
+              <a:rPr lang="en-SG" sz="1800" b="1">
                 <a:ea typeface="+mn-lt"/>
                 <a:cs typeface="+mn-lt"/>
               </a:rPr>
-              <a:t> of the original methods (like </a:t>
-            </a:r>
-            <a:r>
-              <a:rPr lang="en-SG" sz="1600">
-                <a:latin typeface="Consolas"/>
-              </a:rPr>
-              <a:t>login()</a:t>
-            </a:r>
-            <a:r>
-              <a:rPr lang="en-SG" sz="1600">
+              <a:t> Safe Extension: </a:t>
+            </a:r>
+            <a:endParaRPr lang="en-GB" sz="1800" b="1">
+              <a:ea typeface="+mn-lt"/>
+              <a:cs typeface="+mn-lt"/>
+            </a:endParaRPr>
+          </a:p>
+          <a:p>
+            <a:pPr lvl="1"/>
+            <a:r>
+              <a:rPr lang="en-SG" sz="1800">
                 <a:ea typeface="+mn-lt"/>
                 <a:cs typeface="+mn-lt"/>
               </a:rPr>
-              <a:t> or </a:t>
-            </a:r>
-            <a:r>
-              <a:rPr lang="en-SG" sz="1600" err="1">
-                <a:latin typeface="Consolas"/>
-              </a:rPr>
-              <a:t>changePassword</a:t>
-            </a:r>
-            <a:r>
-              <a:rPr lang="en-SG" sz="1600">
-                <a:latin typeface="Consolas"/>
-              </a:rPr>
-              <a:t>()</a:t>
-            </a:r>
-            <a:r>
-              <a:rPr lang="en-SG" sz="1600">
+              <a:t>Subclasses add specialized attributes and methods without modifying or surprising the base </a:t>
+            </a:r>
+            <a:r>
+              <a:rPr lang="en-SG" sz="1800" b="1" i="1">
                 <a:ea typeface="+mn-lt"/>
                 <a:cs typeface="+mn-lt"/>
               </a:rPr>
-              <a:t>).</a:t>
-            </a:r>
-            <a:endParaRPr lang="en-SG" sz="1600"/>
-          </a:p>
-          <a:p>
-            <a:r>
-              <a:rPr lang="en-SG" sz="1600" b="1">
+              <a:t>User</a:t>
+            </a:r>
+            <a:r>
+              <a:rPr lang="en-SG" sz="1800">
                 <a:ea typeface="+mn-lt"/>
                 <a:cs typeface="+mn-lt"/>
               </a:rPr>
-              <a:t>No Surprises:</a:t>
-            </a:r>
-            <a:r>
-              <a:rPr lang="en-SG" sz="1600">
-                <a:ea typeface="+mn-lt"/>
-                <a:cs typeface="+mn-lt"/>
-              </a:rPr>
-              <a:t> A subclass shouldn't cause new, unexpected side effects or errors. For example, if </a:t>
-            </a:r>
-            <a:r>
-              <a:rPr lang="en-SG" sz="1600" err="1">
-                <a:latin typeface="Consolas"/>
-              </a:rPr>
-              <a:t>User.changePassword</a:t>
-            </a:r>
-            <a:r>
-              <a:rPr lang="en-SG" sz="1600">
-                <a:latin typeface="Consolas"/>
-              </a:rPr>
-              <a:t>()</a:t>
-            </a:r>
-            <a:r>
-              <a:rPr lang="en-SG" sz="1600">
-                <a:ea typeface="+mn-lt"/>
-                <a:cs typeface="+mn-lt"/>
-              </a:rPr>
-              <a:t> just changes the password, the </a:t>
-            </a:r>
-            <a:r>
-              <a:rPr lang="en-SG" sz="1600" err="1">
-                <a:latin typeface="Consolas"/>
-              </a:rPr>
-              <a:t>Student.changePassword</a:t>
-            </a:r>
-            <a:r>
-              <a:rPr lang="en-SG" sz="1600">
-                <a:latin typeface="Consolas"/>
-              </a:rPr>
-              <a:t>()</a:t>
-            </a:r>
-            <a:r>
-              <a:rPr lang="en-SG" sz="1600">
-                <a:ea typeface="+mn-lt"/>
-                <a:cs typeface="+mn-lt"/>
-              </a:rPr>
-              <a:t> method shouldn't </a:t>
-            </a:r>
-            <a:r>
-              <a:rPr lang="en-SG" sz="1600" i="1">
-                <a:ea typeface="+mn-lt"/>
-                <a:cs typeface="+mn-lt"/>
-              </a:rPr>
-              <a:t>also</a:t>
-            </a:r>
-            <a:r>
-              <a:rPr lang="en-SG" sz="1600">
-                <a:ea typeface="+mn-lt"/>
-                <a:cs typeface="+mn-lt"/>
-              </a:rPr>
-              <a:t> send an email to a professor, as that would be a "surprising" </a:t>
-            </a:r>
-            <a:r>
-              <a:rPr lang="en-SG" sz="1600" err="1">
-                <a:ea typeface="+mn-lt"/>
-                <a:cs typeface="+mn-lt"/>
-              </a:rPr>
-              <a:t>behavior</a:t>
-            </a:r>
-            <a:r>
-              <a:rPr lang="en-SG" sz="1600">
-                <a:ea typeface="+mn-lt"/>
-                <a:cs typeface="+mn-lt"/>
-              </a:rPr>
-              <a:t> the original code didn't expect.</a:t>
-            </a:r>
-            <a:endParaRPr lang="en-SG" sz="1600"/>
-          </a:p>
-          <a:p>
-            <a:endParaRPr lang="en-SG" sz="2400"/>
+              <a:t> contract.</a:t>
+            </a:r>
+            <a:endParaRPr lang="en-SG" sz="1800"/>
           </a:p>
         </p:txBody>
       </p:sp>
@@ -5821,37 +9070,37 @@
           <a:lstStyle/>
           <a:p>
             <a:r>
-              <a:rPr lang="en-SG" sz="2400" dirty="0"/>
+              <a:rPr lang="en-SG" sz="2400"/>
               <a:t>Before:</a:t>
             </a:r>
             <a:r>
-              <a:rPr lang="en-SG" sz="2400" dirty="0">
+              <a:rPr lang="en-SG" sz="2400">
                 <a:latin typeface="Aptos"/>
                 <a:cs typeface="Times New Roman"/>
               </a:rPr>
               <a:t> Classes implementing </a:t>
             </a:r>
             <a:r>
-              <a:rPr lang="en-SG" sz="2400" dirty="0" err="1">
+              <a:rPr lang="en-SG" sz="2400" err="1">
                 <a:latin typeface="Aptos"/>
                 <a:cs typeface="Times New Roman"/>
               </a:rPr>
               <a:t>CSVRepository</a:t>
             </a:r>
             <a:r>
-              <a:rPr lang="en-SG" sz="2400" dirty="0">
+              <a:rPr lang="en-SG" sz="2400">
                 <a:latin typeface="Aptos"/>
                 <a:cs typeface="Times New Roman"/>
               </a:rPr>
               <a:t> will have to handle all 4 methods when using it. This forces implementing classes to include methods that we may not need, hence violating ISP.</a:t>
             </a:r>
-            <a:endParaRPr lang="en-SG" sz="2400" dirty="0">
+            <a:endParaRPr lang="en-SG" sz="2400">
               <a:latin typeface="Aptos"/>
             </a:endParaRPr>
           </a:p>
           <a:p>
             <a:r>
-              <a:rPr lang="en-SG" sz="2400" dirty="0">
+              <a:rPr lang="en-SG" sz="2400">
                 <a:latin typeface="Aptos"/>
                 <a:cs typeface="Times New Roman"/>
               </a:rPr>
@@ -5860,11 +9109,11 @@
           </a:p>
           <a:p>
             <a:r>
-              <a:rPr lang="en-SG" sz="2600" dirty="0"/>
+              <a:rPr lang="en-SG" sz="2600"/>
               <a:t>E.g. </a:t>
             </a:r>
             <a:r>
-              <a:rPr lang="en-SG" sz="2600" dirty="0" err="1"/>
+              <a:rPr lang="en-SG" sz="2600" err="1"/>
               <a:t>CSVRepository</a:t>
             </a:r>
           </a:p>
@@ -6036,7 +9285,7 @@
               <a:t> (high-level) depends on the </a:t>
             </a:r>
             <a:r>
-              <a:rPr lang="en-SG" sz="1800" b="1" i="1">
+              <a:rPr lang="en-SG" sz="1800" b="1" i="1" err="1">
                 <a:latin typeface="Consolas"/>
               </a:rPr>
               <a:t>InternshipCsvRepository</a:t>
@@ -6165,7 +9414,7 @@
         </p:blipFill>
         <p:spPr>
           <a:xfrm>
-            <a:off x="940453" y="1529556"/>
+            <a:off x="486678" y="2539848"/>
             <a:ext cx="4752975" cy="371475"/>
           </a:xfrm>
           <a:prstGeom prst="rect">
@@ -6195,7 +9444,7 @@
         </p:blipFill>
         <p:spPr>
           <a:xfrm>
-            <a:off x="940453" y="2039190"/>
+            <a:off x="486678" y="3032359"/>
             <a:ext cx="4752975" cy="314325"/>
           </a:xfrm>
           <a:prstGeom prst="rect">
@@ -6225,7 +9474,7 @@
         </p:blipFill>
         <p:spPr>
           <a:xfrm>
-            <a:off x="919723" y="3845019"/>
+            <a:off x="6947229" y="3690907"/>
             <a:ext cx="4772025" cy="333375"/>
           </a:xfrm>
           <a:prstGeom prst="rect">
@@ -6249,20 +9498,141 @@
         </p:nvPicPr>
         <p:blipFill>
           <a:blip r:embed="rId6"/>
+          <a:srcRect l="86" t="6190" r="-86" b="2989"/>
           <a:stretch>
             <a:fillRect/>
           </a:stretch>
         </p:blipFill>
         <p:spPr>
           <a:xfrm>
-            <a:off x="940553" y="2673457"/>
-            <a:ext cx="4292385" cy="994475"/>
+            <a:off x="6947229" y="2561122"/>
+            <a:ext cx="4292385" cy="927854"/>
           </a:xfrm>
           <a:prstGeom prst="rect">
             <a:avLst/>
           </a:prstGeom>
         </p:spPr>
       </p:pic>
+      <p:sp>
+        <p:nvSpPr>
+          <p:cNvPr id="4" name="TextBox 3">
+            <a:extLst>
+              <a:ext uri="{FF2B5EF4-FFF2-40B4-BE49-F238E27FC236}">
+                <a16:creationId xmlns:a16="http://schemas.microsoft.com/office/drawing/2014/main" id="{70F2E48F-7CB5-6571-34AD-D8664223C664}"/>
+              </a:ext>
+            </a:extLst>
+          </p:cNvPr>
+          <p:cNvSpPr txBox="1"/>
+          <p:nvPr/>
+        </p:nvSpPr>
+        <p:spPr>
+          <a:xfrm>
+            <a:off x="488022" y="2037708"/>
+            <a:ext cx="1934966" cy="369332"/>
+          </a:xfrm>
+          <a:prstGeom prst="rect">
+            <a:avLst/>
+          </a:prstGeom>
+          <a:noFill/>
+        </p:spPr>
+        <p:txBody>
+          <a:bodyPr rot="0" spcFirstLastPara="0" vertOverflow="overflow" horzOverflow="overflow" vert="horz" wrap="square" lIns="91440" tIns="45720" rIns="91440" bIns="45720" numCol="1" spcCol="0" rtlCol="0" fromWordArt="0" anchor="t" anchorCtr="0" forceAA="0" compatLnSpc="1">
+            <a:prstTxWarp prst="textNoShape">
+              <a:avLst/>
+            </a:prstTxWarp>
+            <a:spAutoFit/>
+          </a:bodyPr>
+          <a:lstStyle/>
+          <a:p>
+            <a:pPr algn="l"/>
+            <a:r>
+              <a:rPr lang="en-GB"/>
+              <a:t>Before:</a:t>
+            </a:r>
+          </a:p>
+        </p:txBody>
+      </p:sp>
+      <p:sp>
+        <p:nvSpPr>
+          <p:cNvPr id="8" name="TextBox 7">
+            <a:extLst>
+              <a:ext uri="{FF2B5EF4-FFF2-40B4-BE49-F238E27FC236}">
+                <a16:creationId xmlns:a16="http://schemas.microsoft.com/office/drawing/2014/main" id="{39B55849-2123-7054-6DE2-6C134003EB17}"/>
+              </a:ext>
+            </a:extLst>
+          </p:cNvPr>
+          <p:cNvSpPr txBox="1"/>
+          <p:nvPr/>
+        </p:nvSpPr>
+        <p:spPr>
+          <a:xfrm>
+            <a:off x="6952179" y="2037707"/>
+            <a:ext cx="1934966" cy="369332"/>
+          </a:xfrm>
+          <a:prstGeom prst="rect">
+            <a:avLst/>
+          </a:prstGeom>
+          <a:noFill/>
+        </p:spPr>
+        <p:txBody>
+          <a:bodyPr rot="0" spcFirstLastPara="0" vertOverflow="overflow" horzOverflow="overflow" vert="horz" wrap="square" lIns="91440" tIns="45720" rIns="91440" bIns="45720" numCol="1" spcCol="0" rtlCol="0" fromWordArt="0" anchor="t" anchorCtr="0" forceAA="0" compatLnSpc="1">
+            <a:prstTxWarp prst="textNoShape">
+              <a:avLst/>
+            </a:prstTxWarp>
+            <a:spAutoFit/>
+          </a:bodyPr>
+          <a:lstStyle/>
+          <a:p>
+            <a:pPr algn="l"/>
+            <a:r>
+              <a:rPr lang="en-GB"/>
+              <a:t>After:</a:t>
+            </a:r>
+            <a:endParaRPr lang="en-US"/>
+          </a:p>
+        </p:txBody>
+      </p:sp>
+      <p:sp>
+        <p:nvSpPr>
+          <p:cNvPr id="9" name="TextBox 8">
+            <a:extLst>
+              <a:ext uri="{FF2B5EF4-FFF2-40B4-BE49-F238E27FC236}">
+                <a16:creationId xmlns:a16="http://schemas.microsoft.com/office/drawing/2014/main" id="{281310B1-F9EA-A4E0-377C-64BEE7D6E290}"/>
+              </a:ext>
+            </a:extLst>
+          </p:cNvPr>
+          <p:cNvSpPr txBox="1"/>
+          <p:nvPr/>
+        </p:nvSpPr>
+        <p:spPr>
+          <a:xfrm>
+            <a:off x="488022" y="1446944"/>
+            <a:ext cx="4623370" cy="369332"/>
+          </a:xfrm>
+          <a:prstGeom prst="rect">
+            <a:avLst/>
+          </a:prstGeom>
+          <a:noFill/>
+        </p:spPr>
+        <p:txBody>
+          <a:bodyPr rot="0" spcFirstLastPara="0" vertOverflow="overflow" horzOverflow="overflow" vert="horz" wrap="square" lIns="91440" tIns="45720" rIns="91440" bIns="45720" numCol="1" spcCol="0" rtlCol="0" fromWordArt="0" anchor="t" anchorCtr="0" forceAA="0" compatLnSpc="1">
+            <a:prstTxWarp prst="textNoShape">
+              <a:avLst/>
+            </a:prstTxWarp>
+            <a:spAutoFit/>
+          </a:bodyPr>
+          <a:lstStyle/>
+          <a:p>
+            <a:r>
+              <a:rPr lang="en-SG" b="1" i="1">
+                <a:latin typeface="Consolas"/>
+              </a:rPr>
+              <a:t>CreateInternshipAction.java</a:t>
+            </a:r>
+            <a:endParaRPr lang="en-SG"/>
+          </a:p>
+        </p:txBody>
+      </p:sp>
     </p:spTree>
     <p:extLst>
       <p:ext uri="{BB962C8B-B14F-4D97-AF65-F5344CB8AC3E}">
@@ -6292,7 +9662,13 @@
     </p:bg>
     <p:spTree>
       <p:nvGrpSpPr>
-        <p:cNvPr id="1" name=""/>
+        <p:cNvPr id="1" name="">
+          <a:extLst>
+            <a:ext uri="{FF2B5EF4-FFF2-40B4-BE49-F238E27FC236}">
+              <a16:creationId xmlns:a16="http://schemas.microsoft.com/office/drawing/2014/main" id="{9035B4A8-F3C3-AE57-65AD-4D16B7E7C39D}"/>
+            </a:ext>
+          </a:extLst>
+        </p:cNvPr>
         <p:cNvGrpSpPr/>
         <p:nvPr/>
       </p:nvGrpSpPr>
@@ -6309,7 +9685,7 @@
           <p:cNvPr id="2" name="Title 1">
             <a:extLst>
               <a:ext uri="{FF2B5EF4-FFF2-40B4-BE49-F238E27FC236}">
-                <a16:creationId xmlns:a16="http://schemas.microsoft.com/office/drawing/2014/main" id="{1F785A69-0D73-CC89-DF32-40F5C382B304}"/>
+                <a16:creationId xmlns:a16="http://schemas.microsoft.com/office/drawing/2014/main" id="{CF9F2A83-2C2A-2C28-4E04-3765D39B5276}"/>
               </a:ext>
             </a:extLst>
           </p:cNvPr>
@@ -6322,33 +9698,130 @@
         </p:nvSpPr>
         <p:spPr>
           <a:xfrm>
-            <a:off x="4176713" y="2764652"/>
-            <a:ext cx="3838414" cy="1325563"/>
+            <a:off x="311385" y="120532"/>
+            <a:ext cx="10515600" cy="1325563"/>
           </a:xfrm>
         </p:spPr>
         <p:txBody>
-          <a:bodyPr>
-            <a:noAutofit/>
+          <a:bodyPr/>
+          <a:lstStyle/>
+          <a:p>
+            <a:r>
+              <a:rPr lang="en-GB" b="1"/>
+              <a:t>Exception Handling</a:t>
+            </a:r>
+            <a:endParaRPr lang="en-US"/>
+          </a:p>
+        </p:txBody>
+      </p:sp>
+      <p:sp>
+        <p:nvSpPr>
+          <p:cNvPr id="14" name="Content Placeholder 13">
+            <a:extLst>
+              <a:ext uri="{FF2B5EF4-FFF2-40B4-BE49-F238E27FC236}">
+                <a16:creationId xmlns:a16="http://schemas.microsoft.com/office/drawing/2014/main" id="{0FC3220C-89B3-CE69-CB38-3FFB5D52D568}"/>
+              </a:ext>
+            </a:extLst>
+          </p:cNvPr>
+          <p:cNvSpPr>
+            <a:spLocks noGrp="1"/>
+          </p:cNvSpPr>
+          <p:nvPr>
+            <p:ph sz="half" idx="2"/>
+          </p:nvPr>
+        </p:nvSpPr>
+        <p:spPr>
+          <a:xfrm>
+            <a:off x="462722" y="1450147"/>
+            <a:ext cx="11056730" cy="1093512"/>
+          </a:xfrm>
+        </p:spPr>
+        <p:txBody>
+          <a:bodyPr vert="horz" lIns="91440" tIns="45720" rIns="91440" bIns="45720" rtlCol="0" anchor="t">
+            <a:normAutofit/>
           </a:bodyPr>
           <a:lstStyle/>
           <a:p>
-            <a:pPr algn="ctr"/>
-            <a:r>
-              <a:rPr lang="en-GB" sz="9600" b="1" dirty="0"/>
-              <a:t>Demo </a:t>
-            </a:r>
-            <a:r>
-              <a:rPr lang="en-GB" sz="9600" b="1"/>
-              <a:t>Time</a:t>
-            </a:r>
-            <a:endParaRPr lang="en-US" sz="9600" dirty="0"/>
-          </a:p>
-        </p:txBody>
-      </p:sp>
+            <a:r>
+              <a:rPr lang="en-GB">
+                <a:ea typeface="+mn-lt"/>
+                <a:cs typeface="+mn-lt"/>
+              </a:rPr>
+              <a:t>Try-catch blocks in App.java to prevent program crash caused by invalid input from user.</a:t>
+            </a:r>
+            <a:endParaRPr lang="en-GB">
+              <a:latin typeface="Aptos"/>
+              <a:cs typeface="Times New Roman"/>
+            </a:endParaRPr>
+          </a:p>
+        </p:txBody>
+      </p:sp>
+      <p:pic>
+        <p:nvPicPr>
+          <p:cNvPr id="18" name="Content Placeholder 17" descr="A screen shot of a computer code&#10;&#10;AI-generated content may be incorrect.">
+            <a:extLst>
+              <a:ext uri="{FF2B5EF4-FFF2-40B4-BE49-F238E27FC236}">
+                <a16:creationId xmlns:a16="http://schemas.microsoft.com/office/drawing/2014/main" id="{5D9D5CD2-7ECE-3F4B-B248-3599FDEB8EDE}"/>
+              </a:ext>
+            </a:extLst>
+          </p:cNvPr>
+          <p:cNvPicPr>
+            <a:picLocks noGrp="1" noChangeAspect="1"/>
+          </p:cNvPicPr>
+          <p:nvPr>
+            <p:ph sz="half" idx="1"/>
+          </p:nvPr>
+        </p:nvPicPr>
+        <p:blipFill>
+          <a:blip r:embed="rId3"/>
+          <a:stretch>
+            <a:fillRect/>
+          </a:stretch>
+        </p:blipFill>
+        <p:spPr>
+          <a:xfrm>
+            <a:off x="457304" y="2735411"/>
+            <a:ext cx="5451229" cy="1924584"/>
+          </a:xfrm>
+          <a:prstGeom prst="rect">
+            <a:avLst/>
+          </a:prstGeom>
+        </p:spPr>
+      </p:pic>
+      <p:pic>
+        <p:nvPicPr>
+          <p:cNvPr id="11" name="Picture 10" descr="A computer code with colorful text&#10;&#10;AI-generated content may be incorrect.">
+            <a:extLst>
+              <a:ext uri="{FF2B5EF4-FFF2-40B4-BE49-F238E27FC236}">
+                <a16:creationId xmlns:a16="http://schemas.microsoft.com/office/drawing/2014/main" id="{EB53A4D0-0FDE-D5DB-6B7B-34C79A7874F3}"/>
+              </a:ext>
+            </a:extLst>
+          </p:cNvPr>
+          <p:cNvPicPr>
+            <a:picLocks noChangeAspect="1"/>
+          </p:cNvPicPr>
+          <p:nvPr/>
+        </p:nvPicPr>
+        <p:blipFill>
+          <a:blip r:embed="rId4"/>
+          <a:stretch>
+            <a:fillRect/>
+          </a:stretch>
+        </p:blipFill>
+        <p:spPr>
+          <a:xfrm>
+            <a:off x="5993473" y="2879712"/>
+            <a:ext cx="5783471" cy="1648724"/>
+          </a:xfrm>
+          <a:prstGeom prst="rect">
+            <a:avLst/>
+          </a:prstGeom>
+        </p:spPr>
+      </p:pic>
     </p:spTree>
     <p:extLst>
       <p:ext uri="{BB962C8B-B14F-4D97-AF65-F5344CB8AC3E}">
-        <p14:creationId xmlns:p14="http://schemas.microsoft.com/office/powerpoint/2010/main" val="2703079337"/>
+        <p14:creationId xmlns:p14="http://schemas.microsoft.com/office/powerpoint/2010/main" val="2290913640"/>
       </p:ext>
     </p:extLst>
   </p:cSld>
@@ -7073,18 +10546,18 @@
 </file>
 
 <file path=customXml/item2.xml><?xml version="1.0" encoding="utf-8"?>
+<p:properties xmlns:p="http://schemas.microsoft.com/office/2006/metadata/properties" xmlns:xsi="http://www.w3.org/2001/XMLSchema-instance" xmlns:pc="http://schemas.microsoft.com/office/infopath/2007/PartnerControls">
+  <documentManagement/>
+</p:properties>
+</file>
+
+<file path=customXml/item3.xml><?xml version="1.0" encoding="utf-8"?>
 <?mso-contentType ?>
 <FormTemplates xmlns="http://schemas.microsoft.com/sharepoint/v3/contenttype/forms">
   <Display>DocumentLibraryForm</Display>
   <Edit>DocumentLibraryForm</Edit>
   <New>DocumentLibraryForm</New>
 </FormTemplates>
-</file>
-
-<file path=customXml/item3.xml><?xml version="1.0" encoding="utf-8"?>
-<p:properties xmlns:p="http://schemas.microsoft.com/office/2006/metadata/properties" xmlns:xsi="http://www.w3.org/2001/XMLSchema-instance" xmlns:pc="http://schemas.microsoft.com/office/infopath/2007/PartnerControls">
-  <documentManagement/>
-</p:properties>
 </file>
 
 <file path=customXml/itemProps1.xml><?xml version="1.0" encoding="utf-8"?>
@@ -7100,31 +10573,26 @@
     <ds:schemaRef ds:uri="http://schemas.microsoft.com/office/2006/metadata/properties/metaAttributes"/>
     <ds:schemaRef ds:uri="http://schemas.microsoft.com/office/infopath/2007/PartnerControls"/>
     <ds:schemaRef ds:uri="http://schemas.openxmlformats.org/package/2006/metadata/core-properties"/>
+    <ds:schemaRef ds:uri="http://www.w3.org/2000/xmlns/"/>
     <ds:schemaRef ds:uri="http://www.w3.org/2001/XMLSchema"/>
   </ds:schemaRefs>
 </ds:datastoreItem>
 </file>
 
 <file path=customXml/itemProps2.xml><?xml version="1.0" encoding="utf-8"?>
+<ds:datastoreItem xmlns:ds="http://schemas.openxmlformats.org/officeDocument/2006/customXml" ds:itemID="{66785919-F101-4734-909A-6357895C5A3D}">
+  <ds:schemaRefs>
+    <ds:schemaRef ds:uri="http://schemas.microsoft.com/office/2006/metadata/properties"/>
+    <ds:schemaRef ds:uri="http://schemas.microsoft.com/office/infopath/2007/PartnerControls"/>
+    <ds:schemaRef ds:uri="http://www.w3.org/2000/xmlns/"/>
+  </ds:schemaRefs>
+</ds:datastoreItem>
+</file>
+
+<file path=customXml/itemProps3.xml><?xml version="1.0" encoding="utf-8"?>
 <ds:datastoreItem xmlns:ds="http://schemas.openxmlformats.org/officeDocument/2006/customXml" ds:itemID="{F1A67560-4608-45A7-952E-E2E72544D2A0}">
   <ds:schemaRefs>
     <ds:schemaRef ds:uri="http://schemas.microsoft.com/sharepoint/v3/contenttype/forms"/>
   </ds:schemaRefs>
 </ds:datastoreItem>
-</file>
-
-<file path=customXml/itemProps3.xml><?xml version="1.0" encoding="utf-8"?>
-<ds:datastoreItem xmlns:ds="http://schemas.openxmlformats.org/officeDocument/2006/customXml" ds:itemID="{66785919-F101-4734-909A-6357895C5A3D}">
-  <ds:schemaRefs>
-    <ds:schemaRef ds:uri="ecd37fb1-0de9-44e4-a3a0-252775a9645a"/>
-    <ds:schemaRef ds:uri="http://purl.org/dc/dcmitype/"/>
-    <ds:schemaRef ds:uri="http://purl.org/dc/elements/1.1/"/>
-    <ds:schemaRef ds:uri="http://purl.org/dc/terms/"/>
-    <ds:schemaRef ds:uri="http://schemas.microsoft.com/office/2006/documentManagement/types"/>
-    <ds:schemaRef ds:uri="http://schemas.microsoft.com/office/2006/metadata/properties"/>
-    <ds:schemaRef ds:uri="http://schemas.microsoft.com/office/infopath/2007/PartnerControls"/>
-    <ds:schemaRef ds:uri="http://schemas.openxmlformats.org/package/2006/metadata/core-properties"/>
-    <ds:schemaRef ds:uri="http://www.w3.org/XML/1998/namespace"/>
-  </ds:schemaRefs>
-</ds:datastoreItem>
 </file>
</xml_diff>